<commit_message>
added changes to list
</commit_message>
<xml_diff>
--- a/06.Lists & Tuples/5. Lists.pptx
+++ b/06.Lists & Tuples/5. Lists.pptx
@@ -1,34 +1,35 @@
 
 <file path=ppt/presentation.xml><?xml version="1.0" encoding="utf-8"?>
-<p:presentation xmlns:a="http://schemas.openxmlformats.org/drawingml/2006/main" xmlns:r="http://schemas.openxmlformats.org/officeDocument/2006/relationships" xmlns:p="http://schemas.openxmlformats.org/presentationml/2006/main" xmlns:m="http://schemas.openxmlformats.org/officeDocument/2006/math" xmlns:a14="http://schemas.microsoft.com/office/drawing/2010/main">
+<p:presentation xmlns:a="http://schemas.openxmlformats.org/drawingml/2006/main" xmlns:r="http://schemas.openxmlformats.org/officeDocument/2006/relationships" xmlns:p="http://schemas.openxmlformats.org/presentationml/2006/main">
   <p:sldMasterIdLst>
-    <p:sldMasterId id="2147483648" r:id="rId5"/>
+    <p:sldMasterId id="2147483648" r:id="rId1"/>
   </p:sldMasterIdLst>
   <p:notesMasterIdLst>
-    <p:notesMasterId r:id="rId7"/>
+    <p:notesMasterId r:id="rId22"/>
   </p:notesMasterIdLst>
   <p:sldIdLst>
-    <p:sldId id="256" r:id="rId8"/>
-    <p:sldId id="257" r:id="rId9"/>
-    <p:sldId id="258" r:id="rId10"/>
-    <p:sldId id="259" r:id="rId11"/>
-    <p:sldId id="260" r:id="rId12"/>
-    <p:sldId id="261" r:id="rId13"/>
-    <p:sldId id="262" r:id="rId14"/>
-    <p:sldId id="263" r:id="rId15"/>
-    <p:sldId id="264" r:id="rId16"/>
-    <p:sldId id="265" r:id="rId17"/>
-    <p:sldId id="266" r:id="rId18"/>
-    <p:sldId id="267" r:id="rId19"/>
-    <p:sldId id="268" r:id="rId20"/>
-    <p:sldId id="269" r:id="rId21"/>
-    <p:sldId id="270" r:id="rId22"/>
-    <p:sldId id="271" r:id="rId23"/>
-    <p:sldId id="272" r:id="rId24"/>
-    <p:sldId id="273" r:id="rId25"/>
-    <p:sldId id="274" r:id="rId26"/>
+    <p:sldId id="256" r:id="rId2"/>
+    <p:sldId id="257" r:id="rId3"/>
+    <p:sldId id="258" r:id="rId4"/>
+    <p:sldId id="259" r:id="rId5"/>
+    <p:sldId id="260" r:id="rId6"/>
+    <p:sldId id="263" r:id="rId7"/>
+    <p:sldId id="261" r:id="rId8"/>
+    <p:sldId id="262" r:id="rId9"/>
+    <p:sldId id="267" r:id="rId10"/>
+    <p:sldId id="264" r:id="rId11"/>
+    <p:sldId id="265" r:id="rId12"/>
+    <p:sldId id="266" r:id="rId13"/>
+    <p:sldId id="268" r:id="rId14"/>
+    <p:sldId id="269" r:id="rId15"/>
+    <p:sldId id="270" r:id="rId16"/>
+    <p:sldId id="271" r:id="rId17"/>
+    <p:sldId id="272" r:id="rId18"/>
+    <p:sldId id="273" r:id="rId19"/>
+    <p:sldId id="274" r:id="rId20"/>
+    <p:sldId id="275" r:id="rId21"/>
   </p:sldIdLst>
-  <p:sldSz cx="9144000" cy="5143500"/>
+  <p:sldSz cx="9144000" cy="5143500" type="screen16x9"/>
   <p:notesSz cx="6858000" cy="9144000"/>
   <p:defaultTextStyle>
     <a:defPPr marL="0" marR="0" indent="0" algn="l" defTabSz="914400" rtl="0" fontAlgn="auto" latinLnBrk="1" hangingPunct="0">
@@ -46,7 +47,7 @@
       <a:buFontTx/>
       <a:buNone/>
       <a:tabLst/>
-      <a:defRPr b="0" baseline="0" cap="none" i="0" spc="0" strike="noStrike" sz="1800" u="none" kumimoji="0" normalizeH="0">
+      <a:defRPr kumimoji="0" sz="1800" b="0" i="0" u="none" strike="noStrike" cap="none" spc="0" normalizeH="0" baseline="0">
         <a:ln>
           <a:noFill/>
         </a:ln>
@@ -72,7 +73,7 @@
       <a:buFontTx/>
       <a:buNone/>
       <a:tabLst/>
-      <a:defRPr b="0" baseline="0" cap="none" i="0" spc="0" strike="noStrike" sz="1400" u="none" kumimoji="0" normalizeH="0">
+      <a:defRPr kumimoji="0" sz="1400" b="0" i="0" u="none" strike="noStrike" cap="none" spc="0" normalizeH="0" baseline="0">
         <a:ln>
           <a:noFill/>
         </a:ln>
@@ -102,7 +103,7 @@
       <a:buFontTx/>
       <a:buNone/>
       <a:tabLst/>
-      <a:defRPr b="0" baseline="0" cap="none" i="0" spc="0" strike="noStrike" sz="1400" u="none" kumimoji="0" normalizeH="0">
+      <a:defRPr kumimoji="0" sz="1400" b="0" i="0" u="none" strike="noStrike" cap="none" spc="0" normalizeH="0" baseline="0">
         <a:ln>
           <a:noFill/>
         </a:ln>
@@ -132,7 +133,7 @@
       <a:buFontTx/>
       <a:buNone/>
       <a:tabLst/>
-      <a:defRPr b="0" baseline="0" cap="none" i="0" spc="0" strike="noStrike" sz="1400" u="none" kumimoji="0" normalizeH="0">
+      <a:defRPr kumimoji="0" sz="1400" b="0" i="0" u="none" strike="noStrike" cap="none" spc="0" normalizeH="0" baseline="0">
         <a:ln>
           <a:noFill/>
         </a:ln>
@@ -162,7 +163,7 @@
       <a:buFontTx/>
       <a:buNone/>
       <a:tabLst/>
-      <a:defRPr b="0" baseline="0" cap="none" i="0" spc="0" strike="noStrike" sz="1400" u="none" kumimoji="0" normalizeH="0">
+      <a:defRPr kumimoji="0" sz="1400" b="0" i="0" u="none" strike="noStrike" cap="none" spc="0" normalizeH="0" baseline="0">
         <a:ln>
           <a:noFill/>
         </a:ln>
@@ -192,7 +193,7 @@
       <a:buFontTx/>
       <a:buNone/>
       <a:tabLst/>
-      <a:defRPr b="0" baseline="0" cap="none" i="0" spc="0" strike="noStrike" sz="1400" u="none" kumimoji="0" normalizeH="0">
+      <a:defRPr kumimoji="0" sz="1400" b="0" i="0" u="none" strike="noStrike" cap="none" spc="0" normalizeH="0" baseline="0">
         <a:ln>
           <a:noFill/>
         </a:ln>
@@ -222,7 +223,7 @@
       <a:buFontTx/>
       <a:buNone/>
       <a:tabLst/>
-      <a:defRPr b="0" baseline="0" cap="none" i="0" spc="0" strike="noStrike" sz="1400" u="none" kumimoji="0" normalizeH="0">
+      <a:defRPr kumimoji="0" sz="1400" b="0" i="0" u="none" strike="noStrike" cap="none" spc="0" normalizeH="0" baseline="0">
         <a:ln>
           <a:noFill/>
         </a:ln>
@@ -252,7 +253,7 @@
       <a:buFontTx/>
       <a:buNone/>
       <a:tabLst/>
-      <a:defRPr b="0" baseline="0" cap="none" i="0" spc="0" strike="noStrike" sz="1400" u="none" kumimoji="0" normalizeH="0">
+      <a:defRPr kumimoji="0" sz="1400" b="0" i="0" u="none" strike="noStrike" cap="none" spc="0" normalizeH="0" baseline="0">
         <a:ln>
           <a:noFill/>
         </a:ln>
@@ -282,7 +283,7 @@
       <a:buFontTx/>
       <a:buNone/>
       <a:tabLst/>
-      <a:defRPr b="0" baseline="0" cap="none" i="0" spc="0" strike="noStrike" sz="1400" u="none" kumimoji="0" normalizeH="0">
+      <a:defRPr kumimoji="0" sz="1400" b="0" i="0" u="none" strike="noStrike" cap="none" spc="0" normalizeH="0" baseline="0">
         <a:ln>
           <a:noFill/>
         </a:ln>
@@ -312,7 +313,7 @@
       <a:buFontTx/>
       <a:buNone/>
       <a:tabLst/>
-      <a:defRPr b="0" baseline="0" cap="none" i="0" spc="0" strike="noStrike" sz="1400" u="none" kumimoji="0" normalizeH="0">
+      <a:defRPr kumimoji="0" sz="1400" b="0" i="0" u="none" strike="noStrike" cap="none" spc="0" normalizeH="0" baseline="0">
         <a:ln>
           <a:noFill/>
         </a:ln>
@@ -331,13 +332,14 @@
 </p:presentation>
 </file>
 
-<file path=ppt/commentAuthors.xml><?xml version="1.0" encoding="utf-8"?>
-<p:cmAuthorLst xmlns:a="http://schemas.openxmlformats.org/drawingml/2006/main" xmlns:r="http://schemas.openxmlformats.org/officeDocument/2006/relationships" xmlns:p="http://schemas.openxmlformats.org/presentationml/2006/main" xmlns:m="http://schemas.openxmlformats.org/officeDocument/2006/math" xmlns:a14="http://schemas.microsoft.com/office/drawing/2010/main"/>
-</file>
-
 <file path=ppt/notesMasters/notesMaster1.xml><?xml version="1.0" encoding="utf-8"?>
-<p:notesMaster xmlns:a="http://schemas.openxmlformats.org/drawingml/2006/main" xmlns:r="http://schemas.openxmlformats.org/officeDocument/2006/relationships" xmlns:p="http://schemas.openxmlformats.org/presentationml/2006/main" xmlns:m="http://schemas.openxmlformats.org/officeDocument/2006/math" xmlns:a14="http://schemas.microsoft.com/office/drawing/2010/main">
+<p:notesMaster xmlns:a="http://schemas.openxmlformats.org/drawingml/2006/main" xmlns:r="http://schemas.openxmlformats.org/officeDocument/2006/relationships" xmlns:p="http://schemas.openxmlformats.org/presentationml/2006/main">
   <p:cSld>
+    <p:bg>
+      <p:bgRef idx="1001">
+        <a:schemeClr val="bg1"/>
+      </p:bgRef>
+    </p:bg>
     <p:spTree>
       <p:nvGrpSpPr>
         <p:cNvPr id="1" name=""/>
@@ -355,7 +357,9 @@
       <p:sp>
         <p:nvSpPr>
           <p:cNvPr id="113" name="Shape 113"/>
-          <p:cNvSpPr/>
+          <p:cNvSpPr>
+            <a:spLocks noGrp="1" noRot="1" noChangeAspect="1"/>
+          </p:cNvSpPr>
           <p:nvPr>
             <p:ph type="sldImg"/>
           </p:nvPr>
@@ -373,14 +377,16 @@
           <a:bodyPr/>
           <a:lstStyle/>
           <a:p>
-            <a:pPr/>
+            <a:endParaRPr/>
           </a:p>
         </p:txBody>
       </p:sp>
       <p:sp>
         <p:nvSpPr>
           <p:cNvPr id="114" name="Shape 114"/>
-          <p:cNvSpPr/>
+          <p:cNvSpPr>
+            <a:spLocks noGrp="1"/>
+          </p:cNvSpPr>
           <p:nvPr>
             <p:ph type="body" sz="quarter" idx="1"/>
           </p:nvPr>
@@ -398,7 +404,7 @@
           <a:bodyPr/>
           <a:lstStyle/>
           <a:p>
-            <a:pPr/>
+            <a:endParaRPr/>
           </a:p>
         </p:txBody>
       </p:sp>
@@ -483,13 +489,14 @@
 </file>
 
 <file path=ppt/slideLayouts/slideLayout1.xml><?xml version="1.0" encoding="utf-8"?>
-<p:sldLayout xmlns:a="http://schemas.openxmlformats.org/drawingml/2006/main" xmlns:r="http://schemas.openxmlformats.org/officeDocument/2006/relationships" xmlns:p="http://schemas.openxmlformats.org/presentationml/2006/main" xmlns:m="http://schemas.openxmlformats.org/officeDocument/2006/math" xmlns:a14="http://schemas.microsoft.com/office/drawing/2010/main" type="tx" showMasterSp="0" showMasterPhAnim="1">
+<p:sldLayout xmlns:a="http://schemas.openxmlformats.org/drawingml/2006/main" xmlns:r="http://schemas.openxmlformats.org/officeDocument/2006/relationships" xmlns:p="http://schemas.openxmlformats.org/presentationml/2006/main" showMasterSp="0" type="tx">
   <p:cSld name="SECTION_HEADER">
     <p:bg>
       <p:bgPr>
         <a:solidFill>
           <a:srgbClr val="1A9988"/>
         </a:solidFill>
+        <a:effectLst/>
       </p:bgPr>
     </p:bg>
     <p:spTree>
@@ -556,6 +563,7 @@
                   </a:solidFill>
                 </a:defRPr>
               </a:pPr>
+              <a:endParaRPr/>
             </a:p>
           </p:txBody>
         </p:sp>
@@ -595,6 +603,7 @@
                   </a:solidFill>
                 </a:defRPr>
               </a:pPr>
+              <a:endParaRPr/>
             </a:p>
           </p:txBody>
         </p:sp>
@@ -602,7 +611,9 @@
       <p:sp>
         <p:nvSpPr>
           <p:cNvPr id="18" name="Title Text"/>
-          <p:cNvSpPr txBox="1"/>
+          <p:cNvSpPr txBox="1">
+            <a:spLocks noGrp="1"/>
+          </p:cNvSpPr>
           <p:nvPr>
             <p:ph type="title"/>
           </p:nvPr>
@@ -628,7 +639,6 @@
             </a:lvl1pPr>
           </a:lstStyle>
           <a:p>
-            <a:pPr/>
             <a:r>
               <a:t>Title Text</a:t>
             </a:r>
@@ -638,7 +648,9 @@
       <p:sp>
         <p:nvSpPr>
           <p:cNvPr id="19" name="Slide Number"/>
-          <p:cNvSpPr txBox="1"/>
+          <p:cNvSpPr txBox="1">
+            <a:spLocks noGrp="1"/>
+          </p:cNvSpPr>
           <p:nvPr>
             <p:ph type="sldNum" sz="quarter" idx="2"/>
           </p:nvPr>
@@ -660,8 +672,10 @@
             </a:lvl1pPr>
           </a:lstStyle>
           <a:p>
-            <a:pPr/>
-            <a:fld id="{86CB4B4D-7CA3-9044-876B-883B54F8677D}" type="slidenum"/>
+            <a:fld id="{86CB4B4D-7CA3-9044-876B-883B54F8677D}" type="slidenum">
+              <a:t>‹#›</a:t>
+            </a:fld>
+            <a:endParaRPr/>
           </a:p>
         </p:txBody>
       </p:sp>
@@ -670,12 +684,12 @@
   <p:clrMapOvr>
     <a:masterClrMapping/>
   </p:clrMapOvr>
-  <p:transition xmlns:p14="http://schemas.microsoft.com/office/powerpoint/2010/main" spd="med" advClick="1"/>
+  <p:transition spd="med"/>
 </p:sldLayout>
 </file>
 
 <file path=ppt/slideLayouts/slideLayout10.xml><?xml version="1.0" encoding="utf-8"?>
-<p:sldLayout xmlns:a="http://schemas.openxmlformats.org/drawingml/2006/main" xmlns:r="http://schemas.openxmlformats.org/officeDocument/2006/relationships" xmlns:p="http://schemas.openxmlformats.org/presentationml/2006/main" xmlns:m="http://schemas.openxmlformats.org/officeDocument/2006/math" xmlns:a14="http://schemas.microsoft.com/office/drawing/2010/main" type="tx" showMasterSp="0" showMasterPhAnim="1">
+<p:sldLayout xmlns:a="http://schemas.openxmlformats.org/drawingml/2006/main" xmlns:r="http://schemas.openxmlformats.org/officeDocument/2006/relationships" xmlns:p="http://schemas.openxmlformats.org/presentationml/2006/main" showMasterSp="0" type="tx">
   <p:cSld name="BLANK">
     <p:spTree>
       <p:nvGrpSpPr>
@@ -694,7 +708,9 @@
       <p:sp>
         <p:nvSpPr>
           <p:cNvPr id="107" name="Slide Number"/>
-          <p:cNvSpPr txBox="1"/>
+          <p:cNvSpPr txBox="1">
+            <a:spLocks noGrp="1"/>
+          </p:cNvSpPr>
           <p:nvPr>
             <p:ph type="sldNum" sz="quarter" idx="2"/>
           </p:nvPr>
@@ -708,8 +724,10 @@
           <a:bodyPr/>
           <a:lstStyle/>
           <a:p>
-            <a:pPr/>
-            <a:fld id="{86CB4B4D-7CA3-9044-876B-883B54F8677D}" type="slidenum"/>
+            <a:fld id="{86CB4B4D-7CA3-9044-876B-883B54F8677D}" type="slidenum">
+              <a:t>‹#›</a:t>
+            </a:fld>
+            <a:endParaRPr/>
           </a:p>
         </p:txBody>
       </p:sp>
@@ -718,12 +736,12 @@
   <p:clrMapOvr>
     <a:masterClrMapping/>
   </p:clrMapOvr>
-  <p:transition xmlns:p14="http://schemas.microsoft.com/office/powerpoint/2010/main" spd="med" advClick="1"/>
+  <p:transition spd="med"/>
 </p:sldLayout>
 </file>
 
 <file path=ppt/slideLayouts/slideLayout2.xml><?xml version="1.0" encoding="utf-8"?>
-<p:sldLayout xmlns:a="http://schemas.openxmlformats.org/drawingml/2006/main" xmlns:r="http://schemas.openxmlformats.org/officeDocument/2006/relationships" xmlns:p="http://schemas.openxmlformats.org/presentationml/2006/main" xmlns:m="http://schemas.openxmlformats.org/officeDocument/2006/math" xmlns:a14="http://schemas.microsoft.com/office/drawing/2010/main" type="tx" showMasterSp="1" showMasterPhAnim="1">
+<p:sldLayout xmlns:a="http://schemas.openxmlformats.org/drawingml/2006/main" xmlns:r="http://schemas.openxmlformats.org/officeDocument/2006/relationships" xmlns:p="http://schemas.openxmlformats.org/presentationml/2006/main" type="tx">
   <p:cSld name="TITLE_AND_BODY">
     <p:spTree>
       <p:nvGrpSpPr>
@@ -742,7 +760,9 @@
       <p:sp>
         <p:nvSpPr>
           <p:cNvPr id="26" name="Title Text"/>
-          <p:cNvSpPr txBox="1"/>
+          <p:cNvSpPr txBox="1">
+            <a:spLocks noGrp="1"/>
+          </p:cNvSpPr>
           <p:nvPr>
             <p:ph type="title"/>
           </p:nvPr>
@@ -756,7 +776,6 @@
           <a:bodyPr/>
           <a:lstStyle/>
           <a:p>
-            <a:pPr/>
             <a:r>
               <a:t>Title Text</a:t>
             </a:r>
@@ -766,7 +785,9 @@
       <p:sp>
         <p:nvSpPr>
           <p:cNvPr id="27" name="Body Level One…"/>
-          <p:cNvSpPr txBox="1"/>
+          <p:cNvSpPr txBox="1">
+            <a:spLocks noGrp="1"/>
+          </p:cNvSpPr>
           <p:nvPr>
             <p:ph type="body" sz="half" idx="1"/>
           </p:nvPr>
@@ -780,7 +801,6 @@
           <a:bodyPr/>
           <a:lstStyle/>
           <a:p>
-            <a:pPr/>
             <a:r>
               <a:t>Body Level One</a:t>
             </a:r>
@@ -814,7 +834,9 @@
       <p:sp>
         <p:nvSpPr>
           <p:cNvPr id="28" name="Slide Number"/>
-          <p:cNvSpPr txBox="1"/>
+          <p:cNvSpPr txBox="1">
+            <a:spLocks noGrp="1"/>
+          </p:cNvSpPr>
           <p:nvPr>
             <p:ph type="sldNum" sz="quarter" idx="2"/>
           </p:nvPr>
@@ -828,8 +850,10 @@
           <a:bodyPr/>
           <a:lstStyle/>
           <a:p>
-            <a:pPr/>
-            <a:fld id="{86CB4B4D-7CA3-9044-876B-883B54F8677D}" type="slidenum"/>
+            <a:fld id="{86CB4B4D-7CA3-9044-876B-883B54F8677D}" type="slidenum">
+              <a:t>‹#›</a:t>
+            </a:fld>
+            <a:endParaRPr/>
           </a:p>
         </p:txBody>
       </p:sp>
@@ -838,12 +862,12 @@
   <p:clrMapOvr>
     <a:masterClrMapping/>
   </p:clrMapOvr>
-  <p:transition xmlns:p14="http://schemas.microsoft.com/office/powerpoint/2010/main" spd="med" advClick="1"/>
+  <p:transition spd="med"/>
 </p:sldLayout>
 </file>
 
 <file path=ppt/slideLayouts/slideLayout3.xml><?xml version="1.0" encoding="utf-8"?>
-<p:sldLayout xmlns:a="http://schemas.openxmlformats.org/drawingml/2006/main" xmlns:r="http://schemas.openxmlformats.org/officeDocument/2006/relationships" xmlns:p="http://schemas.openxmlformats.org/presentationml/2006/main" xmlns:m="http://schemas.openxmlformats.org/officeDocument/2006/math" xmlns:a14="http://schemas.microsoft.com/office/drawing/2010/main" type="tx" showMasterSp="1" showMasterPhAnim="1">
+<p:sldLayout xmlns:a="http://schemas.openxmlformats.org/drawingml/2006/main" xmlns:r="http://schemas.openxmlformats.org/officeDocument/2006/relationships" xmlns:p="http://schemas.openxmlformats.org/presentationml/2006/main" type="tx">
   <p:cSld name="TITLE_AND_TWO_COLUMNS">
     <p:spTree>
       <p:nvGrpSpPr>
@@ -862,7 +886,9 @@
       <p:sp>
         <p:nvSpPr>
           <p:cNvPr id="35" name="Title Text"/>
-          <p:cNvSpPr txBox="1"/>
+          <p:cNvSpPr txBox="1">
+            <a:spLocks noGrp="1"/>
+          </p:cNvSpPr>
           <p:nvPr>
             <p:ph type="title"/>
           </p:nvPr>
@@ -880,7 +906,6 @@
           <a:bodyPr/>
           <a:lstStyle/>
           <a:p>
-            <a:pPr/>
             <a:r>
               <a:t>Title Text</a:t>
             </a:r>
@@ -890,7 +915,9 @@
       <p:sp>
         <p:nvSpPr>
           <p:cNvPr id="36" name="Body Level One…"/>
-          <p:cNvSpPr txBox="1"/>
+          <p:cNvSpPr txBox="1">
+            <a:spLocks noGrp="1"/>
+          </p:cNvSpPr>
           <p:nvPr>
             <p:ph type="body" sz="quarter" idx="1"/>
           </p:nvPr>
@@ -908,7 +935,6 @@
           <a:bodyPr/>
           <a:lstStyle/>
           <a:p>
-            <a:pPr/>
             <a:r>
               <a:t>Body Level One</a:t>
             </a:r>
@@ -942,7 +968,9 @@
       <p:sp>
         <p:nvSpPr>
           <p:cNvPr id="37" name="Google Shape;38;p5"/>
-          <p:cNvSpPr txBox="1"/>
+          <p:cNvSpPr txBox="1">
+            <a:spLocks noGrp="1"/>
+          </p:cNvSpPr>
           <p:nvPr>
             <p:ph type="body" sz="quarter" idx="13"/>
           </p:nvPr>
@@ -960,14 +988,16 @@
           <a:bodyPr/>
           <a:lstStyle/>
           <a:p>
-            <a:pPr/>
+            <a:endParaRPr/>
           </a:p>
         </p:txBody>
       </p:sp>
       <p:sp>
         <p:nvSpPr>
           <p:cNvPr id="38" name="Slide Number"/>
-          <p:cNvSpPr txBox="1"/>
+          <p:cNvSpPr txBox="1">
+            <a:spLocks noGrp="1"/>
+          </p:cNvSpPr>
           <p:nvPr>
             <p:ph type="sldNum" sz="quarter" idx="2"/>
           </p:nvPr>
@@ -981,8 +1011,10 @@
           <a:bodyPr/>
           <a:lstStyle/>
           <a:p>
-            <a:pPr/>
-            <a:fld id="{86CB4B4D-7CA3-9044-876B-883B54F8677D}" type="slidenum"/>
+            <a:fld id="{86CB4B4D-7CA3-9044-876B-883B54F8677D}" type="slidenum">
+              <a:t>‹#›</a:t>
+            </a:fld>
+            <a:endParaRPr/>
           </a:p>
         </p:txBody>
       </p:sp>
@@ -991,12 +1023,12 @@
   <p:clrMapOvr>
     <a:masterClrMapping/>
   </p:clrMapOvr>
-  <p:transition xmlns:p14="http://schemas.microsoft.com/office/powerpoint/2010/main" spd="med" advClick="1"/>
+  <p:transition spd="med"/>
 </p:sldLayout>
 </file>
 
 <file path=ppt/slideLayouts/slideLayout4.xml><?xml version="1.0" encoding="utf-8"?>
-<p:sldLayout xmlns:a="http://schemas.openxmlformats.org/drawingml/2006/main" xmlns:r="http://schemas.openxmlformats.org/officeDocument/2006/relationships" xmlns:p="http://schemas.openxmlformats.org/presentationml/2006/main" xmlns:m="http://schemas.openxmlformats.org/officeDocument/2006/math" xmlns:a14="http://schemas.microsoft.com/office/drawing/2010/main" type="tx" showMasterSp="1" showMasterPhAnim="1">
+<p:sldLayout xmlns:a="http://schemas.openxmlformats.org/drawingml/2006/main" xmlns:r="http://schemas.openxmlformats.org/officeDocument/2006/relationships" xmlns:p="http://schemas.openxmlformats.org/presentationml/2006/main" type="tx">
   <p:cSld name="TITLE_ONLY">
     <p:spTree>
       <p:nvGrpSpPr>
@@ -1015,7 +1047,9 @@
       <p:sp>
         <p:nvSpPr>
           <p:cNvPr id="45" name="Title Text"/>
-          <p:cNvSpPr txBox="1"/>
+          <p:cNvSpPr txBox="1">
+            <a:spLocks noGrp="1"/>
+          </p:cNvSpPr>
           <p:nvPr>
             <p:ph type="title"/>
           </p:nvPr>
@@ -1033,7 +1067,6 @@
           <a:bodyPr/>
           <a:lstStyle/>
           <a:p>
-            <a:pPr/>
             <a:r>
               <a:t>Title Text</a:t>
             </a:r>
@@ -1043,7 +1076,9 @@
       <p:sp>
         <p:nvSpPr>
           <p:cNvPr id="46" name="Slide Number"/>
-          <p:cNvSpPr txBox="1"/>
+          <p:cNvSpPr txBox="1">
+            <a:spLocks noGrp="1"/>
+          </p:cNvSpPr>
           <p:nvPr>
             <p:ph type="sldNum" sz="quarter" idx="2"/>
           </p:nvPr>
@@ -1057,8 +1092,10 @@
           <a:bodyPr/>
           <a:lstStyle/>
           <a:p>
-            <a:pPr/>
-            <a:fld id="{86CB4B4D-7CA3-9044-876B-883B54F8677D}" type="slidenum"/>
+            <a:fld id="{86CB4B4D-7CA3-9044-876B-883B54F8677D}" type="slidenum">
+              <a:t>‹#›</a:t>
+            </a:fld>
+            <a:endParaRPr/>
           </a:p>
         </p:txBody>
       </p:sp>
@@ -1067,12 +1104,12 @@
   <p:clrMapOvr>
     <a:masterClrMapping/>
   </p:clrMapOvr>
-  <p:transition xmlns:p14="http://schemas.microsoft.com/office/powerpoint/2010/main" spd="med" advClick="1"/>
+  <p:transition spd="med"/>
 </p:sldLayout>
 </file>
 
 <file path=ppt/slideLayouts/slideLayout5.xml><?xml version="1.0" encoding="utf-8"?>
-<p:sldLayout xmlns:a="http://schemas.openxmlformats.org/drawingml/2006/main" xmlns:r="http://schemas.openxmlformats.org/officeDocument/2006/relationships" xmlns:p="http://schemas.openxmlformats.org/presentationml/2006/main" xmlns:m="http://schemas.openxmlformats.org/officeDocument/2006/math" xmlns:a14="http://schemas.microsoft.com/office/drawing/2010/main" type="tx" showMasterSp="1" showMasterPhAnim="1">
+<p:sldLayout xmlns:a="http://schemas.openxmlformats.org/drawingml/2006/main" xmlns:r="http://schemas.openxmlformats.org/officeDocument/2006/relationships" xmlns:p="http://schemas.openxmlformats.org/presentationml/2006/main" type="tx">
   <p:cSld name="ONE_COLUMN_TEXT">
     <p:spTree>
       <p:nvGrpSpPr>
@@ -1091,7 +1128,9 @@
       <p:sp>
         <p:nvSpPr>
           <p:cNvPr id="53" name="Title Text"/>
-          <p:cNvSpPr txBox="1"/>
+          <p:cNvSpPr txBox="1">
+            <a:spLocks noGrp="1"/>
+          </p:cNvSpPr>
           <p:nvPr>
             <p:ph type="title"/>
           </p:nvPr>
@@ -1109,7 +1148,6 @@
           <a:bodyPr/>
           <a:lstStyle/>
           <a:p>
-            <a:pPr/>
             <a:r>
               <a:t>Title Text</a:t>
             </a:r>
@@ -1119,7 +1157,9 @@
       <p:sp>
         <p:nvSpPr>
           <p:cNvPr id="54" name="Body Level One…"/>
-          <p:cNvSpPr txBox="1"/>
+          <p:cNvSpPr txBox="1">
+            <a:spLocks noGrp="1"/>
+          </p:cNvSpPr>
           <p:nvPr>
             <p:ph type="body" sz="quarter" idx="1"/>
           </p:nvPr>
@@ -1137,7 +1177,6 @@
           <a:bodyPr/>
           <a:lstStyle/>
           <a:p>
-            <a:pPr/>
             <a:r>
               <a:t>Body Level One</a:t>
             </a:r>
@@ -1171,7 +1210,9 @@
       <p:sp>
         <p:nvSpPr>
           <p:cNvPr id="55" name="Slide Number"/>
-          <p:cNvSpPr txBox="1"/>
+          <p:cNvSpPr txBox="1">
+            <a:spLocks noGrp="1"/>
+          </p:cNvSpPr>
           <p:nvPr>
             <p:ph type="sldNum" sz="quarter" idx="2"/>
           </p:nvPr>
@@ -1185,8 +1226,10 @@
           <a:bodyPr/>
           <a:lstStyle/>
           <a:p>
-            <a:pPr/>
-            <a:fld id="{86CB4B4D-7CA3-9044-876B-883B54F8677D}" type="slidenum"/>
+            <a:fld id="{86CB4B4D-7CA3-9044-876B-883B54F8677D}" type="slidenum">
+              <a:t>‹#›</a:t>
+            </a:fld>
+            <a:endParaRPr/>
           </a:p>
         </p:txBody>
       </p:sp>
@@ -1195,18 +1238,19 @@
   <p:clrMapOvr>
     <a:masterClrMapping/>
   </p:clrMapOvr>
-  <p:transition xmlns:p14="http://schemas.microsoft.com/office/powerpoint/2010/main" spd="med" advClick="1"/>
+  <p:transition spd="med"/>
 </p:sldLayout>
 </file>
 
 <file path=ppt/slideLayouts/slideLayout6.xml><?xml version="1.0" encoding="utf-8"?>
-<p:sldLayout xmlns:a="http://schemas.openxmlformats.org/drawingml/2006/main" xmlns:r="http://schemas.openxmlformats.org/officeDocument/2006/relationships" xmlns:p="http://schemas.openxmlformats.org/presentationml/2006/main" xmlns:m="http://schemas.openxmlformats.org/officeDocument/2006/math" xmlns:a14="http://schemas.microsoft.com/office/drawing/2010/main" type="tx" showMasterSp="0" showMasterPhAnim="1">
+<p:sldLayout xmlns:a="http://schemas.openxmlformats.org/drawingml/2006/main" xmlns:r="http://schemas.openxmlformats.org/officeDocument/2006/relationships" xmlns:p="http://schemas.openxmlformats.org/presentationml/2006/main" showMasterSp="0" type="tx">
   <p:cSld name="MAIN_POINT">
     <p:bg>
       <p:bgPr>
         <a:solidFill>
           <a:schemeClr val="accent3"/>
         </a:solidFill>
+        <a:effectLst/>
       </p:bgPr>
     </p:bg>
     <p:spTree>
@@ -1273,6 +1317,7 @@
                   </a:solidFill>
                 </a:defRPr>
               </a:pPr>
+              <a:endParaRPr/>
             </a:p>
           </p:txBody>
         </p:sp>
@@ -1312,6 +1357,7 @@
                   </a:solidFill>
                 </a:defRPr>
               </a:pPr>
+              <a:endParaRPr/>
             </a:p>
           </p:txBody>
         </p:sp>
@@ -1319,7 +1365,9 @@
       <p:sp>
         <p:nvSpPr>
           <p:cNvPr id="65" name="Title Text"/>
-          <p:cNvSpPr txBox="1"/>
+          <p:cNvSpPr txBox="1">
+            <a:spLocks noGrp="1"/>
+          </p:cNvSpPr>
           <p:nvPr>
             <p:ph type="title"/>
           </p:nvPr>
@@ -1345,7 +1393,6 @@
             </a:lvl1pPr>
           </a:lstStyle>
           <a:p>
-            <a:pPr/>
             <a:r>
               <a:t>Title Text</a:t>
             </a:r>
@@ -1355,7 +1402,9 @@
       <p:sp>
         <p:nvSpPr>
           <p:cNvPr id="66" name="Slide Number"/>
-          <p:cNvSpPr txBox="1"/>
+          <p:cNvSpPr txBox="1">
+            <a:spLocks noGrp="1"/>
+          </p:cNvSpPr>
           <p:nvPr>
             <p:ph type="sldNum" sz="quarter" idx="2"/>
           </p:nvPr>
@@ -1377,8 +1426,10 @@
             </a:lvl1pPr>
           </a:lstStyle>
           <a:p>
-            <a:pPr/>
-            <a:fld id="{86CB4B4D-7CA3-9044-876B-883B54F8677D}" type="slidenum"/>
+            <a:fld id="{86CB4B4D-7CA3-9044-876B-883B54F8677D}" type="slidenum">
+              <a:t>‹#›</a:t>
+            </a:fld>
+            <a:endParaRPr/>
           </a:p>
         </p:txBody>
       </p:sp>
@@ -1387,12 +1438,12 @@
   <p:clrMapOvr>
     <a:masterClrMapping/>
   </p:clrMapOvr>
-  <p:transition xmlns:p14="http://schemas.microsoft.com/office/powerpoint/2010/main" spd="med" advClick="1"/>
+  <p:transition spd="med"/>
 </p:sldLayout>
 </file>
 
 <file path=ppt/slideLayouts/slideLayout7.xml><?xml version="1.0" encoding="utf-8"?>
-<p:sldLayout xmlns:a="http://schemas.openxmlformats.org/drawingml/2006/main" xmlns:r="http://schemas.openxmlformats.org/officeDocument/2006/relationships" xmlns:p="http://schemas.openxmlformats.org/presentationml/2006/main" xmlns:m="http://schemas.openxmlformats.org/officeDocument/2006/math" xmlns:a14="http://schemas.microsoft.com/office/drawing/2010/main" type="tx" showMasterSp="0" showMasterPhAnim="1">
+<p:sldLayout xmlns:a="http://schemas.openxmlformats.org/drawingml/2006/main" xmlns:r="http://schemas.openxmlformats.org/officeDocument/2006/relationships" xmlns:p="http://schemas.openxmlformats.org/presentationml/2006/main" showMasterSp="0" type="tx">
   <p:cSld name="SECTION_TITLE_AND_DESCRIPTION">
     <p:spTree>
       <p:nvGrpSpPr>
@@ -1440,6 +1491,7 @@
                 </a:solidFill>
               </a:defRPr>
             </a:pPr>
+            <a:endParaRPr/>
           </a:p>
         </p:txBody>
       </p:sp>
@@ -1493,6 +1545,7 @@
                   </a:solidFill>
                 </a:defRPr>
               </a:pPr>
+              <a:endParaRPr/>
             </a:p>
           </p:txBody>
         </p:sp>
@@ -1532,6 +1585,7 @@
                   </a:solidFill>
                 </a:defRPr>
               </a:pPr>
+              <a:endParaRPr/>
             </a:p>
           </p:txBody>
         </p:sp>
@@ -1539,7 +1593,9 @@
       <p:sp>
         <p:nvSpPr>
           <p:cNvPr id="77" name="Title Text"/>
-          <p:cNvSpPr txBox="1"/>
+          <p:cNvSpPr txBox="1">
+            <a:spLocks noGrp="1"/>
+          </p:cNvSpPr>
           <p:nvPr>
             <p:ph type="title"/>
           </p:nvPr>
@@ -1557,7 +1613,6 @@
           <a:bodyPr/>
           <a:lstStyle/>
           <a:p>
-            <a:pPr/>
             <a:r>
               <a:t>Title Text</a:t>
             </a:r>
@@ -1567,7 +1622,9 @@
       <p:sp>
         <p:nvSpPr>
           <p:cNvPr id="78" name="Body Level One…"/>
-          <p:cNvSpPr txBox="1"/>
+          <p:cNvSpPr txBox="1">
+            <a:spLocks noGrp="1"/>
+          </p:cNvSpPr>
           <p:nvPr>
             <p:ph type="body" sz="quarter" idx="1"/>
           </p:nvPr>
@@ -1636,7 +1693,6 @@
             </a:lvl5pPr>
           </a:lstStyle>
           <a:p>
-            <a:pPr/>
             <a:r>
               <a:t>Body Level One</a:t>
             </a:r>
@@ -1670,7 +1726,9 @@
       <p:sp>
         <p:nvSpPr>
           <p:cNvPr id="79" name="Google Shape;68;p9"/>
-          <p:cNvSpPr txBox="1"/>
+          <p:cNvSpPr txBox="1">
+            <a:spLocks noGrp="1"/>
+          </p:cNvSpPr>
           <p:nvPr>
             <p:ph type="body" sz="half" idx="13"/>
           </p:nvPr>
@@ -1688,14 +1746,16 @@
           <a:bodyPr/>
           <a:lstStyle/>
           <a:p>
-            <a:pPr/>
+            <a:endParaRPr/>
           </a:p>
         </p:txBody>
       </p:sp>
       <p:sp>
         <p:nvSpPr>
           <p:cNvPr id="80" name="Slide Number"/>
-          <p:cNvSpPr txBox="1"/>
+          <p:cNvSpPr txBox="1">
+            <a:spLocks noGrp="1"/>
+          </p:cNvSpPr>
           <p:nvPr>
             <p:ph type="sldNum" sz="quarter" idx="2"/>
           </p:nvPr>
@@ -1709,8 +1769,10 @@
           <a:bodyPr/>
           <a:lstStyle/>
           <a:p>
-            <a:pPr/>
-            <a:fld id="{86CB4B4D-7CA3-9044-876B-883B54F8677D}" type="slidenum"/>
+            <a:fld id="{86CB4B4D-7CA3-9044-876B-883B54F8677D}" type="slidenum">
+              <a:t>‹#›</a:t>
+            </a:fld>
+            <a:endParaRPr/>
           </a:p>
         </p:txBody>
       </p:sp>
@@ -1719,12 +1781,12 @@
   <p:clrMapOvr>
     <a:masterClrMapping/>
   </p:clrMapOvr>
-  <p:transition xmlns:p14="http://schemas.microsoft.com/office/powerpoint/2010/main" spd="med" advClick="1"/>
+  <p:transition spd="med"/>
 </p:sldLayout>
 </file>
 
 <file path=ppt/slideLayouts/slideLayout8.xml><?xml version="1.0" encoding="utf-8"?>
-<p:sldLayout xmlns:a="http://schemas.openxmlformats.org/drawingml/2006/main" xmlns:r="http://schemas.openxmlformats.org/officeDocument/2006/relationships" xmlns:p="http://schemas.openxmlformats.org/presentationml/2006/main" xmlns:m="http://schemas.openxmlformats.org/officeDocument/2006/math" xmlns:a14="http://schemas.microsoft.com/office/drawing/2010/main" type="tx" showMasterSp="0" showMasterPhAnim="1">
+<p:sldLayout xmlns:a="http://schemas.openxmlformats.org/drawingml/2006/main" xmlns:r="http://schemas.openxmlformats.org/officeDocument/2006/relationships" xmlns:p="http://schemas.openxmlformats.org/presentationml/2006/main" showMasterSp="0" type="tx">
   <p:cSld name="CAPTION_ONLY">
     <p:spTree>
       <p:nvGrpSpPr>
@@ -1743,7 +1805,9 @@
       <p:sp>
         <p:nvSpPr>
           <p:cNvPr id="87" name="Body Level One…"/>
-          <p:cNvSpPr txBox="1"/>
+          <p:cNvSpPr txBox="1">
+            <a:spLocks noGrp="1"/>
+          </p:cNvSpPr>
           <p:nvPr>
             <p:ph type="body" sz="quarter" idx="1"/>
           </p:nvPr>
@@ -1799,7 +1863,6 @@
             </a:lvl5pPr>
           </a:lstStyle>
           <a:p>
-            <a:pPr/>
             <a:r>
               <a:t>Body Level One</a:t>
             </a:r>
@@ -1833,7 +1896,9 @@
       <p:sp>
         <p:nvSpPr>
           <p:cNvPr id="88" name="Slide Number"/>
-          <p:cNvSpPr txBox="1"/>
+          <p:cNvSpPr txBox="1">
+            <a:spLocks noGrp="1"/>
+          </p:cNvSpPr>
           <p:nvPr>
             <p:ph type="sldNum" sz="quarter" idx="2"/>
           </p:nvPr>
@@ -1847,8 +1912,10 @@
           <a:bodyPr/>
           <a:lstStyle/>
           <a:p>
-            <a:pPr/>
-            <a:fld id="{86CB4B4D-7CA3-9044-876B-883B54F8677D}" type="slidenum"/>
+            <a:fld id="{86CB4B4D-7CA3-9044-876B-883B54F8677D}" type="slidenum">
+              <a:t>‹#›</a:t>
+            </a:fld>
+            <a:endParaRPr/>
           </a:p>
         </p:txBody>
       </p:sp>
@@ -1857,18 +1924,19 @@
   <p:clrMapOvr>
     <a:masterClrMapping/>
   </p:clrMapOvr>
-  <p:transition xmlns:p14="http://schemas.microsoft.com/office/powerpoint/2010/main" spd="med" advClick="1"/>
+  <p:transition spd="med"/>
 </p:sldLayout>
 </file>
 
 <file path=ppt/slideLayouts/slideLayout9.xml><?xml version="1.0" encoding="utf-8"?>
-<p:sldLayout xmlns:a="http://schemas.openxmlformats.org/drawingml/2006/main" xmlns:r="http://schemas.openxmlformats.org/officeDocument/2006/relationships" xmlns:p="http://schemas.openxmlformats.org/presentationml/2006/main" xmlns:m="http://schemas.openxmlformats.org/officeDocument/2006/math" xmlns:a14="http://schemas.microsoft.com/office/drawing/2010/main" type="tx" showMasterSp="0" showMasterPhAnim="1">
+<p:sldLayout xmlns:a="http://schemas.openxmlformats.org/drawingml/2006/main" xmlns:r="http://schemas.openxmlformats.org/officeDocument/2006/relationships" xmlns:p="http://schemas.openxmlformats.org/presentationml/2006/main" showMasterSp="0" type="tx">
   <p:cSld name="BIG_NUMBER">
     <p:bg>
       <p:bgPr>
         <a:solidFill>
           <a:srgbClr val="1A9988"/>
         </a:solidFill>
+        <a:effectLst/>
       </p:bgPr>
     </p:bg>
     <p:spTree>
@@ -1935,6 +2003,7 @@
                   </a:solidFill>
                 </a:defRPr>
               </a:pPr>
+              <a:endParaRPr/>
             </a:p>
           </p:txBody>
         </p:sp>
@@ -1974,6 +2043,7 @@
                   </a:solidFill>
                 </a:defRPr>
               </a:pPr>
+              <a:endParaRPr/>
             </a:p>
           </p:txBody>
         </p:sp>
@@ -1981,7 +2051,9 @@
       <p:sp>
         <p:nvSpPr>
           <p:cNvPr id="98" name="Title Text"/>
-          <p:cNvSpPr txBox="1"/>
+          <p:cNvSpPr txBox="1">
+            <a:spLocks noGrp="1"/>
+          </p:cNvSpPr>
           <p:nvPr>
             <p:ph type="title"/>
           </p:nvPr>
@@ -2007,7 +2079,6 @@
             </a:lvl1pPr>
           </a:lstStyle>
           <a:p>
-            <a:pPr/>
             <a:r>
               <a:t>Title Text</a:t>
             </a:r>
@@ -2017,7 +2088,9 @@
       <p:sp>
         <p:nvSpPr>
           <p:cNvPr id="99" name="Body Level One…"/>
-          <p:cNvSpPr txBox="1"/>
+          <p:cNvSpPr txBox="1">
+            <a:spLocks noGrp="1"/>
+          </p:cNvSpPr>
           <p:nvPr>
             <p:ph type="body" sz="half" idx="1"/>
           </p:nvPr>
@@ -2086,7 +2159,6 @@
             </a:lvl5pPr>
           </a:lstStyle>
           <a:p>
-            <a:pPr/>
             <a:r>
               <a:t>Body Level One</a:t>
             </a:r>
@@ -2120,7 +2192,9 @@
       <p:sp>
         <p:nvSpPr>
           <p:cNvPr id="100" name="Slide Number"/>
-          <p:cNvSpPr txBox="1"/>
+          <p:cNvSpPr txBox="1">
+            <a:spLocks noGrp="1"/>
+          </p:cNvSpPr>
           <p:nvPr>
             <p:ph type="sldNum" sz="quarter" idx="2"/>
           </p:nvPr>
@@ -2142,8 +2216,10 @@
             </a:lvl1pPr>
           </a:lstStyle>
           <a:p>
-            <a:pPr/>
-            <a:fld id="{86CB4B4D-7CA3-9044-876B-883B54F8677D}" type="slidenum"/>
+            <a:fld id="{86CB4B4D-7CA3-9044-876B-883B54F8677D}" type="slidenum">
+              <a:t>‹#›</a:t>
+            </a:fld>
+            <a:endParaRPr/>
           </a:p>
         </p:txBody>
       </p:sp>
@@ -2152,18 +2228,19 @@
   <p:clrMapOvr>
     <a:masterClrMapping/>
   </p:clrMapOvr>
-  <p:transition xmlns:p14="http://schemas.microsoft.com/office/powerpoint/2010/main" spd="med" advClick="1"/>
+  <p:transition spd="med"/>
 </p:sldLayout>
 </file>
 
 <file path=ppt/slideMasters/slideMaster1.xml><?xml version="1.0" encoding="utf-8"?>
-<p:sldMaster xmlns:a="http://schemas.openxmlformats.org/drawingml/2006/main" xmlns:r="http://schemas.openxmlformats.org/officeDocument/2006/relationships" xmlns:p="http://schemas.openxmlformats.org/presentationml/2006/main" xmlns:m="http://schemas.openxmlformats.org/officeDocument/2006/math" xmlns:a14="http://schemas.microsoft.com/office/drawing/2010/main">
+<p:sldMaster xmlns:a="http://schemas.openxmlformats.org/drawingml/2006/main" xmlns:r="http://schemas.openxmlformats.org/officeDocument/2006/relationships" xmlns:p="http://schemas.openxmlformats.org/presentationml/2006/main">
   <p:cSld>
     <p:bg>
       <p:bgPr>
         <a:solidFill>
           <a:srgbClr val="FFFFFF"/>
         </a:solidFill>
+        <a:effectLst/>
       </p:bgPr>
     </p:bg>
     <p:spTree>
@@ -2212,6 +2289,7 @@
                 </a:solidFill>
               </a:defRPr>
             </a:pPr>
+            <a:endParaRPr/>
           </a:p>
         </p:txBody>
       </p:sp>
@@ -2265,6 +2343,7 @@
                   </a:solidFill>
                 </a:defRPr>
               </a:pPr>
+              <a:endParaRPr/>
             </a:p>
           </p:txBody>
         </p:sp>
@@ -2304,6 +2383,7 @@
                   </a:solidFill>
                 </a:defRPr>
               </a:pPr>
+              <a:endParaRPr/>
             </a:p>
           </p:txBody>
         </p:sp>
@@ -2311,7 +2391,9 @@
       <p:sp>
         <p:nvSpPr>
           <p:cNvPr id="6" name="Title Text"/>
-          <p:cNvSpPr txBox="1"/>
+          <p:cNvSpPr txBox="1">
+            <a:spLocks noGrp="1"/>
+          </p:cNvSpPr>
           <p:nvPr>
             <p:ph type="title"/>
           </p:nvPr>
@@ -2329,17 +2411,16 @@
           </a:ln>
           <a:extLst>
             <a:ext uri="{C572A759-6A51-4108-AA02-DFA0A04FC94B}">
-              <ma14:wrappingTextBoxFlag xmlns:ma14="http://schemas.microsoft.com/office/mac/drawingml/2011/main" val="1"/>
+              <ma14:wrappingTextBoxFlag xmlns:ma14="http://schemas.microsoft.com/office/mac/drawingml/2011/main" xmlns:a14="http://schemas.microsoft.com/office/drawing/2010/main" xmlns:m="http://schemas.openxmlformats.org/officeDocument/2006/math" xmlns="" val="1"/>
             </a:ext>
           </a:extLst>
         </p:spPr>
         <p:txBody>
           <a:bodyPr lIns="91423" tIns="91423" rIns="91423" bIns="91423">
-            <a:normAutofit fontScale="100000" lnSpcReduction="0"/>
+            <a:normAutofit/>
           </a:bodyPr>
           <a:lstStyle/>
           <a:p>
-            <a:pPr/>
             <a:r>
               <a:t>Title Text</a:t>
             </a:r>
@@ -2349,7 +2430,9 @@
       <p:sp>
         <p:nvSpPr>
           <p:cNvPr id="7" name="Body Level One…"/>
-          <p:cNvSpPr txBox="1"/>
+          <p:cNvSpPr txBox="1">
+            <a:spLocks noGrp="1"/>
+          </p:cNvSpPr>
           <p:nvPr>
             <p:ph type="body" idx="1"/>
           </p:nvPr>
@@ -2367,17 +2450,16 @@
           </a:ln>
           <a:extLst>
             <a:ext uri="{C572A759-6A51-4108-AA02-DFA0A04FC94B}">
-              <ma14:wrappingTextBoxFlag xmlns:ma14="http://schemas.microsoft.com/office/mac/drawingml/2011/main" val="1"/>
+              <ma14:wrappingTextBoxFlag xmlns:ma14="http://schemas.microsoft.com/office/mac/drawingml/2011/main" xmlns:a14="http://schemas.microsoft.com/office/drawing/2010/main" xmlns:m="http://schemas.openxmlformats.org/officeDocument/2006/math" xmlns="" val="1"/>
             </a:ext>
           </a:extLst>
         </p:spPr>
         <p:txBody>
           <a:bodyPr lIns="91423" tIns="91423" rIns="91423" bIns="91423">
-            <a:normAutofit fontScale="100000" lnSpcReduction="0"/>
+            <a:normAutofit/>
           </a:bodyPr>
           <a:lstStyle/>
           <a:p>
-            <a:pPr/>
             <a:r>
               <a:t>Body Level One</a:t>
             </a:r>
@@ -2411,7 +2493,9 @@
       <p:sp>
         <p:nvSpPr>
           <p:cNvPr id="8" name="Slide Number"/>
-          <p:cNvSpPr txBox="1"/>
+          <p:cNvSpPr txBox="1">
+            <a:spLocks noGrp="1"/>
+          </p:cNvSpPr>
           <p:nvPr>
             <p:ph type="sldNum" sz="quarter" idx="2"/>
           </p:nvPr>
@@ -2446,8 +2530,10 @@
             </a:lvl1pPr>
           </a:lstStyle>
           <a:p>
-            <a:pPr/>
-            <a:fld id="{86CB4B4D-7CA3-9044-876B-883B54F8677D}" type="slidenum"/>
+            <a:fld id="{86CB4B4D-7CA3-9044-876B-883B54F8677D}" type="slidenum">
+              <a:t>‹#›</a:t>
+            </a:fld>
+            <a:endParaRPr/>
           </a:p>
         </p:txBody>
       </p:sp>
@@ -2455,18 +2541,18 @@
   </p:cSld>
   <p:clrMap bg1="dk1" tx1="lt1" bg2="dk2" tx2="lt2" accent1="accent1" accent2="accent2" accent3="accent3" accent4="accent4" accent5="accent5" accent6="accent6" hlink="hlink" folHlink="folHlink"/>
   <p:sldLayoutIdLst>
-    <p:sldLayoutId id="2147483649" r:id="rId2"/>
-    <p:sldLayoutId id="2147483650" r:id="rId3"/>
-    <p:sldLayoutId id="2147483651" r:id="rId4"/>
-    <p:sldLayoutId id="2147483652" r:id="rId5"/>
-    <p:sldLayoutId id="2147483653" r:id="rId6"/>
-    <p:sldLayoutId id="2147483654" r:id="rId7"/>
-    <p:sldLayoutId id="2147483655" r:id="rId8"/>
-    <p:sldLayoutId id="2147483656" r:id="rId9"/>
-    <p:sldLayoutId id="2147483657" r:id="rId10"/>
-    <p:sldLayoutId id="2147483658" r:id="rId11"/>
+    <p:sldLayoutId id="2147483649" r:id="rId1"/>
+    <p:sldLayoutId id="2147483650" r:id="rId2"/>
+    <p:sldLayoutId id="2147483651" r:id="rId3"/>
+    <p:sldLayoutId id="2147483652" r:id="rId4"/>
+    <p:sldLayoutId id="2147483653" r:id="rId5"/>
+    <p:sldLayoutId id="2147483654" r:id="rId6"/>
+    <p:sldLayoutId id="2147483655" r:id="rId7"/>
+    <p:sldLayoutId id="2147483656" r:id="rId8"/>
+    <p:sldLayoutId id="2147483657" r:id="rId9"/>
+    <p:sldLayoutId id="2147483658" r:id="rId10"/>
   </p:sldLayoutIdLst>
-  <p:transition xmlns:p14="http://schemas.microsoft.com/office/powerpoint/2010/main" spd="med" advClick="1"/>
+  <p:transition spd="med"/>
   <p:txStyles>
     <p:titleStyle>
       <a:lvl1pPr marL="0" marR="0" indent="0" algn="l" defTabSz="914400" rtl="0" latinLnBrk="0">
@@ -2484,7 +2570,7 @@
         <a:buFontTx/>
         <a:buNone/>
         <a:tabLst/>
-        <a:defRPr b="1" baseline="0" cap="none" i="0" spc="0" strike="noStrike" sz="2600" u="none">
+        <a:defRPr sz="2600" b="1" i="0" u="none" strike="noStrike" cap="none" spc="0" baseline="0">
           <a:ln>
             <a:noFill/>
           </a:ln>
@@ -2513,7 +2599,7 @@
         <a:buFontTx/>
         <a:buNone/>
         <a:tabLst/>
-        <a:defRPr b="1" baseline="0" cap="none" i="0" spc="0" strike="noStrike" sz="2600" u="none">
+        <a:defRPr sz="2600" b="1" i="0" u="none" strike="noStrike" cap="none" spc="0" baseline="0">
           <a:ln>
             <a:noFill/>
           </a:ln>
@@ -2542,7 +2628,7 @@
         <a:buFontTx/>
         <a:buNone/>
         <a:tabLst/>
-        <a:defRPr b="1" baseline="0" cap="none" i="0" spc="0" strike="noStrike" sz="2600" u="none">
+        <a:defRPr sz="2600" b="1" i="0" u="none" strike="noStrike" cap="none" spc="0" baseline="0">
           <a:ln>
             <a:noFill/>
           </a:ln>
@@ -2571,7 +2657,7 @@
         <a:buFontTx/>
         <a:buNone/>
         <a:tabLst/>
-        <a:defRPr b="1" baseline="0" cap="none" i="0" spc="0" strike="noStrike" sz="2600" u="none">
+        <a:defRPr sz="2600" b="1" i="0" u="none" strike="noStrike" cap="none" spc="0" baseline="0">
           <a:ln>
             <a:noFill/>
           </a:ln>
@@ -2600,7 +2686,7 @@
         <a:buFontTx/>
         <a:buNone/>
         <a:tabLst/>
-        <a:defRPr b="1" baseline="0" cap="none" i="0" spc="0" strike="noStrike" sz="2600" u="none">
+        <a:defRPr sz="2600" b="1" i="0" u="none" strike="noStrike" cap="none" spc="0" baseline="0">
           <a:ln>
             <a:noFill/>
           </a:ln>
@@ -2629,7 +2715,7 @@
         <a:buFontTx/>
         <a:buNone/>
         <a:tabLst/>
-        <a:defRPr b="1" baseline="0" cap="none" i="0" spc="0" strike="noStrike" sz="2600" u="none">
+        <a:defRPr sz="2600" b="1" i="0" u="none" strike="noStrike" cap="none" spc="0" baseline="0">
           <a:ln>
             <a:noFill/>
           </a:ln>
@@ -2658,7 +2744,7 @@
         <a:buFontTx/>
         <a:buNone/>
         <a:tabLst/>
-        <a:defRPr b="1" baseline="0" cap="none" i="0" spc="0" strike="noStrike" sz="2600" u="none">
+        <a:defRPr sz="2600" b="1" i="0" u="none" strike="noStrike" cap="none" spc="0" baseline="0">
           <a:ln>
             <a:noFill/>
           </a:ln>
@@ -2687,7 +2773,7 @@
         <a:buFontTx/>
         <a:buNone/>
         <a:tabLst/>
-        <a:defRPr b="1" baseline="0" cap="none" i="0" spc="0" strike="noStrike" sz="2600" u="none">
+        <a:defRPr sz="2600" b="1" i="0" u="none" strike="noStrike" cap="none" spc="0" baseline="0">
           <a:ln>
             <a:noFill/>
           </a:ln>
@@ -2716,7 +2802,7 @@
         <a:buFontTx/>
         <a:buNone/>
         <a:tabLst/>
-        <a:defRPr b="1" baseline="0" cap="none" i="0" spc="0" strike="noStrike" sz="2600" u="none">
+        <a:defRPr sz="2600" b="1" i="0" u="none" strike="noStrike" cap="none" spc="0" baseline="0">
           <a:ln>
             <a:noFill/>
           </a:ln>
@@ -2749,7 +2835,7 @@
         <a:buFont typeface="Helvetica"/>
         <a:buChar char="●"/>
         <a:tabLst/>
-        <a:defRPr b="0" baseline="0" cap="none" i="0" spc="0" strike="noStrike" sz="1300" u="none">
+        <a:defRPr sz="1300" b="0" i="0" u="none" strike="noStrike" cap="none" spc="0" baseline="0">
           <a:ln>
             <a:noFill/>
           </a:ln>
@@ -2780,7 +2866,7 @@
         <a:buFont typeface="Helvetica"/>
         <a:buChar char="○"/>
         <a:tabLst/>
-        <a:defRPr b="0" baseline="0" cap="none" i="0" spc="0" strike="noStrike" sz="1300" u="none">
+        <a:defRPr sz="1300" b="0" i="0" u="none" strike="noStrike" cap="none" spc="0" baseline="0">
           <a:ln>
             <a:noFill/>
           </a:ln>
@@ -2811,7 +2897,7 @@
         <a:buFont typeface="Helvetica"/>
         <a:buChar char="■"/>
         <a:tabLst/>
-        <a:defRPr b="0" baseline="0" cap="none" i="0" spc="0" strike="noStrike" sz="1300" u="none">
+        <a:defRPr sz="1300" b="0" i="0" u="none" strike="noStrike" cap="none" spc="0" baseline="0">
           <a:ln>
             <a:noFill/>
           </a:ln>
@@ -2842,7 +2928,7 @@
         <a:buFont typeface="Helvetica"/>
         <a:buChar char="●"/>
         <a:tabLst/>
-        <a:defRPr b="0" baseline="0" cap="none" i="0" spc="0" strike="noStrike" sz="1300" u="none">
+        <a:defRPr sz="1300" b="0" i="0" u="none" strike="noStrike" cap="none" spc="0" baseline="0">
           <a:ln>
             <a:noFill/>
           </a:ln>
@@ -2873,7 +2959,7 @@
         <a:buFont typeface="Helvetica"/>
         <a:buChar char="○"/>
         <a:tabLst/>
-        <a:defRPr b="0" baseline="0" cap="none" i="0" spc="0" strike="noStrike" sz="1300" u="none">
+        <a:defRPr sz="1300" b="0" i="0" u="none" strike="noStrike" cap="none" spc="0" baseline="0">
           <a:ln>
             <a:noFill/>
           </a:ln>
@@ -2904,7 +2990,7 @@
         <a:buFont typeface="Helvetica"/>
         <a:buChar char="■"/>
         <a:tabLst/>
-        <a:defRPr b="0" baseline="0" cap="none" i="0" spc="0" strike="noStrike" sz="1300" u="none">
+        <a:defRPr sz="1300" b="0" i="0" u="none" strike="noStrike" cap="none" spc="0" baseline="0">
           <a:ln>
             <a:noFill/>
           </a:ln>
@@ -2935,7 +3021,7 @@
         <a:buFont typeface="Helvetica"/>
         <a:buChar char="●"/>
         <a:tabLst/>
-        <a:defRPr b="0" baseline="0" cap="none" i="0" spc="0" strike="noStrike" sz="1300" u="none">
+        <a:defRPr sz="1300" b="0" i="0" u="none" strike="noStrike" cap="none" spc="0" baseline="0">
           <a:ln>
             <a:noFill/>
           </a:ln>
@@ -2966,7 +3052,7 @@
         <a:buFont typeface="Helvetica"/>
         <a:buChar char="○"/>
         <a:tabLst/>
-        <a:defRPr b="0" baseline="0" cap="none" i="0" spc="0" strike="noStrike" sz="1300" u="none">
+        <a:defRPr sz="1300" b="0" i="0" u="none" strike="noStrike" cap="none" spc="0" baseline="0">
           <a:ln>
             <a:noFill/>
           </a:ln>
@@ -2997,7 +3083,7 @@
         <a:buFont typeface="Helvetica"/>
         <a:buChar char="■"/>
         <a:tabLst/>
-        <a:defRPr b="0" baseline="0" cap="none" i="0" spc="0" strike="noStrike" sz="1300" u="none">
+        <a:defRPr sz="1300" b="0" i="0" u="none" strike="noStrike" cap="none" spc="0" baseline="0">
           <a:ln>
             <a:noFill/>
           </a:ln>
@@ -3028,7 +3114,7 @@
         <a:buFontTx/>
         <a:buNone/>
         <a:tabLst/>
-        <a:defRPr b="0" baseline="0" cap="none" i="0" spc="0" strike="noStrike" sz="1000" u="none">
+        <a:defRPr sz="1000" b="0" i="0" u="none" strike="noStrike" cap="none" spc="0" baseline="0">
           <a:ln>
             <a:noFill/>
           </a:ln>
@@ -3057,7 +3143,7 @@
         <a:buFontTx/>
         <a:buNone/>
         <a:tabLst/>
-        <a:defRPr b="0" baseline="0" cap="none" i="0" spc="0" strike="noStrike" sz="1000" u="none">
+        <a:defRPr sz="1000" b="0" i="0" u="none" strike="noStrike" cap="none" spc="0" baseline="0">
           <a:ln>
             <a:noFill/>
           </a:ln>
@@ -3086,7 +3172,7 @@
         <a:buFontTx/>
         <a:buNone/>
         <a:tabLst/>
-        <a:defRPr b="0" baseline="0" cap="none" i="0" spc="0" strike="noStrike" sz="1000" u="none">
+        <a:defRPr sz="1000" b="0" i="0" u="none" strike="noStrike" cap="none" spc="0" baseline="0">
           <a:ln>
             <a:noFill/>
           </a:ln>
@@ -3115,7 +3201,7 @@
         <a:buFontTx/>
         <a:buNone/>
         <a:tabLst/>
-        <a:defRPr b="0" baseline="0" cap="none" i="0" spc="0" strike="noStrike" sz="1000" u="none">
+        <a:defRPr sz="1000" b="0" i="0" u="none" strike="noStrike" cap="none" spc="0" baseline="0">
           <a:ln>
             <a:noFill/>
           </a:ln>
@@ -3144,7 +3230,7 @@
         <a:buFontTx/>
         <a:buNone/>
         <a:tabLst/>
-        <a:defRPr b="0" baseline="0" cap="none" i="0" spc="0" strike="noStrike" sz="1000" u="none">
+        <a:defRPr sz="1000" b="0" i="0" u="none" strike="noStrike" cap="none" spc="0" baseline="0">
           <a:ln>
             <a:noFill/>
           </a:ln>
@@ -3173,7 +3259,7 @@
         <a:buFontTx/>
         <a:buNone/>
         <a:tabLst/>
-        <a:defRPr b="0" baseline="0" cap="none" i="0" spc="0" strike="noStrike" sz="1000" u="none">
+        <a:defRPr sz="1000" b="0" i="0" u="none" strike="noStrike" cap="none" spc="0" baseline="0">
           <a:ln>
             <a:noFill/>
           </a:ln>
@@ -3202,7 +3288,7 @@
         <a:buFontTx/>
         <a:buNone/>
         <a:tabLst/>
-        <a:defRPr b="0" baseline="0" cap="none" i="0" spc="0" strike="noStrike" sz="1000" u="none">
+        <a:defRPr sz="1000" b="0" i="0" u="none" strike="noStrike" cap="none" spc="0" baseline="0">
           <a:ln>
             <a:noFill/>
           </a:ln>
@@ -3231,7 +3317,7 @@
         <a:buFontTx/>
         <a:buNone/>
         <a:tabLst/>
-        <a:defRPr b="0" baseline="0" cap="none" i="0" spc="0" strike="noStrike" sz="1000" u="none">
+        <a:defRPr sz="1000" b="0" i="0" u="none" strike="noStrike" cap="none" spc="0" baseline="0">
           <a:ln>
             <a:noFill/>
           </a:ln>
@@ -3260,7 +3346,7 @@
         <a:buFontTx/>
         <a:buNone/>
         <a:tabLst/>
-        <a:defRPr b="0" baseline="0" cap="none" i="0" spc="0" strike="noStrike" sz="1000" u="none">
+        <a:defRPr sz="1000" b="0" i="0" u="none" strike="noStrike" cap="none" spc="0" baseline="0">
           <a:ln>
             <a:noFill/>
           </a:ln>
@@ -3280,7 +3366,7 @@
 </file>
 
 <file path=ppt/slides/slide1.xml><?xml version="1.0" encoding="utf-8"?>
-<p:sld xmlns:a="http://schemas.openxmlformats.org/drawingml/2006/main" xmlns:r="http://schemas.openxmlformats.org/officeDocument/2006/relationships" xmlns:p="http://schemas.openxmlformats.org/presentationml/2006/main" xmlns:m="http://schemas.openxmlformats.org/officeDocument/2006/math" xmlns:a14="http://schemas.microsoft.com/office/drawing/2010/main" showMasterSp="1" showMasterPhAnim="1">
+<p:sld xmlns:a="http://schemas.openxmlformats.org/drawingml/2006/main" xmlns:r="http://schemas.openxmlformats.org/officeDocument/2006/relationships" xmlns:p="http://schemas.openxmlformats.org/presentationml/2006/main">
   <p:cSld>
     <p:spTree>
       <p:nvGrpSpPr>
@@ -3299,7 +3385,9 @@
       <p:sp>
         <p:nvSpPr>
           <p:cNvPr id="116" name="Title 1"/>
-          <p:cNvSpPr txBox="1"/>
+          <p:cNvSpPr txBox="1">
+            <a:spLocks noGrp="1"/>
+          </p:cNvSpPr>
           <p:nvPr>
             <p:ph type="title"/>
           </p:nvPr>
@@ -3324,6 +3412,7 @@
               <a:t>Python </a:t>
             </a:r>
             <a:br/>
+            <a:endParaRPr/>
           </a:p>
         </p:txBody>
       </p:sp>
@@ -3346,7 +3435,7 @@
           </a:ln>
           <a:extLst>
             <a:ext uri="{C572A759-6A51-4108-AA02-DFA0A04FC94B}">
-              <ma14:wrappingTextBoxFlag xmlns:ma14="http://schemas.microsoft.com/office/mac/drawingml/2011/main" val="1"/>
+              <ma14:wrappingTextBoxFlag xmlns:ma14="http://schemas.microsoft.com/office/mac/drawingml/2011/main" xmlns:a14="http://schemas.microsoft.com/office/drawing/2010/main" xmlns:m="http://schemas.openxmlformats.org/officeDocument/2006/math" xmlns="" val="1"/>
             </a:ext>
           </a:extLst>
         </p:spPr>
@@ -3356,7 +3445,7 @@
           </a:bodyPr>
           <a:lstStyle>
             <a:lvl1pPr>
-              <a:defRPr b="1" sz="3200">
+              <a:defRPr sz="3200" b="1">
                 <a:solidFill>
                   <a:srgbClr val="1A1A1A"/>
                 </a:solidFill>
@@ -3368,7 +3457,6 @@
             </a:lvl1pPr>
           </a:lstStyle>
           <a:p>
-            <a:pPr/>
             <a:r>
               <a:t>Sequences</a:t>
             </a:r>
@@ -3380,12 +3468,12 @@
   <p:clrMapOvr>
     <a:masterClrMapping/>
   </p:clrMapOvr>
-  <p:transition xmlns:p14="http://schemas.microsoft.com/office/powerpoint/2010/main" spd="med" advClick="1"/>
+  <p:transition spd="med"/>
 </p:sld>
 </file>
 
 <file path=ppt/slides/slide10.xml><?xml version="1.0" encoding="utf-8"?>
-<p:sld xmlns:a="http://schemas.openxmlformats.org/drawingml/2006/main" xmlns:r="http://schemas.openxmlformats.org/officeDocument/2006/relationships" xmlns:p="http://schemas.openxmlformats.org/presentationml/2006/main" xmlns:m="http://schemas.openxmlformats.org/officeDocument/2006/math" xmlns:a14="http://schemas.microsoft.com/office/drawing/2010/main" showMasterSp="1" showMasterPhAnim="1">
+<p:sld xmlns:a="http://schemas.openxmlformats.org/drawingml/2006/main" xmlns:r="http://schemas.openxmlformats.org/officeDocument/2006/relationships" xmlns:p="http://schemas.openxmlformats.org/presentationml/2006/main">
   <p:cSld>
     <p:spTree>
       <p:nvGrpSpPr>
@@ -3403,8 +3491,10 @@
       </p:grpSpPr>
       <p:sp>
         <p:nvSpPr>
-          <p:cNvPr id="147" name="Delete an item from list"/>
-          <p:cNvSpPr txBox="1"/>
+          <p:cNvPr id="144" name="Update a list"/>
+          <p:cNvSpPr txBox="1">
+            <a:spLocks noGrp="1"/>
+          </p:cNvSpPr>
           <p:nvPr>
             <p:ph type="title"/>
           </p:nvPr>
@@ -3426,17 +3516,18 @@
             </a:lvl1pPr>
           </a:lstStyle>
           <a:p>
-            <a:pPr/>
-            <a:r>
-              <a:t>Delete an item from list</a:t>
+            <a:r>
+              <a:t>Update a list</a:t>
             </a:r>
           </a:p>
         </p:txBody>
       </p:sp>
       <p:sp>
         <p:nvSpPr>
-          <p:cNvPr id="148" name="&gt;&gt;&gt;del list[2];…"/>
-          <p:cNvSpPr txBox="1"/>
+          <p:cNvPr id="145" name="&gt;&gt;&gt; list=[1,2,3]…"/>
+          <p:cNvSpPr txBox="1">
+            <a:spLocks noGrp="1"/>
+          </p:cNvSpPr>
           <p:nvPr>
             <p:ph type="body" sz="half" idx="1"/>
           </p:nvPr>
@@ -3461,7 +3552,7 @@
             <a:round/>
           </a:ln>
           <a:effectLst>
-            <a:outerShdw sx="100000" sy="100000" kx="0" ky="0" algn="b" rotWithShape="0" blurRad="38100" dist="23000" dir="5400000">
+            <a:outerShdw blurRad="38100" dist="23000" dir="5400000" rotWithShape="0">
               <a:srgbClr val="000000">
                 <a:alpha val="35000"/>
               </a:srgbClr>
@@ -3489,7 +3580,7 @@
               </a:defRPr>
             </a:pPr>
             <a:r>
-              <a:t>&gt;&gt;&gt;del list[2];</a:t>
+              <a:t>&gt;&gt;&gt; list=[1,2,3]</a:t>
             </a:r>
           </a:p>
           <a:p>
@@ -3510,7 +3601,7 @@
               </a:defRPr>
             </a:pPr>
             <a:r>
-              <a:t>&gt;&gt;&gt; list</a:t>
+              <a:t>&gt;&gt;&gt; list[1]=0</a:t>
             </a:r>
           </a:p>
           <a:p>
@@ -3531,7 +3622,28 @@
               </a:defRPr>
             </a:pPr>
             <a:r>
-              <a:t>&gt;&gt;&gt; [1,3]</a:t>
+              <a:t>&gt;&gt;&gt; list</a:t>
+            </a:r>
+          </a:p>
+          <a:p>
+            <a:pPr marL="0" indent="0">
+              <a:lnSpc>
+                <a:spcPct val="100000"/>
+              </a:lnSpc>
+              <a:buSzTx/>
+              <a:buNone/>
+              <a:defRPr sz="1400">
+                <a:solidFill>
+                  <a:srgbClr val="FFFFFF"/>
+                </a:solidFill>
+                <a:latin typeface="+mj-lt"/>
+                <a:ea typeface="+mj-ea"/>
+                <a:cs typeface="+mj-cs"/>
+                <a:sym typeface="Arial"/>
+              </a:defRPr>
+            </a:pPr>
+            <a:r>
+              <a:t>[1,0,3]</a:t>
             </a:r>
           </a:p>
         </p:txBody>
@@ -3541,12 +3653,12 @@
   <p:clrMapOvr>
     <a:masterClrMapping/>
   </p:clrMapOvr>
-  <p:transition xmlns:p14="http://schemas.microsoft.com/office/powerpoint/2010/main" spd="med" advClick="1"/>
+  <p:transition spd="med"/>
 </p:sld>
 </file>
 
 <file path=ppt/slides/slide11.xml><?xml version="1.0" encoding="utf-8"?>
-<p:sld xmlns:a="http://schemas.openxmlformats.org/drawingml/2006/main" xmlns:r="http://schemas.openxmlformats.org/officeDocument/2006/relationships" xmlns:p="http://schemas.openxmlformats.org/presentationml/2006/main" xmlns:m="http://schemas.openxmlformats.org/officeDocument/2006/math" xmlns:a14="http://schemas.microsoft.com/office/drawing/2010/main" showMasterSp="1" showMasterPhAnim="1">
+<p:sld xmlns:a="http://schemas.openxmlformats.org/drawingml/2006/main" xmlns:r="http://schemas.openxmlformats.org/officeDocument/2006/relationships" xmlns:p="http://schemas.openxmlformats.org/presentationml/2006/main">
   <p:cSld>
     <p:spTree>
       <p:nvGrpSpPr>
@@ -3564,8 +3676,10 @@
       </p:grpSpPr>
       <p:sp>
         <p:nvSpPr>
-          <p:cNvPr id="150" name="Length"/>
-          <p:cNvSpPr txBox="1"/>
+          <p:cNvPr id="147" name="Delete an item from list"/>
+          <p:cNvSpPr txBox="1">
+            <a:spLocks noGrp="1"/>
+          </p:cNvSpPr>
           <p:nvPr>
             <p:ph type="title"/>
           </p:nvPr>
@@ -3587,7 +3701,170 @@
             </a:lvl1pPr>
           </a:lstStyle>
           <a:p>
-            <a:pPr/>
+            <a:r>
+              <a:t>Delete an item from list</a:t>
+            </a:r>
+          </a:p>
+        </p:txBody>
+      </p:sp>
+      <p:sp>
+        <p:nvSpPr>
+          <p:cNvPr id="148" name="&gt;&gt;&gt;del list[2];…"/>
+          <p:cNvSpPr txBox="1">
+            <a:spLocks noGrp="1"/>
+          </p:cNvSpPr>
+          <p:nvPr>
+            <p:ph type="body" sz="half" idx="1"/>
+          </p:nvPr>
+        </p:nvSpPr>
+        <p:spPr>
+          <a:xfrm>
+            <a:off x="729450" y="2078875"/>
+            <a:ext cx="7688699" cy="2261101"/>
+          </a:xfrm>
+          <a:prstGeom prst="rect">
+            <a:avLst/>
+          </a:prstGeom>
+          <a:solidFill>
+            <a:schemeClr val="accent1">
+              <a:lumOff val="-6980"/>
+            </a:schemeClr>
+          </a:solidFill>
+          <a:ln w="9525">
+            <a:solidFill>
+              <a:srgbClr val="193477"/>
+            </a:solidFill>
+            <a:round/>
+          </a:ln>
+          <a:effectLst>
+            <a:outerShdw blurRad="38100" dist="23000" dir="5400000" rotWithShape="0">
+              <a:srgbClr val="000000">
+                <a:alpha val="35000"/>
+              </a:srgbClr>
+            </a:outerShdw>
+          </a:effectLst>
+        </p:spPr>
+        <p:txBody>
+          <a:bodyPr/>
+          <a:lstStyle/>
+          <a:p>
+            <a:pPr marL="0" indent="0">
+              <a:lnSpc>
+                <a:spcPct val="100000"/>
+              </a:lnSpc>
+              <a:buSzTx/>
+              <a:buNone/>
+              <a:defRPr sz="1400">
+                <a:solidFill>
+                  <a:srgbClr val="FFFFFF"/>
+                </a:solidFill>
+                <a:latin typeface="+mj-lt"/>
+                <a:ea typeface="+mj-ea"/>
+                <a:cs typeface="+mj-cs"/>
+                <a:sym typeface="Arial"/>
+              </a:defRPr>
+            </a:pPr>
+            <a:r>
+              <a:t>&gt;&gt;&gt;del list[2];</a:t>
+            </a:r>
+          </a:p>
+          <a:p>
+            <a:pPr marL="0" indent="0">
+              <a:lnSpc>
+                <a:spcPct val="100000"/>
+              </a:lnSpc>
+              <a:buSzTx/>
+              <a:buNone/>
+              <a:defRPr sz="1400">
+                <a:solidFill>
+                  <a:srgbClr val="FFFFFF"/>
+                </a:solidFill>
+                <a:latin typeface="+mj-lt"/>
+                <a:ea typeface="+mj-ea"/>
+                <a:cs typeface="+mj-cs"/>
+                <a:sym typeface="Arial"/>
+              </a:defRPr>
+            </a:pPr>
+            <a:r>
+              <a:t>&gt;&gt;&gt; list</a:t>
+            </a:r>
+          </a:p>
+          <a:p>
+            <a:pPr marL="0" indent="0">
+              <a:lnSpc>
+                <a:spcPct val="100000"/>
+              </a:lnSpc>
+              <a:buSzTx/>
+              <a:buNone/>
+              <a:defRPr sz="1400">
+                <a:solidFill>
+                  <a:srgbClr val="FFFFFF"/>
+                </a:solidFill>
+                <a:latin typeface="+mj-lt"/>
+                <a:ea typeface="+mj-ea"/>
+                <a:cs typeface="+mj-cs"/>
+                <a:sym typeface="Arial"/>
+              </a:defRPr>
+            </a:pPr>
+            <a:r>
+              <a:t>&gt;&gt;&gt; [1,3]</a:t>
+            </a:r>
+          </a:p>
+        </p:txBody>
+      </p:sp>
+    </p:spTree>
+  </p:cSld>
+  <p:clrMapOvr>
+    <a:masterClrMapping/>
+  </p:clrMapOvr>
+  <p:transition spd="med"/>
+</p:sld>
+</file>
+
+<file path=ppt/slides/slide12.xml><?xml version="1.0" encoding="utf-8"?>
+<p:sld xmlns:a="http://schemas.openxmlformats.org/drawingml/2006/main" xmlns:r="http://schemas.openxmlformats.org/officeDocument/2006/relationships" xmlns:p="http://schemas.openxmlformats.org/presentationml/2006/main">
+  <p:cSld>
+    <p:spTree>
+      <p:nvGrpSpPr>
+        <p:cNvPr id="1" name=""/>
+        <p:cNvGrpSpPr/>
+        <p:nvPr/>
+      </p:nvGrpSpPr>
+      <p:grpSpPr>
+        <a:xfrm>
+          <a:off x="0" y="0"/>
+          <a:ext cx="0" cy="0"/>
+          <a:chOff x="0" y="0"/>
+          <a:chExt cx="0" cy="0"/>
+        </a:xfrm>
+      </p:grpSpPr>
+      <p:sp>
+        <p:nvSpPr>
+          <p:cNvPr id="150" name="Length"/>
+          <p:cNvSpPr txBox="1">
+            <a:spLocks noGrp="1"/>
+          </p:cNvSpPr>
+          <p:nvPr>
+            <p:ph type="title"/>
+          </p:nvPr>
+        </p:nvSpPr>
+        <p:spPr>
+          <a:xfrm>
+            <a:off x="729450" y="1318650"/>
+            <a:ext cx="7688699" cy="535202"/>
+          </a:xfrm>
+          <a:prstGeom prst="rect">
+            <a:avLst/>
+          </a:prstGeom>
+        </p:spPr>
+        <p:txBody>
+          <a:bodyPr/>
+          <a:lstStyle>
+            <a:lvl1pPr defTabSz="795527">
+              <a:defRPr sz="2200"/>
+            </a:lvl1pPr>
+          </a:lstStyle>
+          <a:p>
             <a:r>
               <a:t>Length</a:t>
             </a:r>
@@ -3597,7 +3874,9 @@
       <p:sp>
         <p:nvSpPr>
           <p:cNvPr id="151" name="&gt;&gt;&gt; len(list)…"/>
-          <p:cNvSpPr txBox="1"/>
+          <p:cNvSpPr txBox="1">
+            <a:spLocks noGrp="1"/>
+          </p:cNvSpPr>
           <p:nvPr>
             <p:ph type="body" sz="quarter" idx="1"/>
           </p:nvPr>
@@ -3622,7 +3901,7 @@
             <a:round/>
           </a:ln>
           <a:effectLst>
-            <a:outerShdw sx="100000" sy="100000" kx="0" ky="0" algn="b" rotWithShape="0" blurRad="38100" dist="23000" dir="5400000">
+            <a:outerShdw blurRad="38100" dist="23000" dir="5400000" rotWithShape="0">
               <a:srgbClr val="000000">
                 <a:alpha val="35000"/>
               </a:srgbClr>
@@ -3695,13 +3974,13 @@
           </a:ln>
           <a:extLst>
             <a:ext uri="{C572A759-6A51-4108-AA02-DFA0A04FC94B}">
-              <ma14:wrappingTextBoxFlag xmlns:ma14="http://schemas.microsoft.com/office/mac/drawingml/2011/main" val="1"/>
+              <ma14:wrappingTextBoxFlag xmlns:ma14="http://schemas.microsoft.com/office/mac/drawingml/2011/main" xmlns:a14="http://schemas.microsoft.com/office/drawing/2010/main" xmlns:m="http://schemas.openxmlformats.org/officeDocument/2006/math" xmlns="" val="1"/>
             </a:ext>
           </a:extLst>
         </p:spPr>
         <p:txBody>
           <a:bodyPr lIns="91423" tIns="91423" rIns="91423" bIns="91423">
-            <a:normAutofit fontScale="100000" lnSpcReduction="0"/>
+            <a:normAutofit/>
           </a:bodyPr>
           <a:lstStyle>
             <a:lvl1pPr>
@@ -3715,7 +3994,6 @@
             </a:lvl1pPr>
           </a:lstStyle>
           <a:p>
-            <a:pPr/>
             <a:r>
               <a:t>Length of list can be found by passing it len function</a:t>
             </a:r>
@@ -3727,12 +4005,12 @@
   <p:clrMapOvr>
     <a:masterClrMapping/>
   </p:clrMapOvr>
-  <p:transition xmlns:p14="http://schemas.microsoft.com/office/powerpoint/2010/main" spd="med" advClick="1"/>
+  <p:transition spd="med"/>
 </p:sld>
 </file>
 
-<file path=ppt/slides/slide12.xml><?xml version="1.0" encoding="utf-8"?>
-<p:sld xmlns:a="http://schemas.openxmlformats.org/drawingml/2006/main" xmlns:r="http://schemas.openxmlformats.org/officeDocument/2006/relationships" xmlns:p="http://schemas.openxmlformats.org/presentationml/2006/main" xmlns:m="http://schemas.openxmlformats.org/officeDocument/2006/math" xmlns:a14="http://schemas.microsoft.com/office/drawing/2010/main" showMasterSp="1" showMasterPhAnim="1">
+<file path=ppt/slides/slide13.xml><?xml version="1.0" encoding="utf-8"?>
+<p:sld xmlns:a="http://schemas.openxmlformats.org/drawingml/2006/main" xmlns:r="http://schemas.openxmlformats.org/officeDocument/2006/relationships" xmlns:p="http://schemas.openxmlformats.org/presentationml/2006/main">
   <p:cSld>
     <p:spTree>
       <p:nvGrpSpPr>
@@ -3750,8 +4028,10 @@
       </p:grpSpPr>
       <p:sp>
         <p:nvSpPr>
-          <p:cNvPr id="154" name="Index"/>
-          <p:cNvSpPr txBox="1"/>
+          <p:cNvPr id="158" name="Slicing"/>
+          <p:cNvSpPr txBox="1">
+            <a:spLocks noGrp="1"/>
+          </p:cNvSpPr>
           <p:nvPr>
             <p:ph type="title"/>
           </p:nvPr>
@@ -3773,17 +4053,18 @@
             </a:lvl1pPr>
           </a:lstStyle>
           <a:p>
-            <a:pPr/>
-            <a:r>
-              <a:t>Index </a:t>
+            <a:r>
+              <a:t>Slicing</a:t>
             </a:r>
           </a:p>
         </p:txBody>
       </p:sp>
       <p:sp>
         <p:nvSpPr>
-          <p:cNvPr id="155" name="&gt;&gt;&gt; list=[3,6,4,9]…"/>
-          <p:cNvSpPr txBox="1"/>
+          <p:cNvPr id="159" name="&gt;&gt;&gt; list[1,2]…"/>
+          <p:cNvSpPr txBox="1">
+            <a:spLocks noGrp="1"/>
+          </p:cNvSpPr>
           <p:nvPr>
             <p:ph type="body" sz="quarter" idx="1"/>
           </p:nvPr>
@@ -3808,7 +4089,7 @@
             <a:round/>
           </a:ln>
           <a:effectLst>
-            <a:outerShdw sx="100000" sy="100000" kx="0" ky="0" algn="b" rotWithShape="0" blurRad="38100" dist="23000" dir="5400000">
+            <a:outerShdw blurRad="38100" dist="23000" dir="5400000" rotWithShape="0">
               <a:srgbClr val="000000">
                 <a:alpha val="35000"/>
               </a:srgbClr>
@@ -3836,7 +4117,7 @@
               </a:defRPr>
             </a:pPr>
             <a:r>
-              <a:t>&gt;&gt;&gt; list=[3,6,4,9]</a:t>
+              <a:t>&gt;&gt;&gt; list[1,2]</a:t>
             </a:r>
           </a:p>
           <a:p>
@@ -3857,27 +4138,6 @@
               </a:defRPr>
             </a:pPr>
             <a:r>
-              <a:t>&gt;&gt;&gt;list.index(9)</a:t>
-            </a:r>
-          </a:p>
-          <a:p>
-            <a:pPr marL="0" indent="0">
-              <a:lnSpc>
-                <a:spcPct val="100000"/>
-              </a:lnSpc>
-              <a:buSzTx/>
-              <a:buNone/>
-              <a:defRPr sz="1400">
-                <a:solidFill>
-                  <a:srgbClr val="FFFFFF"/>
-                </a:solidFill>
-                <a:latin typeface="+mj-lt"/>
-                <a:ea typeface="+mj-ea"/>
-                <a:cs typeface="+mj-cs"/>
-                <a:sym typeface="Arial"/>
-              </a:defRPr>
-            </a:pPr>
-            <a:r>
               <a:t>&gt;&gt;&gt; 3</a:t>
             </a:r>
           </a:p>
@@ -3885,7 +4145,7 @@
       </p:sp>
       <p:sp>
         <p:nvSpPr>
-          <p:cNvPr id="156" name="You can find index of an item using index method"/>
+          <p:cNvPr id="160" name="A part of list can be extracted using  slicing"/>
           <p:cNvSpPr/>
           <p:nvPr/>
         </p:nvSpPr>
@@ -3904,7 +4164,7 @@
             <a:miter lim="400000"/>
           </a:ln>
           <a:effectLst>
-            <a:outerShdw sx="100000" sy="100000" kx="0" ky="0" algn="b" rotWithShape="0" blurRad="38100" dist="23000" dir="5400000">
+            <a:outerShdw blurRad="38100" dist="23000" dir="5400000" rotWithShape="0">
               <a:srgbClr val="000000">
                 <a:alpha val="35000"/>
               </a:srgbClr>
@@ -3912,29 +4172,26 @@
           </a:effectLst>
           <a:extLst>
             <a:ext uri="{C572A759-6A51-4108-AA02-DFA0A04FC94B}">
-              <ma14:wrappingTextBoxFlag xmlns:ma14="http://schemas.microsoft.com/office/mac/drawingml/2011/main" val="1"/>
+              <ma14:wrappingTextBoxFlag xmlns:ma14="http://schemas.microsoft.com/office/mac/drawingml/2011/main" xmlns:a14="http://schemas.microsoft.com/office/drawing/2010/main" xmlns:m="http://schemas.openxmlformats.org/officeDocument/2006/math" xmlns="" val="1"/>
             </a:ext>
           </a:extLst>
         </p:spPr>
         <p:txBody>
           <a:bodyPr lIns="91423" tIns="91423" rIns="91423" bIns="91423">
-            <a:normAutofit fontScale="100000" lnSpcReduction="0"/>
+            <a:normAutofit/>
           </a:bodyPr>
           <a:lstStyle>
             <a:lvl1pPr>
               <a:defRPr>
                 <a:solidFill>
-                  <a:schemeClr val="accent1">
-                    <a:lumOff val="-6980"/>
-                  </a:schemeClr>
+                  <a:srgbClr val="1A9988"/>
                 </a:solidFill>
               </a:defRPr>
             </a:lvl1pPr>
           </a:lstStyle>
           <a:p>
-            <a:pPr/>
-            <a:r>
-              <a:t>You can find index of an item using index method</a:t>
+            <a:r>
+              <a:t>A part of list can be extracted using  slicing </a:t>
             </a:r>
           </a:p>
         </p:txBody>
@@ -3944,12 +4201,12 @@
   <p:clrMapOvr>
     <a:masterClrMapping/>
   </p:clrMapOvr>
-  <p:transition xmlns:p14="http://schemas.microsoft.com/office/powerpoint/2010/main" spd="med" advClick="1"/>
+  <p:transition spd="med"/>
 </p:sld>
 </file>
 
-<file path=ppt/slides/slide13.xml><?xml version="1.0" encoding="utf-8"?>
-<p:sld xmlns:a="http://schemas.openxmlformats.org/drawingml/2006/main" xmlns:r="http://schemas.openxmlformats.org/officeDocument/2006/relationships" xmlns:p="http://schemas.openxmlformats.org/presentationml/2006/main" xmlns:m="http://schemas.openxmlformats.org/officeDocument/2006/math" xmlns:a14="http://schemas.microsoft.com/office/drawing/2010/main" showMasterSp="1" showMasterPhAnim="1">
+<file path=ppt/slides/slide14.xml><?xml version="1.0" encoding="utf-8"?>
+<p:sld xmlns:a="http://schemas.openxmlformats.org/drawingml/2006/main" xmlns:r="http://schemas.openxmlformats.org/officeDocument/2006/relationships" xmlns:p="http://schemas.openxmlformats.org/presentationml/2006/main">
   <p:cSld>
     <p:spTree>
       <p:nvGrpSpPr>
@@ -3967,8 +4224,10 @@
       </p:grpSpPr>
       <p:sp>
         <p:nvSpPr>
-          <p:cNvPr id="158" name="Slicing"/>
-          <p:cNvSpPr txBox="1"/>
+          <p:cNvPr id="162" name="Insert"/>
+          <p:cNvSpPr txBox="1">
+            <a:spLocks noGrp="1"/>
+          </p:cNvSpPr>
           <p:nvPr>
             <p:ph type="title"/>
           </p:nvPr>
@@ -3990,17 +4249,18 @@
             </a:lvl1pPr>
           </a:lstStyle>
           <a:p>
-            <a:pPr/>
-            <a:r>
-              <a:t>Slicing</a:t>
+            <a:r>
+              <a:t>Insert </a:t>
             </a:r>
           </a:p>
         </p:txBody>
       </p:sp>
       <p:sp>
         <p:nvSpPr>
-          <p:cNvPr id="159" name="&gt;&gt;&gt; list[1,2]…"/>
-          <p:cNvSpPr txBox="1"/>
+          <p:cNvPr id="163" name="&gt;&gt;&gt; list=[3,6,4,9]…"/>
+          <p:cNvSpPr txBox="1">
+            <a:spLocks noGrp="1"/>
+          </p:cNvSpPr>
           <p:nvPr>
             <p:ph type="body" sz="quarter" idx="1"/>
           </p:nvPr>
@@ -4025,7 +4285,7 @@
             <a:round/>
           </a:ln>
           <a:effectLst>
-            <a:outerShdw sx="100000" sy="100000" kx="0" ky="0" algn="b" rotWithShape="0" blurRad="38100" dist="23000" dir="5400000">
+            <a:outerShdw blurRad="38100" dist="23000" dir="5400000" rotWithShape="0">
               <a:srgbClr val="000000">
                 <a:alpha val="35000"/>
               </a:srgbClr>
@@ -4053,7 +4313,7 @@
               </a:defRPr>
             </a:pPr>
             <a:r>
-              <a:t>&gt;&gt;&gt; list[1,2]</a:t>
+              <a:t>&gt;&gt;&gt; list=[3,6,4,9]</a:t>
             </a:r>
           </a:p>
           <a:p>
@@ -4074,14 +4334,35 @@
               </a:defRPr>
             </a:pPr>
             <a:r>
-              <a:t>&gt;&gt;&gt; 3</a:t>
+              <a:t>&gt;&gt;&gt;list.insert(2,5)</a:t>
+            </a:r>
+          </a:p>
+          <a:p>
+            <a:pPr marL="0" indent="0">
+              <a:lnSpc>
+                <a:spcPct val="100000"/>
+              </a:lnSpc>
+              <a:buSzTx/>
+              <a:buNone/>
+              <a:defRPr sz="1400">
+                <a:solidFill>
+                  <a:srgbClr val="FFFFFF"/>
+                </a:solidFill>
+                <a:latin typeface="+mj-lt"/>
+                <a:ea typeface="+mj-ea"/>
+                <a:cs typeface="+mj-cs"/>
+                <a:sym typeface="Arial"/>
+              </a:defRPr>
+            </a:pPr>
+            <a:r>
+              <a:t>&gt;&gt;&gt; list</a:t>
             </a:r>
           </a:p>
         </p:txBody>
       </p:sp>
       <p:sp>
         <p:nvSpPr>
-          <p:cNvPr id="160" name="A part of list can be extracted using  slicing"/>
+          <p:cNvPr id="164" name="Insert method inserts an item into list at the given index"/>
           <p:cNvSpPr/>
           <p:nvPr/>
         </p:nvSpPr>
@@ -4100,7 +4381,7 @@
             <a:miter lim="400000"/>
           </a:ln>
           <a:effectLst>
-            <a:outerShdw sx="100000" sy="100000" kx="0" ky="0" algn="b" rotWithShape="0" blurRad="38100" dist="23000" dir="5400000">
+            <a:outerShdw blurRad="38100" dist="23000" dir="5400000" rotWithShape="0">
               <a:srgbClr val="000000">
                 <a:alpha val="35000"/>
               </a:srgbClr>
@@ -4108,27 +4389,28 @@
           </a:effectLst>
           <a:extLst>
             <a:ext uri="{C572A759-6A51-4108-AA02-DFA0A04FC94B}">
-              <ma14:wrappingTextBoxFlag xmlns:ma14="http://schemas.microsoft.com/office/mac/drawingml/2011/main" val="1"/>
+              <ma14:wrappingTextBoxFlag xmlns:ma14="http://schemas.microsoft.com/office/mac/drawingml/2011/main" xmlns:a14="http://schemas.microsoft.com/office/drawing/2010/main" xmlns:m="http://schemas.openxmlformats.org/officeDocument/2006/math" xmlns="" val="1"/>
             </a:ext>
           </a:extLst>
         </p:spPr>
         <p:txBody>
           <a:bodyPr lIns="91423" tIns="91423" rIns="91423" bIns="91423">
-            <a:normAutofit fontScale="100000" lnSpcReduction="0"/>
+            <a:normAutofit/>
           </a:bodyPr>
           <a:lstStyle>
             <a:lvl1pPr>
               <a:defRPr>
                 <a:solidFill>
-                  <a:srgbClr val="1A9988"/>
+                  <a:schemeClr val="accent1">
+                    <a:lumOff val="-6980"/>
+                  </a:schemeClr>
                 </a:solidFill>
               </a:defRPr>
             </a:lvl1pPr>
           </a:lstStyle>
           <a:p>
-            <a:pPr/>
-            <a:r>
-              <a:t>A part of list can be extracted using  slicing </a:t>
+            <a:r>
+              <a:t>Insert method inserts an item into list at the given index</a:t>
             </a:r>
           </a:p>
         </p:txBody>
@@ -4138,12 +4420,12 @@
   <p:clrMapOvr>
     <a:masterClrMapping/>
   </p:clrMapOvr>
-  <p:transition xmlns:p14="http://schemas.microsoft.com/office/powerpoint/2010/main" spd="med" advClick="1"/>
+  <p:transition spd="med"/>
 </p:sld>
 </file>
 
-<file path=ppt/slides/slide14.xml><?xml version="1.0" encoding="utf-8"?>
-<p:sld xmlns:a="http://schemas.openxmlformats.org/drawingml/2006/main" xmlns:r="http://schemas.openxmlformats.org/officeDocument/2006/relationships" xmlns:p="http://schemas.openxmlformats.org/presentationml/2006/main" xmlns:m="http://schemas.openxmlformats.org/officeDocument/2006/math" xmlns:a14="http://schemas.microsoft.com/office/drawing/2010/main" showMasterSp="1" showMasterPhAnim="1">
+<file path=ppt/slides/slide15.xml><?xml version="1.0" encoding="utf-8"?>
+<p:sld xmlns:a="http://schemas.openxmlformats.org/drawingml/2006/main" xmlns:r="http://schemas.openxmlformats.org/officeDocument/2006/relationships" xmlns:p="http://schemas.openxmlformats.org/presentationml/2006/main">
   <p:cSld>
     <p:spTree>
       <p:nvGrpSpPr>
@@ -4161,8 +4443,10 @@
       </p:grpSpPr>
       <p:sp>
         <p:nvSpPr>
-          <p:cNvPr id="162" name="Insert"/>
-          <p:cNvSpPr txBox="1"/>
+          <p:cNvPr id="166" name="Pop"/>
+          <p:cNvSpPr txBox="1">
+            <a:spLocks noGrp="1"/>
+          </p:cNvSpPr>
           <p:nvPr>
             <p:ph type="title"/>
           </p:nvPr>
@@ -4184,17 +4468,18 @@
             </a:lvl1pPr>
           </a:lstStyle>
           <a:p>
-            <a:pPr/>
-            <a:r>
-              <a:t>Insert </a:t>
+            <a:r>
+              <a:t>Pop </a:t>
             </a:r>
           </a:p>
         </p:txBody>
       </p:sp>
       <p:sp>
         <p:nvSpPr>
-          <p:cNvPr id="163" name="&gt;&gt;&gt; list=[3,6,4,9]…"/>
-          <p:cNvSpPr txBox="1"/>
+          <p:cNvPr id="167" name="&gt;&gt;&gt; list=[3,6,4,9]…"/>
+          <p:cNvSpPr txBox="1">
+            <a:spLocks noGrp="1"/>
+          </p:cNvSpPr>
           <p:nvPr>
             <p:ph type="body" sz="quarter" idx="1"/>
           </p:nvPr>
@@ -4219,7 +4504,7 @@
             <a:round/>
           </a:ln>
           <a:effectLst>
-            <a:outerShdw sx="100000" sy="100000" kx="0" ky="0" algn="b" rotWithShape="0" blurRad="38100" dist="23000" dir="5400000">
+            <a:outerShdw blurRad="38100" dist="23000" dir="5400000" rotWithShape="0">
               <a:srgbClr val="000000">
                 <a:alpha val="35000"/>
               </a:srgbClr>
@@ -4230,13 +4515,13 @@
           <a:bodyPr/>
           <a:lstStyle/>
           <a:p>
-            <a:pPr marL="0" indent="0">
+            <a:pPr marL="0" indent="0" defTabSz="896111">
               <a:lnSpc>
                 <a:spcPct val="100000"/>
               </a:lnSpc>
               <a:buSzTx/>
               <a:buNone/>
-              <a:defRPr sz="1400">
+              <a:defRPr>
                 <a:solidFill>
                   <a:srgbClr val="FFFFFF"/>
                 </a:solidFill>
@@ -4251,13 +4536,13 @@
             </a:r>
           </a:p>
           <a:p>
-            <a:pPr marL="0" indent="0">
+            <a:pPr marL="0" indent="0" defTabSz="896111">
               <a:lnSpc>
                 <a:spcPct val="100000"/>
               </a:lnSpc>
               <a:buSzTx/>
               <a:buNone/>
-              <a:defRPr sz="1400">
+              <a:defRPr>
                 <a:solidFill>
                   <a:srgbClr val="FFFFFF"/>
                 </a:solidFill>
@@ -4268,17 +4553,17 @@
               </a:defRPr>
             </a:pPr>
             <a:r>
-              <a:t>&gt;&gt;&gt;list.insert(2,5)</a:t>
-            </a:r>
-          </a:p>
-          <a:p>
-            <a:pPr marL="0" indent="0">
+              <a:t>&gt;&gt;&gt;print(“This item “, list.pop(),”removed from the list”)</a:t>
+            </a:r>
+          </a:p>
+          <a:p>
+            <a:pPr marL="0" indent="0" defTabSz="896111">
               <a:lnSpc>
                 <a:spcPct val="100000"/>
               </a:lnSpc>
               <a:buSzTx/>
               <a:buNone/>
-              <a:defRPr sz="1400">
+              <a:defRPr>
                 <a:solidFill>
                   <a:srgbClr val="FFFFFF"/>
                 </a:solidFill>
@@ -4296,7 +4581,7 @@
       </p:sp>
       <p:sp>
         <p:nvSpPr>
-          <p:cNvPr id="164" name="Insert method inserts an item into list at the given index"/>
+          <p:cNvPr id="168" name="Pop method deletes the last item from the list"/>
           <p:cNvSpPr/>
           <p:nvPr/>
         </p:nvSpPr>
@@ -4315,7 +4600,7 @@
             <a:miter lim="400000"/>
           </a:ln>
           <a:effectLst>
-            <a:outerShdw sx="100000" sy="100000" kx="0" ky="0" algn="b" rotWithShape="0" blurRad="38100" dist="23000" dir="5400000">
+            <a:outerShdw blurRad="38100" dist="23000" dir="5400000" rotWithShape="0">
               <a:srgbClr val="000000">
                 <a:alpha val="35000"/>
               </a:srgbClr>
@@ -4323,17 +4608,17 @@
           </a:effectLst>
           <a:extLst>
             <a:ext uri="{C572A759-6A51-4108-AA02-DFA0A04FC94B}">
-              <ma14:wrappingTextBoxFlag xmlns:ma14="http://schemas.microsoft.com/office/mac/drawingml/2011/main" val="1"/>
+              <ma14:wrappingTextBoxFlag xmlns:ma14="http://schemas.microsoft.com/office/mac/drawingml/2011/main" xmlns:a14="http://schemas.microsoft.com/office/drawing/2010/main" xmlns:m="http://schemas.openxmlformats.org/officeDocument/2006/math" xmlns="" val="1"/>
             </a:ext>
           </a:extLst>
         </p:spPr>
         <p:txBody>
           <a:bodyPr lIns="91423" tIns="91423" rIns="91423" bIns="91423">
-            <a:normAutofit fontScale="100000" lnSpcReduction="0"/>
+            <a:normAutofit/>
           </a:bodyPr>
           <a:lstStyle>
             <a:lvl1pPr>
-              <a:defRPr>
+              <a:defRPr sz="3000">
                 <a:solidFill>
                   <a:schemeClr val="accent1">
                     <a:lumOff val="-6980"/>
@@ -4343,9 +4628,8 @@
             </a:lvl1pPr>
           </a:lstStyle>
           <a:p>
-            <a:pPr/>
-            <a:r>
-              <a:t>Insert method inserts an item into list at the given index</a:t>
+            <a:r>
+              <a:t>Pop method deletes the last item from the list</a:t>
             </a:r>
           </a:p>
         </p:txBody>
@@ -4355,12 +4639,12 @@
   <p:clrMapOvr>
     <a:masterClrMapping/>
   </p:clrMapOvr>
-  <p:transition xmlns:p14="http://schemas.microsoft.com/office/powerpoint/2010/main" spd="med" advClick="1"/>
+  <p:transition spd="med"/>
 </p:sld>
 </file>
 
-<file path=ppt/slides/slide15.xml><?xml version="1.0" encoding="utf-8"?>
-<p:sld xmlns:a="http://schemas.openxmlformats.org/drawingml/2006/main" xmlns:r="http://schemas.openxmlformats.org/officeDocument/2006/relationships" xmlns:p="http://schemas.openxmlformats.org/presentationml/2006/main" xmlns:m="http://schemas.openxmlformats.org/officeDocument/2006/math" xmlns:a14="http://schemas.microsoft.com/office/drawing/2010/main" showMasterSp="1" showMasterPhAnim="1">
+<file path=ppt/slides/slide16.xml><?xml version="1.0" encoding="utf-8"?>
+<p:sld xmlns:a="http://schemas.openxmlformats.org/drawingml/2006/main" xmlns:r="http://schemas.openxmlformats.org/officeDocument/2006/relationships" xmlns:p="http://schemas.openxmlformats.org/presentationml/2006/main">
   <p:cSld>
     <p:spTree>
       <p:nvGrpSpPr>
@@ -4378,8 +4662,10 @@
       </p:grpSpPr>
       <p:sp>
         <p:nvSpPr>
-          <p:cNvPr id="166" name="Pop"/>
-          <p:cNvSpPr txBox="1"/>
+          <p:cNvPr id="170" name="Pop"/>
+          <p:cNvSpPr txBox="1">
+            <a:spLocks noGrp="1"/>
+          </p:cNvSpPr>
           <p:nvPr>
             <p:ph type="title"/>
           </p:nvPr>
@@ -4401,17 +4687,18 @@
             </a:lvl1pPr>
           </a:lstStyle>
           <a:p>
-            <a:pPr/>
-            <a:r>
-              <a:t>Pop </a:t>
+            <a:r>
+              <a:t>Shuffle()</a:t>
             </a:r>
           </a:p>
         </p:txBody>
       </p:sp>
       <p:sp>
         <p:nvSpPr>
-          <p:cNvPr id="167" name="&gt;&gt;&gt; list=[3,6,4,9]…"/>
-          <p:cNvSpPr txBox="1"/>
+          <p:cNvPr id="171" name="&gt;&gt;&gt; list=[3,6,4,9]…"/>
+          <p:cNvSpPr txBox="1">
+            <a:spLocks noGrp="1"/>
+          </p:cNvSpPr>
           <p:nvPr>
             <p:ph type="body" sz="quarter" idx="1"/>
           </p:nvPr>
@@ -4436,7 +4723,7 @@
             <a:round/>
           </a:ln>
           <a:effectLst>
-            <a:outerShdw sx="100000" sy="100000" kx="0" ky="0" algn="b" rotWithShape="0" blurRad="38100" dist="23000" dir="5400000">
+            <a:outerShdw blurRad="38100" dist="23000" dir="5400000" rotWithShape="0">
               <a:srgbClr val="000000">
                 <a:alpha val="35000"/>
               </a:srgbClr>
@@ -4447,13 +4734,13 @@
           <a:bodyPr/>
           <a:lstStyle/>
           <a:p>
-            <a:pPr marL="0" indent="0" defTabSz="896111">
+            <a:pPr marL="0" indent="0" defTabSz="546627">
               <a:lnSpc>
                 <a:spcPct val="100000"/>
               </a:lnSpc>
               <a:buSzTx/>
               <a:buNone/>
-              <a:defRPr>
+              <a:defRPr sz="1647">
                 <a:solidFill>
                   <a:srgbClr val="FFFFFF"/>
                 </a:solidFill>
@@ -4468,13 +4755,13 @@
             </a:r>
           </a:p>
           <a:p>
-            <a:pPr marL="0" indent="0" defTabSz="896111">
+            <a:pPr marL="0" indent="0" defTabSz="546627">
               <a:lnSpc>
                 <a:spcPct val="100000"/>
               </a:lnSpc>
               <a:buSzTx/>
               <a:buNone/>
-              <a:defRPr>
+              <a:defRPr sz="1647">
                 <a:solidFill>
                   <a:srgbClr val="FFFFFF"/>
                 </a:solidFill>
@@ -4485,17 +4772,17 @@
               </a:defRPr>
             </a:pPr>
             <a:r>
-              <a:t>&gt;&gt;&gt;print(“This item “, list.pop(),”removed from the list”)</a:t>
-            </a:r>
-          </a:p>
-          <a:p>
-            <a:pPr marL="0" indent="0" defTabSz="896111">
+              <a:t>&gt;&gt;&gt;import random</a:t>
+            </a:r>
+          </a:p>
+          <a:p>
+            <a:pPr marL="0" indent="0" defTabSz="546627">
               <a:lnSpc>
                 <a:spcPct val="100000"/>
               </a:lnSpc>
               <a:buSzTx/>
               <a:buNone/>
-              <a:defRPr>
+              <a:defRPr sz="1647">
                 <a:solidFill>
                   <a:srgbClr val="FFFFFF"/>
                 </a:solidFill>
@@ -4506,14 +4793,14 @@
               </a:defRPr>
             </a:pPr>
             <a:r>
-              <a:t>&gt;&gt;&gt; list</a:t>
+              <a:t>&gt;&gt;&gt;random.shuffle(list)</a:t>
             </a:r>
           </a:p>
         </p:txBody>
       </p:sp>
       <p:sp>
         <p:nvSpPr>
-          <p:cNvPr id="168" name="Pop method deletes the last item from the list"/>
+          <p:cNvPr id="172" name="Pop method deletes the last item from the list"/>
           <p:cNvSpPr/>
           <p:nvPr/>
         </p:nvSpPr>
@@ -4532,7 +4819,7 @@
             <a:miter lim="400000"/>
           </a:ln>
           <a:effectLst>
-            <a:outerShdw sx="100000" sy="100000" kx="0" ky="0" algn="b" rotWithShape="0" blurRad="38100" dist="23000" dir="5400000">
+            <a:outerShdw blurRad="38100" dist="23000" dir="5400000" rotWithShape="0">
               <a:srgbClr val="000000">
                 <a:alpha val="35000"/>
               </a:srgbClr>
@@ -4540,13 +4827,13 @@
           </a:effectLst>
           <a:extLst>
             <a:ext uri="{C572A759-6A51-4108-AA02-DFA0A04FC94B}">
-              <ma14:wrappingTextBoxFlag xmlns:ma14="http://schemas.microsoft.com/office/mac/drawingml/2011/main" val="1"/>
+              <ma14:wrappingTextBoxFlag xmlns:ma14="http://schemas.microsoft.com/office/mac/drawingml/2011/main" xmlns:a14="http://schemas.microsoft.com/office/drawing/2010/main" xmlns:m="http://schemas.openxmlformats.org/officeDocument/2006/math" xmlns="" val="1"/>
             </a:ext>
           </a:extLst>
         </p:spPr>
         <p:txBody>
           <a:bodyPr lIns="91423" tIns="91423" rIns="91423" bIns="91423">
-            <a:normAutofit fontScale="100000" lnSpcReduction="0"/>
+            <a:normAutofit/>
           </a:bodyPr>
           <a:lstStyle>
             <a:lvl1pPr>
@@ -4560,9 +4847,8 @@
             </a:lvl1pPr>
           </a:lstStyle>
           <a:p>
-            <a:pPr/>
-            <a:r>
-              <a:t>Pop method deletes the last item from the list</a:t>
+            <a:r>
+              <a:t>It shuffles the items inside the list</a:t>
             </a:r>
           </a:p>
         </p:txBody>
@@ -4572,12 +4858,12 @@
   <p:clrMapOvr>
     <a:masterClrMapping/>
   </p:clrMapOvr>
-  <p:transition xmlns:p14="http://schemas.microsoft.com/office/powerpoint/2010/main" spd="med" advClick="1"/>
+  <p:transition spd="med"/>
 </p:sld>
 </file>
 
-<file path=ppt/slides/slide16.xml><?xml version="1.0" encoding="utf-8"?>
-<p:sld xmlns:a="http://schemas.openxmlformats.org/drawingml/2006/main" xmlns:r="http://schemas.openxmlformats.org/officeDocument/2006/relationships" xmlns:p="http://schemas.openxmlformats.org/presentationml/2006/main" xmlns:m="http://schemas.openxmlformats.org/officeDocument/2006/math" xmlns:a14="http://schemas.microsoft.com/office/drawing/2010/main" showMasterSp="1" showMasterPhAnim="1">
+<file path=ppt/slides/slide17.xml><?xml version="1.0" encoding="utf-8"?>
+<p:sld xmlns:a="http://schemas.openxmlformats.org/drawingml/2006/main" xmlns:r="http://schemas.openxmlformats.org/officeDocument/2006/relationships" xmlns:p="http://schemas.openxmlformats.org/presentationml/2006/main">
   <p:cSld>
     <p:spTree>
       <p:nvGrpSpPr>
@@ -4595,8 +4881,10 @@
       </p:grpSpPr>
       <p:sp>
         <p:nvSpPr>
-          <p:cNvPr id="170" name="Pop"/>
-          <p:cNvSpPr txBox="1"/>
+          <p:cNvPr id="174" name="Pop"/>
+          <p:cNvSpPr txBox="1">
+            <a:spLocks noGrp="1"/>
+          </p:cNvSpPr>
           <p:nvPr>
             <p:ph type="title"/>
           </p:nvPr>
@@ -4618,17 +4906,18 @@
             </a:lvl1pPr>
           </a:lstStyle>
           <a:p>
-            <a:pPr/>
-            <a:r>
-              <a:t>Shuffle()</a:t>
+            <a:r>
+              <a:t>reverse()</a:t>
             </a:r>
           </a:p>
         </p:txBody>
       </p:sp>
       <p:sp>
         <p:nvSpPr>
-          <p:cNvPr id="171" name="&gt;&gt;&gt; list=[3,6,4,9]…"/>
-          <p:cNvSpPr txBox="1"/>
+          <p:cNvPr id="175" name="&gt;&gt;&gt; list=[3,6,4,9]…"/>
+          <p:cNvSpPr txBox="1">
+            <a:spLocks noGrp="1"/>
+          </p:cNvSpPr>
           <p:nvPr>
             <p:ph type="body" sz="quarter" idx="1"/>
           </p:nvPr>
@@ -4653,7 +4942,7 @@
             <a:round/>
           </a:ln>
           <a:effectLst>
-            <a:outerShdw sx="100000" sy="100000" kx="0" ky="0" algn="b" rotWithShape="0" blurRad="38100" dist="23000" dir="5400000">
+            <a:outerShdw blurRad="38100" dist="23000" dir="5400000" rotWithShape="0">
               <a:srgbClr val="000000">
                 <a:alpha val="35000"/>
               </a:srgbClr>
@@ -4664,13 +4953,13 @@
           <a:bodyPr/>
           <a:lstStyle/>
           <a:p>
-            <a:pPr marL="0" indent="0" defTabSz="546627">
+            <a:pPr marL="0" indent="0" defTabSz="707927">
               <a:lnSpc>
                 <a:spcPct val="100000"/>
               </a:lnSpc>
               <a:buSzTx/>
               <a:buNone/>
-              <a:defRPr sz="1647">
+              <a:defRPr sz="2133">
                 <a:solidFill>
                   <a:srgbClr val="FFFFFF"/>
                 </a:solidFill>
@@ -4685,13 +4974,13 @@
             </a:r>
           </a:p>
           <a:p>
-            <a:pPr marL="0" indent="0" defTabSz="546627">
+            <a:pPr marL="0" indent="0" defTabSz="707927">
               <a:lnSpc>
                 <a:spcPct val="100000"/>
               </a:lnSpc>
               <a:buSzTx/>
               <a:buNone/>
-              <a:defRPr sz="1647">
+              <a:defRPr sz="2133">
                 <a:solidFill>
                   <a:srgbClr val="FFFFFF"/>
                 </a:solidFill>
@@ -4702,35 +4991,14 @@
               </a:defRPr>
             </a:pPr>
             <a:r>
-              <a:t>&gt;&gt;&gt;import random</a:t>
-            </a:r>
-          </a:p>
-          <a:p>
-            <a:pPr marL="0" indent="0" defTabSz="546627">
-              <a:lnSpc>
-                <a:spcPct val="100000"/>
-              </a:lnSpc>
-              <a:buSzTx/>
-              <a:buNone/>
-              <a:defRPr sz="1647">
-                <a:solidFill>
-                  <a:srgbClr val="FFFFFF"/>
-                </a:solidFill>
-                <a:latin typeface="+mj-lt"/>
-                <a:ea typeface="+mj-ea"/>
-                <a:cs typeface="+mj-cs"/>
-                <a:sym typeface="Arial"/>
-              </a:defRPr>
-            </a:pPr>
-            <a:r>
-              <a:t>&gt;&gt;&gt;random.shuffle(list)</a:t>
+              <a:t>&gt;&gt;&gt;list.reverse()</a:t>
             </a:r>
           </a:p>
         </p:txBody>
       </p:sp>
       <p:sp>
         <p:nvSpPr>
-          <p:cNvPr id="172" name="Pop method deletes the last item from the list"/>
+          <p:cNvPr id="176" name="Pop method deletes the last item from the list"/>
           <p:cNvSpPr/>
           <p:nvPr/>
         </p:nvSpPr>
@@ -4749,7 +5017,7 @@
             <a:miter lim="400000"/>
           </a:ln>
           <a:effectLst>
-            <a:outerShdw sx="100000" sy="100000" kx="0" ky="0" algn="b" rotWithShape="0" blurRad="38100" dist="23000" dir="5400000">
+            <a:outerShdw blurRad="38100" dist="23000" dir="5400000" rotWithShape="0">
               <a:srgbClr val="000000">
                 <a:alpha val="35000"/>
               </a:srgbClr>
@@ -4757,13 +5025,13 @@
           </a:effectLst>
           <a:extLst>
             <a:ext uri="{C572A759-6A51-4108-AA02-DFA0A04FC94B}">
-              <ma14:wrappingTextBoxFlag xmlns:ma14="http://schemas.microsoft.com/office/mac/drawingml/2011/main" val="1"/>
+              <ma14:wrappingTextBoxFlag xmlns:ma14="http://schemas.microsoft.com/office/mac/drawingml/2011/main" xmlns:a14="http://schemas.microsoft.com/office/drawing/2010/main" xmlns:m="http://schemas.openxmlformats.org/officeDocument/2006/math" xmlns="" val="1"/>
             </a:ext>
           </a:extLst>
         </p:spPr>
         <p:txBody>
           <a:bodyPr lIns="91423" tIns="91423" rIns="91423" bIns="91423">
-            <a:normAutofit fontScale="100000" lnSpcReduction="0"/>
+            <a:normAutofit/>
           </a:bodyPr>
           <a:lstStyle>
             <a:lvl1pPr>
@@ -4777,9 +5045,8 @@
             </a:lvl1pPr>
           </a:lstStyle>
           <a:p>
-            <a:pPr/>
-            <a:r>
-              <a:t>It shuffles the items inside the list</a:t>
+            <a:r>
+              <a:t>It reverse the items inside the list</a:t>
             </a:r>
           </a:p>
         </p:txBody>
@@ -4789,12 +5056,12 @@
   <p:clrMapOvr>
     <a:masterClrMapping/>
   </p:clrMapOvr>
-  <p:transition xmlns:p14="http://schemas.microsoft.com/office/powerpoint/2010/main" spd="med" advClick="1"/>
+  <p:transition spd="med"/>
 </p:sld>
 </file>
 
-<file path=ppt/slides/slide17.xml><?xml version="1.0" encoding="utf-8"?>
-<p:sld xmlns:a="http://schemas.openxmlformats.org/drawingml/2006/main" xmlns:r="http://schemas.openxmlformats.org/officeDocument/2006/relationships" xmlns:p="http://schemas.openxmlformats.org/presentationml/2006/main" xmlns:m="http://schemas.openxmlformats.org/officeDocument/2006/math" xmlns:a14="http://schemas.microsoft.com/office/drawing/2010/main" showMasterSp="1" showMasterPhAnim="1">
+<file path=ppt/slides/slide18.xml><?xml version="1.0" encoding="utf-8"?>
+<p:sld xmlns:a="http://schemas.openxmlformats.org/drawingml/2006/main" xmlns:r="http://schemas.openxmlformats.org/officeDocument/2006/relationships" xmlns:p="http://schemas.openxmlformats.org/presentationml/2006/main">
   <p:cSld>
     <p:spTree>
       <p:nvGrpSpPr>
@@ -4812,8 +5079,10 @@
       </p:grpSpPr>
       <p:sp>
         <p:nvSpPr>
-          <p:cNvPr id="174" name="Pop"/>
-          <p:cNvSpPr txBox="1"/>
+          <p:cNvPr id="178" name="Pop"/>
+          <p:cNvSpPr txBox="1">
+            <a:spLocks noGrp="1"/>
+          </p:cNvSpPr>
           <p:nvPr>
             <p:ph type="title"/>
           </p:nvPr>
@@ -4835,17 +5104,18 @@
             </a:lvl1pPr>
           </a:lstStyle>
           <a:p>
-            <a:pPr/>
-            <a:r>
-              <a:t>reverse()</a:t>
+            <a:r>
+              <a:t>sort()</a:t>
             </a:r>
           </a:p>
         </p:txBody>
       </p:sp>
       <p:sp>
         <p:nvSpPr>
-          <p:cNvPr id="175" name="&gt;&gt;&gt; list=[3,6,4,9]…"/>
-          <p:cNvSpPr txBox="1"/>
+          <p:cNvPr id="179" name="&gt;&gt;&gt; list=[3,6,4,9]…"/>
+          <p:cNvSpPr txBox="1">
+            <a:spLocks noGrp="1"/>
+          </p:cNvSpPr>
           <p:nvPr>
             <p:ph type="body" sz="quarter" idx="1"/>
           </p:nvPr>
@@ -4870,7 +5140,7 @@
             <a:round/>
           </a:ln>
           <a:effectLst>
-            <a:outerShdw sx="100000" sy="100000" kx="0" ky="0" algn="b" rotWithShape="0" blurRad="38100" dist="23000" dir="5400000">
+            <a:outerShdw blurRad="38100" dist="23000" dir="5400000" rotWithShape="0">
               <a:srgbClr val="000000">
                 <a:alpha val="35000"/>
               </a:srgbClr>
@@ -4898,7 +5168,7 @@
               </a:defRPr>
             </a:pPr>
             <a:r>
-              <a:t>&gt;&gt;&gt; list=[3,6,4,9]</a:t>
+              <a:t>&gt;&gt;&gt; list=[43,4,5,12]</a:t>
             </a:r>
           </a:p>
           <a:p>
@@ -4919,14 +5189,14 @@
               </a:defRPr>
             </a:pPr>
             <a:r>
-              <a:t>&gt;&gt;&gt;list.reverse()</a:t>
+              <a:t>&gt;&gt;&gt;list.sort()</a:t>
             </a:r>
           </a:p>
         </p:txBody>
       </p:sp>
       <p:sp>
         <p:nvSpPr>
-          <p:cNvPr id="176" name="Pop method deletes the last item from the list"/>
+          <p:cNvPr id="180" name="Pop method deletes the last item from the list"/>
           <p:cNvSpPr/>
           <p:nvPr/>
         </p:nvSpPr>
@@ -4945,7 +5215,7 @@
             <a:miter lim="400000"/>
           </a:ln>
           <a:effectLst>
-            <a:outerShdw sx="100000" sy="100000" kx="0" ky="0" algn="b" rotWithShape="0" blurRad="38100" dist="23000" dir="5400000">
+            <a:outerShdw blurRad="38100" dist="23000" dir="5400000" rotWithShape="0">
               <a:srgbClr val="000000">
                 <a:alpha val="35000"/>
               </a:srgbClr>
@@ -4953,13 +5223,13 @@
           </a:effectLst>
           <a:extLst>
             <a:ext uri="{C572A759-6A51-4108-AA02-DFA0A04FC94B}">
-              <ma14:wrappingTextBoxFlag xmlns:ma14="http://schemas.microsoft.com/office/mac/drawingml/2011/main" val="1"/>
+              <ma14:wrappingTextBoxFlag xmlns:ma14="http://schemas.microsoft.com/office/mac/drawingml/2011/main" xmlns:a14="http://schemas.microsoft.com/office/drawing/2010/main" xmlns:m="http://schemas.openxmlformats.org/officeDocument/2006/math" xmlns="" val="1"/>
             </a:ext>
           </a:extLst>
         </p:spPr>
         <p:txBody>
           <a:bodyPr lIns="91423" tIns="91423" rIns="91423" bIns="91423">
-            <a:normAutofit fontScale="100000" lnSpcReduction="0"/>
+            <a:normAutofit/>
           </a:bodyPr>
           <a:lstStyle>
             <a:lvl1pPr>
@@ -4973,9 +5243,8 @@
             </a:lvl1pPr>
           </a:lstStyle>
           <a:p>
-            <a:pPr/>
-            <a:r>
-              <a:t>It reverse the items inside the list</a:t>
+            <a:r>
+              <a:t>It sorts the items inside the list</a:t>
             </a:r>
           </a:p>
         </p:txBody>
@@ -4985,12 +5254,12 @@
   <p:clrMapOvr>
     <a:masterClrMapping/>
   </p:clrMapOvr>
-  <p:transition xmlns:p14="http://schemas.microsoft.com/office/powerpoint/2010/main" spd="med" advClick="1"/>
+  <p:transition spd="med"/>
 </p:sld>
 </file>
 
-<file path=ppt/slides/slide18.xml><?xml version="1.0" encoding="utf-8"?>
-<p:sld xmlns:a="http://schemas.openxmlformats.org/drawingml/2006/main" xmlns:r="http://schemas.openxmlformats.org/officeDocument/2006/relationships" xmlns:p="http://schemas.openxmlformats.org/presentationml/2006/main" xmlns:m="http://schemas.openxmlformats.org/officeDocument/2006/math" xmlns:a14="http://schemas.microsoft.com/office/drawing/2010/main" showMasterSp="1" showMasterPhAnim="1">
+<file path=ppt/slides/slide19.xml><?xml version="1.0" encoding="utf-8"?>
+<p:sld xmlns:a="http://schemas.openxmlformats.org/drawingml/2006/main" xmlns:r="http://schemas.openxmlformats.org/officeDocument/2006/relationships" xmlns:p="http://schemas.openxmlformats.org/presentationml/2006/main">
   <p:cSld>
     <p:spTree>
       <p:nvGrpSpPr>
@@ -5008,8 +5277,10 @@
       </p:grpSpPr>
       <p:sp>
         <p:nvSpPr>
-          <p:cNvPr id="178" name="Pop"/>
-          <p:cNvSpPr txBox="1"/>
+          <p:cNvPr id="182" name="Pop"/>
+          <p:cNvSpPr txBox="1">
+            <a:spLocks noGrp="1"/>
+          </p:cNvSpPr>
           <p:nvPr>
             <p:ph type="title"/>
           </p:nvPr>
@@ -5031,7 +5302,6 @@
             </a:lvl1pPr>
           </a:lstStyle>
           <a:p>
-            <a:pPr/>
             <a:r>
               <a:t>sort()</a:t>
             </a:r>
@@ -5040,8 +5310,10 @@
       </p:sp>
       <p:sp>
         <p:nvSpPr>
-          <p:cNvPr id="179" name="&gt;&gt;&gt; list=[3,6,4,9]…"/>
-          <p:cNvSpPr txBox="1"/>
+          <p:cNvPr id="183" name="&gt;&gt;&gt; list=[3,6,4,9]…"/>
+          <p:cNvSpPr txBox="1">
+            <a:spLocks noGrp="1"/>
+          </p:cNvSpPr>
           <p:nvPr>
             <p:ph type="body" sz="quarter" idx="1"/>
           </p:nvPr>
@@ -5066,203 +5338,7 @@
             <a:round/>
           </a:ln>
           <a:effectLst>
-            <a:outerShdw sx="100000" sy="100000" kx="0" ky="0" algn="b" rotWithShape="0" blurRad="38100" dist="23000" dir="5400000">
-              <a:srgbClr val="000000">
-                <a:alpha val="35000"/>
-              </a:srgbClr>
-            </a:outerShdw>
-          </a:effectLst>
-        </p:spPr>
-        <p:txBody>
-          <a:bodyPr/>
-          <a:lstStyle/>
-          <a:p>
-            <a:pPr marL="0" indent="0" defTabSz="707927">
-              <a:lnSpc>
-                <a:spcPct val="100000"/>
-              </a:lnSpc>
-              <a:buSzTx/>
-              <a:buNone/>
-              <a:defRPr sz="2133">
-                <a:solidFill>
-                  <a:srgbClr val="FFFFFF"/>
-                </a:solidFill>
-                <a:latin typeface="+mj-lt"/>
-                <a:ea typeface="+mj-ea"/>
-                <a:cs typeface="+mj-cs"/>
-                <a:sym typeface="Arial"/>
-              </a:defRPr>
-            </a:pPr>
-            <a:r>
-              <a:t>&gt;&gt;&gt; list=[43,4,5,12]</a:t>
-            </a:r>
-          </a:p>
-          <a:p>
-            <a:pPr marL="0" indent="0" defTabSz="707927">
-              <a:lnSpc>
-                <a:spcPct val="100000"/>
-              </a:lnSpc>
-              <a:buSzTx/>
-              <a:buNone/>
-              <a:defRPr sz="2133">
-                <a:solidFill>
-                  <a:srgbClr val="FFFFFF"/>
-                </a:solidFill>
-                <a:latin typeface="+mj-lt"/>
-                <a:ea typeface="+mj-ea"/>
-                <a:cs typeface="+mj-cs"/>
-                <a:sym typeface="Arial"/>
-              </a:defRPr>
-            </a:pPr>
-            <a:r>
-              <a:t>&gt;&gt;&gt;list.sort()</a:t>
-            </a:r>
-          </a:p>
-        </p:txBody>
-      </p:sp>
-      <p:sp>
-        <p:nvSpPr>
-          <p:cNvPr id="180" name="Pop method deletes the last item from the list"/>
-          <p:cNvSpPr/>
-          <p:nvPr/>
-        </p:nvSpPr>
-        <p:spPr>
-          <a:xfrm>
-            <a:off x="727650" y="1907584"/>
-            <a:ext cx="7688699" cy="1186948"/>
-          </a:xfrm>
-          <a:prstGeom prst="rect">
-            <a:avLst/>
-          </a:prstGeom>
-          <a:solidFill>
-            <a:srgbClr val="FFFFFF"/>
-          </a:solidFill>
-          <a:ln w="12700">
-            <a:miter lim="400000"/>
-          </a:ln>
-          <a:effectLst>
-            <a:outerShdw sx="100000" sy="100000" kx="0" ky="0" algn="b" rotWithShape="0" blurRad="38100" dist="23000" dir="5400000">
-              <a:srgbClr val="000000">
-                <a:alpha val="35000"/>
-              </a:srgbClr>
-            </a:outerShdw>
-          </a:effectLst>
-          <a:extLst>
-            <a:ext uri="{C572A759-6A51-4108-AA02-DFA0A04FC94B}">
-              <ma14:wrappingTextBoxFlag xmlns:ma14="http://schemas.microsoft.com/office/mac/drawingml/2011/main" val="1"/>
-            </a:ext>
-          </a:extLst>
-        </p:spPr>
-        <p:txBody>
-          <a:bodyPr lIns="91423" tIns="91423" rIns="91423" bIns="91423">
-            <a:normAutofit fontScale="100000" lnSpcReduction="0"/>
-          </a:bodyPr>
-          <a:lstStyle>
-            <a:lvl1pPr>
-              <a:defRPr sz="3000">
-                <a:solidFill>
-                  <a:schemeClr val="accent1">
-                    <a:lumOff val="-6980"/>
-                  </a:schemeClr>
-                </a:solidFill>
-              </a:defRPr>
-            </a:lvl1pPr>
-          </a:lstStyle>
-          <a:p>
-            <a:pPr/>
-            <a:r>
-              <a:t>It sorts the items inside the list</a:t>
-            </a:r>
-          </a:p>
-        </p:txBody>
-      </p:sp>
-    </p:spTree>
-  </p:cSld>
-  <p:clrMapOvr>
-    <a:masterClrMapping/>
-  </p:clrMapOvr>
-  <p:transition xmlns:p14="http://schemas.microsoft.com/office/powerpoint/2010/main" spd="med" advClick="1"/>
-</p:sld>
-</file>
-
-<file path=ppt/slides/slide19.xml><?xml version="1.0" encoding="utf-8"?>
-<p:sld xmlns:a="http://schemas.openxmlformats.org/drawingml/2006/main" xmlns:r="http://schemas.openxmlformats.org/officeDocument/2006/relationships" xmlns:p="http://schemas.openxmlformats.org/presentationml/2006/main" xmlns:m="http://schemas.openxmlformats.org/officeDocument/2006/math" xmlns:a14="http://schemas.microsoft.com/office/drawing/2010/main" showMasterSp="1" showMasterPhAnim="1">
-  <p:cSld>
-    <p:spTree>
-      <p:nvGrpSpPr>
-        <p:cNvPr id="1" name=""/>
-        <p:cNvGrpSpPr/>
-        <p:nvPr/>
-      </p:nvGrpSpPr>
-      <p:grpSpPr>
-        <a:xfrm>
-          <a:off x="0" y="0"/>
-          <a:ext cx="0" cy="0"/>
-          <a:chOff x="0" y="0"/>
-          <a:chExt cx="0" cy="0"/>
-        </a:xfrm>
-      </p:grpSpPr>
-      <p:sp>
-        <p:nvSpPr>
-          <p:cNvPr id="182" name="Pop"/>
-          <p:cNvSpPr txBox="1"/>
-          <p:nvPr>
-            <p:ph type="title"/>
-          </p:nvPr>
-        </p:nvSpPr>
-        <p:spPr>
-          <a:xfrm>
-            <a:off x="729450" y="1318650"/>
-            <a:ext cx="7688699" cy="535202"/>
-          </a:xfrm>
-          <a:prstGeom prst="rect">
-            <a:avLst/>
-          </a:prstGeom>
-        </p:spPr>
-        <p:txBody>
-          <a:bodyPr/>
-          <a:lstStyle>
-            <a:lvl1pPr defTabSz="795527">
-              <a:defRPr sz="2200"/>
-            </a:lvl1pPr>
-          </a:lstStyle>
-          <a:p>
-            <a:pPr/>
-            <a:r>
-              <a:t>sort()</a:t>
-            </a:r>
-          </a:p>
-        </p:txBody>
-      </p:sp>
-      <p:sp>
-        <p:nvSpPr>
-          <p:cNvPr id="183" name="&gt;&gt;&gt; list=[3,6,4,9]…"/>
-          <p:cNvSpPr txBox="1"/>
-          <p:nvPr>
-            <p:ph type="body" sz="quarter" idx="1"/>
-          </p:nvPr>
-        </p:nvSpPr>
-        <p:spPr>
-          <a:xfrm>
-            <a:off x="729450" y="3153029"/>
-            <a:ext cx="7688699" cy="1186946"/>
-          </a:xfrm>
-          <a:prstGeom prst="rect">
-            <a:avLst/>
-          </a:prstGeom>
-          <a:solidFill>
-            <a:schemeClr val="accent1">
-              <a:lumOff val="-6980"/>
-            </a:schemeClr>
-          </a:solidFill>
-          <a:ln w="9525">
-            <a:solidFill>
-              <a:srgbClr val="193477"/>
-            </a:solidFill>
-            <a:round/>
-          </a:ln>
-          <a:effectLst>
-            <a:outerShdw sx="100000" sy="100000" kx="0" ky="0" algn="b" rotWithShape="0" blurRad="38100" dist="23000" dir="5400000">
+            <a:outerShdw blurRad="38100" dist="23000" dir="5400000" rotWithShape="0">
               <a:srgbClr val="000000">
                 <a:alpha val="35000"/>
               </a:srgbClr>
@@ -5337,7 +5413,7 @@
             <a:miter lim="400000"/>
           </a:ln>
           <a:effectLst>
-            <a:outerShdw sx="100000" sy="100000" kx="0" ky="0" algn="b" rotWithShape="0" blurRad="38100" dist="23000" dir="5400000">
+            <a:outerShdw blurRad="38100" dist="23000" dir="5400000" rotWithShape="0">
               <a:srgbClr val="000000">
                 <a:alpha val="35000"/>
               </a:srgbClr>
@@ -5345,13 +5421,13 @@
           </a:effectLst>
           <a:extLst>
             <a:ext uri="{C572A759-6A51-4108-AA02-DFA0A04FC94B}">
-              <ma14:wrappingTextBoxFlag xmlns:ma14="http://schemas.microsoft.com/office/mac/drawingml/2011/main" val="1"/>
+              <ma14:wrappingTextBoxFlag xmlns:ma14="http://schemas.microsoft.com/office/mac/drawingml/2011/main" xmlns:a14="http://schemas.microsoft.com/office/drawing/2010/main" xmlns:m="http://schemas.openxmlformats.org/officeDocument/2006/math" xmlns="" val="1"/>
             </a:ext>
           </a:extLst>
         </p:spPr>
         <p:txBody>
           <a:bodyPr lIns="91423" tIns="91423" rIns="91423" bIns="91423">
-            <a:normAutofit fontScale="100000" lnSpcReduction="0"/>
+            <a:normAutofit/>
           </a:bodyPr>
           <a:lstStyle>
             <a:lvl1pPr>
@@ -5365,7 +5441,6 @@
             </a:lvl1pPr>
           </a:lstStyle>
           <a:p>
-            <a:pPr/>
             <a:r>
               <a:t>It sorts the items inside the list</a:t>
             </a:r>
@@ -5377,12 +5452,12 @@
   <p:clrMapOvr>
     <a:masterClrMapping/>
   </p:clrMapOvr>
-  <p:transition xmlns:p14="http://schemas.microsoft.com/office/powerpoint/2010/main" spd="med" advClick="1"/>
+  <p:transition spd="med"/>
 </p:sld>
 </file>
 
 <file path=ppt/slides/slide2.xml><?xml version="1.0" encoding="utf-8"?>
-<p:sld xmlns:a="http://schemas.openxmlformats.org/drawingml/2006/main" xmlns:r="http://schemas.openxmlformats.org/officeDocument/2006/relationships" xmlns:p="http://schemas.openxmlformats.org/presentationml/2006/main" xmlns:m="http://schemas.openxmlformats.org/officeDocument/2006/math" xmlns:a14="http://schemas.microsoft.com/office/drawing/2010/main" showMasterSp="1" showMasterPhAnim="1">
+<p:sld xmlns:a="http://schemas.openxmlformats.org/drawingml/2006/main" xmlns:r="http://schemas.openxmlformats.org/officeDocument/2006/relationships" xmlns:p="http://schemas.openxmlformats.org/presentationml/2006/main">
   <p:cSld>
     <p:spTree>
       <p:nvGrpSpPr>
@@ -5401,7 +5476,9 @@
       <p:sp>
         <p:nvSpPr>
           <p:cNvPr id="119" name="Sequence"/>
-          <p:cNvSpPr txBox="1"/>
+          <p:cNvSpPr txBox="1">
+            <a:spLocks noGrp="1"/>
+          </p:cNvSpPr>
           <p:nvPr>
             <p:ph type="title"/>
           </p:nvPr>
@@ -5423,7 +5500,6 @@
             </a:lvl1pPr>
           </a:lstStyle>
           <a:p>
-            <a:pPr/>
             <a:r>
               <a:t>Sequence</a:t>
             </a:r>
@@ -5433,7 +5509,9 @@
       <p:sp>
         <p:nvSpPr>
           <p:cNvPr id="120" name="Sequence of elements…"/>
-          <p:cNvSpPr txBox="1"/>
+          <p:cNvSpPr txBox="1">
+            <a:spLocks noGrp="1"/>
+          </p:cNvSpPr>
           <p:nvPr>
             <p:ph type="body" sz="half" idx="1"/>
           </p:nvPr>
@@ -5493,12 +5571,117 @@
   <p:clrMapOvr>
     <a:masterClrMapping/>
   </p:clrMapOvr>
-  <p:transition xmlns:p14="http://schemas.microsoft.com/office/powerpoint/2010/main" spd="med" advClick="1"/>
+  <p:transition spd="med"/>
+</p:sld>
+</file>
+
+<file path=ppt/slides/slide20.xml><?xml version="1.0" encoding="utf-8"?>
+<p:sld xmlns:a="http://schemas.openxmlformats.org/drawingml/2006/main" xmlns:r="http://schemas.openxmlformats.org/officeDocument/2006/relationships" xmlns:p="http://schemas.openxmlformats.org/presentationml/2006/main">
+  <p:cSld>
+    <p:spTree>
+      <p:nvGrpSpPr>
+        <p:cNvPr id="1" name=""/>
+        <p:cNvGrpSpPr/>
+        <p:nvPr/>
+      </p:nvGrpSpPr>
+      <p:grpSpPr>
+        <a:xfrm>
+          <a:off x="0" y="0"/>
+          <a:ext cx="0" cy="0"/>
+          <a:chOff x="0" y="0"/>
+          <a:chExt cx="0" cy="0"/>
+        </a:xfrm>
+      </p:grpSpPr>
+      <p:sp>
+        <p:nvSpPr>
+          <p:cNvPr id="2" name="Title 1">
+            <a:extLst>
+              <a:ext uri="{FF2B5EF4-FFF2-40B4-BE49-F238E27FC236}">
+                <a16:creationId xmlns:a16="http://schemas.microsoft.com/office/drawing/2014/main" id="{AECF1183-191E-4453-8E8F-0B5BACF1A14D}"/>
+              </a:ext>
+            </a:extLst>
+          </p:cNvPr>
+          <p:cNvSpPr>
+            <a:spLocks noGrp="1"/>
+          </p:cNvSpPr>
+          <p:nvPr>
+            <p:ph type="title"/>
+          </p:nvPr>
+        </p:nvSpPr>
+        <p:spPr/>
+        <p:txBody>
+          <a:bodyPr>
+            <a:normAutofit fontScale="90000"/>
+          </a:bodyPr>
+          <a:lstStyle/>
+          <a:p>
+            <a:r>
+              <a:rPr lang="en-US" dirty="0"/>
+              <a:t>List Comprehension</a:t>
+            </a:r>
+          </a:p>
+        </p:txBody>
+      </p:sp>
+      <p:sp>
+        <p:nvSpPr>
+          <p:cNvPr id="3" name="Text Placeholder 2">
+            <a:extLst>
+              <a:ext uri="{FF2B5EF4-FFF2-40B4-BE49-F238E27FC236}">
+                <a16:creationId xmlns:a16="http://schemas.microsoft.com/office/drawing/2014/main" id="{2E33EB1A-7CB6-4CD5-A4B3-E4A21A9CB6B7}"/>
+              </a:ext>
+            </a:extLst>
+          </p:cNvPr>
+          <p:cNvSpPr>
+            <a:spLocks noGrp="1"/>
+          </p:cNvSpPr>
+          <p:nvPr>
+            <p:ph type="body" sz="half" idx="1"/>
+          </p:nvPr>
+        </p:nvSpPr>
+        <p:spPr/>
+        <p:txBody>
+          <a:bodyPr/>
+          <a:lstStyle/>
+          <a:p>
+            <a:r>
+              <a:rPr lang="en-US" dirty="0"/>
+              <a:t>Creating a List using an expression</a:t>
+            </a:r>
+          </a:p>
+          <a:p>
+            <a:endParaRPr lang="en-US" dirty="0"/>
+          </a:p>
+          <a:p>
+            <a:endParaRPr lang="en-US" dirty="0"/>
+          </a:p>
+          <a:p>
+            <a:r>
+              <a:rPr lang="en-US" dirty="0" err="1"/>
+              <a:t>Evennumbers</a:t>
+            </a:r>
+            <a:r>
+              <a:rPr lang="en-US" dirty="0"/>
+              <a:t>=[x*2 for x in range(10)]</a:t>
+            </a:r>
+          </a:p>
+        </p:txBody>
+      </p:sp>
+    </p:spTree>
+    <p:extLst>
+      <p:ext uri="{BB962C8B-B14F-4D97-AF65-F5344CB8AC3E}">
+        <p14:creationId xmlns:p14="http://schemas.microsoft.com/office/powerpoint/2010/main" val="4033747406"/>
+      </p:ext>
+    </p:extLst>
+  </p:cSld>
+  <p:clrMapOvr>
+    <a:masterClrMapping/>
+  </p:clrMapOvr>
+  <p:transition spd="med"/>
 </p:sld>
 </file>
 
 <file path=ppt/slides/slide3.xml><?xml version="1.0" encoding="utf-8"?>
-<p:sld xmlns:a="http://schemas.openxmlformats.org/drawingml/2006/main" xmlns:r="http://schemas.openxmlformats.org/officeDocument/2006/relationships" xmlns:p="http://schemas.openxmlformats.org/presentationml/2006/main" xmlns:m="http://schemas.openxmlformats.org/officeDocument/2006/math" xmlns:a14="http://schemas.microsoft.com/office/drawing/2010/main" showMasterSp="1" showMasterPhAnim="1">
+<p:sld xmlns:a="http://schemas.openxmlformats.org/drawingml/2006/main" xmlns:r="http://schemas.openxmlformats.org/officeDocument/2006/relationships" xmlns:p="http://schemas.openxmlformats.org/presentationml/2006/main">
   <p:cSld>
     <p:spTree>
       <p:nvGrpSpPr>
@@ -5517,7 +5700,9 @@
       <p:sp>
         <p:nvSpPr>
           <p:cNvPr id="122" name="Title 1"/>
-          <p:cNvSpPr txBox="1"/>
+          <p:cNvSpPr txBox="1">
+            <a:spLocks noGrp="1"/>
+          </p:cNvSpPr>
           <p:nvPr>
             <p:ph type="title"/>
           </p:nvPr>
@@ -5539,7 +5724,6 @@
             </a:lvl1pPr>
           </a:lstStyle>
           <a:p>
-            <a:pPr/>
             <a:r>
               <a:t>Python Sequences</a:t>
             </a:r>
@@ -5549,7 +5733,9 @@
       <p:sp>
         <p:nvSpPr>
           <p:cNvPr id="123" name="Text Placeholder 2"/>
-          <p:cNvSpPr txBox="1"/>
+          <p:cNvSpPr txBox="1">
+            <a:spLocks noGrp="1"/>
+          </p:cNvSpPr>
           <p:nvPr>
             <p:ph type="body" sz="half" idx="1"/>
           </p:nvPr>
@@ -5609,12 +5795,12 @@
   <p:clrMapOvr>
     <a:masterClrMapping/>
   </p:clrMapOvr>
-  <p:transition xmlns:p14="http://schemas.microsoft.com/office/powerpoint/2010/main" spd="med" advClick="1"/>
+  <p:transition spd="med"/>
 </p:sld>
 </file>
 
 <file path=ppt/slides/slide4.xml><?xml version="1.0" encoding="utf-8"?>
-<p:sld xmlns:a="http://schemas.openxmlformats.org/drawingml/2006/main" xmlns:r="http://schemas.openxmlformats.org/officeDocument/2006/relationships" xmlns:p="http://schemas.openxmlformats.org/presentationml/2006/main" xmlns:m="http://schemas.openxmlformats.org/officeDocument/2006/math" xmlns:a14="http://schemas.microsoft.com/office/drawing/2010/main" showMasterSp="1" showMasterPhAnim="1">
+<p:sld xmlns:a="http://schemas.openxmlformats.org/drawingml/2006/main" xmlns:r="http://schemas.openxmlformats.org/officeDocument/2006/relationships" xmlns:p="http://schemas.openxmlformats.org/presentationml/2006/main">
   <p:cSld>
     <p:spTree>
       <p:nvGrpSpPr>
@@ -5633,7 +5819,9 @@
       <p:sp>
         <p:nvSpPr>
           <p:cNvPr id="125" name="Title 1"/>
-          <p:cNvSpPr txBox="1"/>
+          <p:cNvSpPr txBox="1">
+            <a:spLocks noGrp="1"/>
+          </p:cNvSpPr>
           <p:nvPr>
             <p:ph type="title"/>
           </p:nvPr>
@@ -5655,7 +5843,6 @@
             </a:lvl1pPr>
           </a:lstStyle>
           <a:p>
-            <a:pPr/>
             <a:r>
               <a:t>List</a:t>
             </a:r>
@@ -5665,7 +5852,9 @@
       <p:sp>
         <p:nvSpPr>
           <p:cNvPr id="126" name="Text Placeholder 2"/>
-          <p:cNvSpPr txBox="1"/>
+          <p:cNvSpPr txBox="1">
+            <a:spLocks noGrp="1"/>
+          </p:cNvSpPr>
           <p:nvPr>
             <p:ph type="body" sz="half" idx="1"/>
           </p:nvPr>
@@ -5694,18 +5883,18 @@
               <a:rPr b="1"/>
               <a:t>[ ]</a:t>
             </a:r>
-            <a:endParaRPr b="1"/>
           </a:p>
           <a:p>
             <a:pPr>
               <a:buSzPts val="1800"/>
-              <a:defRPr b="1" sz="1800"/>
+              <a:defRPr sz="1800" b="1"/>
             </a:pPr>
+            <a:endParaRPr b="1"/>
           </a:p>
           <a:p>
             <a:pPr>
               <a:buSzPts val="1800"/>
-              <a:defRPr b="1" sz="1800"/>
+              <a:defRPr sz="1800" b="1"/>
             </a:pPr>
             <a:r>
               <a:t>Fruits =[ ‘apple’, ’banana’,  ’orange’]</a:t>
@@ -5714,13 +5903,14 @@
           <a:p>
             <a:pPr>
               <a:buSzPts val="1800"/>
-              <a:defRPr b="1" sz="1800"/>
+              <a:defRPr sz="1800" b="1"/>
             </a:pPr>
+            <a:endParaRPr/>
           </a:p>
           <a:p>
             <a:pPr>
               <a:buSzPts val="1800"/>
-              <a:defRPr b="1" sz="1800"/>
+              <a:defRPr sz="1800" b="1"/>
             </a:pPr>
             <a:r>
               <a:t>Prices=[100,50,80]</a:t>
@@ -5733,12 +5923,12 @@
   <p:clrMapOvr>
     <a:masterClrMapping/>
   </p:clrMapOvr>
-  <p:transition xmlns:p14="http://schemas.microsoft.com/office/powerpoint/2010/main" spd="med" advClick="1"/>
+  <p:transition spd="med"/>
 </p:sld>
 </file>
 
 <file path=ppt/slides/slide5.xml><?xml version="1.0" encoding="utf-8"?>
-<p:sld xmlns:a="http://schemas.openxmlformats.org/drawingml/2006/main" xmlns:r="http://schemas.openxmlformats.org/officeDocument/2006/relationships" xmlns:p="http://schemas.openxmlformats.org/presentationml/2006/main" xmlns:m="http://schemas.openxmlformats.org/officeDocument/2006/math" xmlns:a14="http://schemas.microsoft.com/office/drawing/2010/main" showMasterSp="1" showMasterPhAnim="1">
+<p:sld xmlns:a="http://schemas.openxmlformats.org/drawingml/2006/main" xmlns:r="http://schemas.openxmlformats.org/officeDocument/2006/relationships" xmlns:p="http://schemas.openxmlformats.org/presentationml/2006/main">
   <p:cSld>
     <p:spTree>
       <p:nvGrpSpPr>
@@ -5757,7 +5947,9 @@
       <p:sp>
         <p:nvSpPr>
           <p:cNvPr id="128" name="Title 1"/>
-          <p:cNvSpPr txBox="1"/>
+          <p:cNvSpPr txBox="1">
+            <a:spLocks noGrp="1"/>
+          </p:cNvSpPr>
           <p:nvPr>
             <p:ph type="title"/>
           </p:nvPr>
@@ -5779,7 +5971,6 @@
             </a:lvl1pPr>
           </a:lstStyle>
           <a:p>
-            <a:pPr/>
             <a:r>
               <a:t>Accessing values from a list</a:t>
             </a:r>
@@ -5789,7 +5980,9 @@
       <p:sp>
         <p:nvSpPr>
           <p:cNvPr id="129" name="Text Placeholder 2"/>
-          <p:cNvSpPr txBox="1"/>
+          <p:cNvSpPr txBox="1">
+            <a:spLocks noGrp="1"/>
+          </p:cNvSpPr>
           <p:nvPr>
             <p:ph type="body" sz="half" idx="1"/>
           </p:nvPr>
@@ -5816,7 +6009,7 @@
             </a:r>
           </a:p>
           <a:p>
-            <a:pPr lvl="1" marL="0" indent="615950">
+            <a:pPr marL="0" lvl="1" indent="615950">
               <a:spcBef>
                 <a:spcPts val="1600"/>
               </a:spcBef>
@@ -5830,7 +6023,7 @@
             <a:endParaRPr sz="1100"/>
           </a:p>
           <a:p>
-            <a:pPr lvl="1" marL="0" indent="615950">
+            <a:pPr marL="0" lvl="1" indent="615950">
               <a:spcBef>
                 <a:spcPts val="1600"/>
               </a:spcBef>
@@ -5849,12 +6042,12 @@
   <p:clrMapOvr>
     <a:masterClrMapping/>
   </p:clrMapOvr>
-  <p:transition xmlns:p14="http://schemas.microsoft.com/office/powerpoint/2010/main" spd="med" advClick="1"/>
+  <p:transition spd="med"/>
 </p:sld>
 </file>
 
 <file path=ppt/slides/slide6.xml><?xml version="1.0" encoding="utf-8"?>
-<p:sld xmlns:a="http://schemas.openxmlformats.org/drawingml/2006/main" xmlns:r="http://schemas.openxmlformats.org/officeDocument/2006/relationships" xmlns:p="http://schemas.openxmlformats.org/presentationml/2006/main" xmlns:m="http://schemas.openxmlformats.org/officeDocument/2006/math" xmlns:a14="http://schemas.microsoft.com/office/drawing/2010/main" showMasterSp="1" showMasterPhAnim="1">
+<p:sld xmlns:a="http://schemas.openxmlformats.org/drawingml/2006/main" xmlns:r="http://schemas.openxmlformats.org/officeDocument/2006/relationships" xmlns:p="http://schemas.openxmlformats.org/presentationml/2006/main">
   <p:cSld>
     <p:spTree>
       <p:nvGrpSpPr>
@@ -5872,8 +6065,10 @@
       </p:grpSpPr>
       <p:sp>
         <p:nvSpPr>
-          <p:cNvPr id="131" name="Title 1"/>
-          <p:cNvSpPr txBox="1"/>
+          <p:cNvPr id="141" name="List Operations"/>
+          <p:cNvSpPr txBox="1">
+            <a:spLocks noGrp="1"/>
+          </p:cNvSpPr>
           <p:nvPr>
             <p:ph type="title"/>
           </p:nvPr>
@@ -5895,7 +6090,113 @@
             </a:lvl1pPr>
           </a:lstStyle>
           <a:p>
-            <a:pPr/>
+            <a:r>
+              <a:t>List Operations</a:t>
+            </a:r>
+          </a:p>
+        </p:txBody>
+      </p:sp>
+      <p:sp>
+        <p:nvSpPr>
+          <p:cNvPr id="142" name="Update…"/>
+          <p:cNvSpPr txBox="1">
+            <a:spLocks noGrp="1"/>
+          </p:cNvSpPr>
+          <p:nvPr>
+            <p:ph type="body" sz="half" idx="1"/>
+          </p:nvPr>
+        </p:nvSpPr>
+        <p:spPr>
+          <a:xfrm>
+            <a:off x="729450" y="2078875"/>
+            <a:ext cx="7688699" cy="2261101"/>
+          </a:xfrm>
+          <a:prstGeom prst="rect">
+            <a:avLst/>
+          </a:prstGeom>
+        </p:spPr>
+        <p:txBody>
+          <a:bodyPr/>
+          <a:lstStyle/>
+          <a:p>
+            <a:r>
+              <a:rPr dirty="0"/>
+              <a:t>Update</a:t>
+            </a:r>
+          </a:p>
+          <a:p>
+            <a:r>
+              <a:rPr dirty="0"/>
+              <a:t>Delete</a:t>
+            </a:r>
+          </a:p>
+          <a:p>
+            <a:r>
+              <a:rPr dirty="0"/>
+              <a:t>Len</a:t>
+            </a:r>
+          </a:p>
+          <a:p>
+            <a:r>
+              <a:rPr dirty="0"/>
+              <a:t>Slicing</a:t>
+            </a:r>
+          </a:p>
+        </p:txBody>
+      </p:sp>
+    </p:spTree>
+  </p:cSld>
+  <p:clrMapOvr>
+    <a:masterClrMapping/>
+  </p:clrMapOvr>
+  <p:transition spd="med"/>
+</p:sld>
+</file>
+
+<file path=ppt/slides/slide7.xml><?xml version="1.0" encoding="utf-8"?>
+<p:sld xmlns:a="http://schemas.openxmlformats.org/drawingml/2006/main" xmlns:r="http://schemas.openxmlformats.org/officeDocument/2006/relationships" xmlns:p="http://schemas.openxmlformats.org/presentationml/2006/main">
+  <p:cSld>
+    <p:spTree>
+      <p:nvGrpSpPr>
+        <p:cNvPr id="1" name=""/>
+        <p:cNvGrpSpPr/>
+        <p:nvPr/>
+      </p:nvGrpSpPr>
+      <p:grpSpPr>
+        <a:xfrm>
+          <a:off x="0" y="0"/>
+          <a:ext cx="0" cy="0"/>
+          <a:chOff x="0" y="0"/>
+          <a:chExt cx="0" cy="0"/>
+        </a:xfrm>
+      </p:grpSpPr>
+      <p:sp>
+        <p:nvSpPr>
+          <p:cNvPr id="131" name="Title 1"/>
+          <p:cNvSpPr txBox="1">
+            <a:spLocks noGrp="1"/>
+          </p:cNvSpPr>
+          <p:nvPr>
+            <p:ph type="title"/>
+          </p:nvPr>
+        </p:nvSpPr>
+        <p:spPr>
+          <a:xfrm>
+            <a:off x="729450" y="1318650"/>
+            <a:ext cx="7688699" cy="535202"/>
+          </a:xfrm>
+          <a:prstGeom prst="rect">
+            <a:avLst/>
+          </a:prstGeom>
+        </p:spPr>
+        <p:txBody>
+          <a:bodyPr/>
+          <a:lstStyle>
+            <a:lvl1pPr defTabSz="795527">
+              <a:defRPr sz="2200"/>
+            </a:lvl1pPr>
+          </a:lstStyle>
+          <a:p>
             <a:r>
               <a:t>Slicing a list</a:t>
             </a:r>
@@ -5905,7 +6206,9 @@
       <p:sp>
         <p:nvSpPr>
           <p:cNvPr id="132" name="Text Placeholder 2"/>
-          <p:cNvSpPr txBox="1"/>
+          <p:cNvSpPr txBox="1">
+            <a:spLocks noGrp="1"/>
+          </p:cNvSpPr>
           <p:nvPr>
             <p:ph type="body" sz="quarter" idx="1"/>
           </p:nvPr>
@@ -5934,7 +6237,6 @@
             </a:lvl1pPr>
           </a:lstStyle>
           <a:p>
-            <a:pPr/>
             <a:r>
               <a:t>&gt;&gt;&gt; Print ( fruits[1:3])</a:t>
             </a:r>
@@ -5960,7 +6262,7 @@
           </a:ln>
           <a:extLst>
             <a:ext uri="{C572A759-6A51-4108-AA02-DFA0A04FC94B}">
-              <ma14:wrappingTextBoxFlag xmlns:ma14="http://schemas.microsoft.com/office/mac/drawingml/2011/main" val="1"/>
+              <ma14:wrappingTextBoxFlag xmlns:ma14="http://schemas.microsoft.com/office/mac/drawingml/2011/main" xmlns:a14="http://schemas.microsoft.com/office/drawing/2010/main" xmlns:m="http://schemas.openxmlformats.org/officeDocument/2006/math" xmlns="" val="1"/>
             </a:ext>
           </a:extLst>
         </p:spPr>
@@ -5970,7 +6272,7 @@
           </a:bodyPr>
           <a:lstStyle>
             <a:lvl1pPr>
-              <a:defRPr b="1" sz="2600">
+              <a:defRPr sz="2600" b="1">
                 <a:solidFill>
                   <a:srgbClr val="1A1A1A"/>
                 </a:solidFill>
@@ -5982,7 +6284,6 @@
             </a:lvl1pPr>
           </a:lstStyle>
           <a:p>
-            <a:pPr/>
             <a:r>
               <a:t>Updating List</a:t>
             </a:r>
@@ -6043,6 +6344,7 @@
                   <a:sym typeface="Lato"/>
                 </a:defRPr>
               </a:pPr>
+              <a:endParaRPr/>
             </a:p>
           </p:txBody>
         </p:sp>
@@ -6068,7 +6370,7 @@
             <a:effectLst/>
             <a:extLst>
               <a:ext uri="{C572A759-6A51-4108-AA02-DFA0A04FC94B}">
-                <ma14:wrappingTextBoxFlag xmlns:ma14="http://schemas.microsoft.com/office/mac/drawingml/2011/main" val="1"/>
+                <ma14:wrappingTextBoxFlag xmlns:ma14="http://schemas.microsoft.com/office/mac/drawingml/2011/main" xmlns:a14="http://schemas.microsoft.com/office/drawing/2010/main" xmlns:m="http://schemas.openxmlformats.org/officeDocument/2006/math" xmlns="" val="1"/>
               </a:ext>
             </a:extLst>
           </p:spPr>
@@ -6134,12 +6436,12 @@
   <p:clrMapOvr>
     <a:masterClrMapping/>
   </p:clrMapOvr>
-  <p:transition xmlns:p14="http://schemas.microsoft.com/office/powerpoint/2010/main" spd="med" advClick="1"/>
+  <p:transition spd="med"/>
 </p:sld>
 </file>
 
-<file path=ppt/slides/slide7.xml><?xml version="1.0" encoding="utf-8"?>
-<p:sld xmlns:a="http://schemas.openxmlformats.org/drawingml/2006/main" xmlns:r="http://schemas.openxmlformats.org/officeDocument/2006/relationships" xmlns:p="http://schemas.openxmlformats.org/presentationml/2006/main" xmlns:m="http://schemas.openxmlformats.org/officeDocument/2006/math" xmlns:a14="http://schemas.microsoft.com/office/drawing/2010/main" showMasterSp="1" showMasterPhAnim="1">
+<file path=ppt/slides/slide8.xml><?xml version="1.0" encoding="utf-8"?>
+<p:sld xmlns:a="http://schemas.openxmlformats.org/drawingml/2006/main" xmlns:r="http://schemas.openxmlformats.org/officeDocument/2006/relationships" xmlns:p="http://schemas.openxmlformats.org/presentationml/2006/main">
   <p:cSld>
     <p:spTree>
       <p:nvGrpSpPr>
@@ -6158,7 +6460,9 @@
       <p:sp>
         <p:nvSpPr>
           <p:cNvPr id="138" name="Title 1"/>
-          <p:cNvSpPr txBox="1"/>
+          <p:cNvSpPr txBox="1">
+            <a:spLocks noGrp="1"/>
+          </p:cNvSpPr>
           <p:nvPr>
             <p:ph type="title"/>
           </p:nvPr>
@@ -6180,7 +6484,6 @@
             </a:lvl1pPr>
           </a:lstStyle>
           <a:p>
-            <a:pPr/>
             <a:r>
               <a:t>Accessing values in a list</a:t>
             </a:r>
@@ -6190,7 +6493,9 @@
       <p:sp>
         <p:nvSpPr>
           <p:cNvPr id="139" name="Text Placeholder 2"/>
-          <p:cNvSpPr txBox="1"/>
+          <p:cNvSpPr txBox="1">
+            <a:spLocks noGrp="1"/>
+          </p:cNvSpPr>
           <p:nvPr>
             <p:ph type="body" sz="half" idx="1"/>
           </p:nvPr>
@@ -6215,7 +6520,7 @@
             <a:round/>
           </a:ln>
           <a:effectLst>
-            <a:outerShdw sx="100000" sy="100000" kx="0" ky="0" algn="b" rotWithShape="0" blurRad="38100" dist="23000" dir="5400000">
+            <a:outerShdw blurRad="38100" dist="23000" dir="5400000" rotWithShape="0">
               <a:srgbClr val="000000">
                 <a:alpha val="35000"/>
               </a:srgbClr>
@@ -6223,7 +6528,9 @@
           </a:effectLst>
         </p:spPr>
         <p:txBody>
-          <a:bodyPr/>
+          <a:bodyPr>
+            <a:normAutofit/>
+          </a:bodyPr>
           <a:lstStyle/>
           <a:p>
             <a:pPr marL="0" indent="0">
@@ -6243,6 +6550,7 @@
               </a:defRPr>
             </a:pPr>
             <a:r>
+              <a:rPr sz="2400" dirty="0"/>
               <a:t>Fruits =[ ‘apple’, ’banana’,  ’orange’]</a:t>
             </a:r>
           </a:p>
@@ -6264,9 +6572,10 @@
               </a:defRPr>
             </a:pPr>
             <a:r>
+              <a:rPr sz="2400" dirty="0"/>
               <a:t>Prices=[100,50,80]</a:t>
             </a:r>
-            <a:endParaRPr b="1">
+            <a:endParaRPr sz="2400" b="1" dirty="0">
               <a:latin typeface="Lato"/>
               <a:ea typeface="Lato"/>
               <a:cs typeface="Lato"/>
@@ -6291,8 +6600,28 @@
               </a:defRPr>
             </a:pPr>
             <a:r>
-              <a:t>print(</a:t>
-            </a:r>
+              <a:rPr lang="en-US" sz="2400" dirty="0"/>
+              <a:t>print(“Rate of “, fruits[0],”:”,prices[0])</a:t>
+            </a:r>
+          </a:p>
+          <a:p>
+            <a:pPr marL="0" indent="0">
+              <a:lnSpc>
+                <a:spcPct val="100000"/>
+              </a:lnSpc>
+              <a:buSzTx/>
+              <a:buNone/>
+              <a:defRPr sz="1400">
+                <a:solidFill>
+                  <a:srgbClr val="FFFFFF"/>
+                </a:solidFill>
+                <a:latin typeface="+mj-lt"/>
+                <a:ea typeface="+mj-ea"/>
+                <a:cs typeface="+mj-cs"/>
+                <a:sym typeface="Arial"/>
+              </a:defRPr>
+            </a:pPr>
+            <a:endParaRPr sz="2400" dirty="0"/>
           </a:p>
         </p:txBody>
       </p:sp>
@@ -6301,12 +6630,12 @@
   <p:clrMapOvr>
     <a:masterClrMapping/>
   </p:clrMapOvr>
-  <p:transition xmlns:p14="http://schemas.microsoft.com/office/powerpoint/2010/main" spd="med" advClick="1"/>
+  <p:transition spd="med"/>
 </p:sld>
 </file>
 
-<file path=ppt/slides/slide8.xml><?xml version="1.0" encoding="utf-8"?>
-<p:sld xmlns:a="http://schemas.openxmlformats.org/drawingml/2006/main" xmlns:r="http://schemas.openxmlformats.org/officeDocument/2006/relationships" xmlns:p="http://schemas.openxmlformats.org/presentationml/2006/main" xmlns:m="http://schemas.openxmlformats.org/officeDocument/2006/math" xmlns:a14="http://schemas.microsoft.com/office/drawing/2010/main" showMasterSp="1" showMasterPhAnim="1">
+<file path=ppt/slides/slide9.xml><?xml version="1.0" encoding="utf-8"?>
+<p:sld xmlns:a="http://schemas.openxmlformats.org/drawingml/2006/main" xmlns:r="http://schemas.openxmlformats.org/officeDocument/2006/relationships" xmlns:p="http://schemas.openxmlformats.org/presentationml/2006/main">
   <p:cSld>
     <p:spTree>
       <p:nvGrpSpPr>
@@ -6324,8 +6653,10 @@
       </p:grpSpPr>
       <p:sp>
         <p:nvSpPr>
-          <p:cNvPr id="141" name="List Operations"/>
-          <p:cNvSpPr txBox="1"/>
+          <p:cNvPr id="154" name="Index"/>
+          <p:cNvSpPr txBox="1">
+            <a:spLocks noGrp="1"/>
+          </p:cNvSpPr>
           <p:nvPr>
             <p:ph type="title"/>
           </p:nvPr>
@@ -6347,129 +6678,26 @@
             </a:lvl1pPr>
           </a:lstStyle>
           <a:p>
-            <a:pPr/>
-            <a:r>
-              <a:t>List Operations</a:t>
+            <a:r>
+              <a:t>Index </a:t>
             </a:r>
           </a:p>
         </p:txBody>
       </p:sp>
       <p:sp>
         <p:nvSpPr>
-          <p:cNvPr id="142" name="Update…"/>
-          <p:cNvSpPr txBox="1"/>
+          <p:cNvPr id="155" name="&gt;&gt;&gt; list=[3,6,4,9]…"/>
+          <p:cNvSpPr txBox="1">
+            <a:spLocks noGrp="1"/>
+          </p:cNvSpPr>
           <p:nvPr>
-            <p:ph type="body" sz="half" idx="1"/>
+            <p:ph type="body" sz="quarter" idx="1"/>
           </p:nvPr>
         </p:nvSpPr>
         <p:spPr>
           <a:xfrm>
-            <a:off x="729450" y="2078875"/>
-            <a:ext cx="7688699" cy="2261101"/>
-          </a:xfrm>
-          <a:prstGeom prst="rect">
-            <a:avLst/>
-          </a:prstGeom>
-        </p:spPr>
-        <p:txBody>
-          <a:bodyPr/>
-          <a:lstStyle/>
-          <a:p>
-            <a:pPr/>
-            <a:r>
-              <a:t>Update</a:t>
-            </a:r>
-          </a:p>
-          <a:p>
-            <a:pPr/>
-            <a:r>
-              <a:t>Delete</a:t>
-            </a:r>
-          </a:p>
-          <a:p>
-            <a:pPr/>
-            <a:r>
-              <a:t>Len</a:t>
-            </a:r>
-          </a:p>
-          <a:p>
-            <a:pPr/>
-            <a:r>
-              <a:t>Slicing</a:t>
-            </a:r>
-          </a:p>
-        </p:txBody>
-      </p:sp>
-    </p:spTree>
-  </p:cSld>
-  <p:clrMapOvr>
-    <a:masterClrMapping/>
-  </p:clrMapOvr>
-  <p:transition xmlns:p14="http://schemas.microsoft.com/office/powerpoint/2010/main" spd="med" advClick="1"/>
-</p:sld>
-</file>
-
-<file path=ppt/slides/slide9.xml><?xml version="1.0" encoding="utf-8"?>
-<p:sld xmlns:a="http://schemas.openxmlformats.org/drawingml/2006/main" xmlns:r="http://schemas.openxmlformats.org/officeDocument/2006/relationships" xmlns:p="http://schemas.openxmlformats.org/presentationml/2006/main" xmlns:m="http://schemas.openxmlformats.org/officeDocument/2006/math" xmlns:a14="http://schemas.microsoft.com/office/drawing/2010/main" showMasterSp="1" showMasterPhAnim="1">
-  <p:cSld>
-    <p:spTree>
-      <p:nvGrpSpPr>
-        <p:cNvPr id="1" name=""/>
-        <p:cNvGrpSpPr/>
-        <p:nvPr/>
-      </p:nvGrpSpPr>
-      <p:grpSpPr>
-        <a:xfrm>
-          <a:off x="0" y="0"/>
-          <a:ext cx="0" cy="0"/>
-          <a:chOff x="0" y="0"/>
-          <a:chExt cx="0" cy="0"/>
-        </a:xfrm>
-      </p:grpSpPr>
-      <p:sp>
-        <p:nvSpPr>
-          <p:cNvPr id="144" name="Update a list"/>
-          <p:cNvSpPr txBox="1"/>
-          <p:nvPr>
-            <p:ph type="title"/>
-          </p:nvPr>
-        </p:nvSpPr>
-        <p:spPr>
-          <a:xfrm>
-            <a:off x="729450" y="1318650"/>
-            <a:ext cx="7688699" cy="535202"/>
-          </a:xfrm>
-          <a:prstGeom prst="rect">
-            <a:avLst/>
-          </a:prstGeom>
-        </p:spPr>
-        <p:txBody>
-          <a:bodyPr/>
-          <a:lstStyle>
-            <a:lvl1pPr defTabSz="795527">
-              <a:defRPr sz="2200"/>
-            </a:lvl1pPr>
-          </a:lstStyle>
-          <a:p>
-            <a:pPr/>
-            <a:r>
-              <a:t>Update a list</a:t>
-            </a:r>
-          </a:p>
-        </p:txBody>
-      </p:sp>
-      <p:sp>
-        <p:nvSpPr>
-          <p:cNvPr id="145" name="&gt;&gt;&gt; list=[1,2,3]…"/>
-          <p:cNvSpPr txBox="1"/>
-          <p:nvPr>
-            <p:ph type="body" sz="half" idx="1"/>
-          </p:nvPr>
-        </p:nvSpPr>
-        <p:spPr>
-          <a:xfrm>
-            <a:off x="729450" y="2078875"/>
-            <a:ext cx="7688699" cy="2261101"/>
+            <a:off x="729450" y="3153029"/>
+            <a:ext cx="7688699" cy="1186946"/>
           </a:xfrm>
           <a:prstGeom prst="rect">
             <a:avLst/>
@@ -6486,7 +6714,7 @@
             <a:round/>
           </a:ln>
           <a:effectLst>
-            <a:outerShdw sx="100000" sy="100000" kx="0" ky="0" algn="b" rotWithShape="0" blurRad="38100" dist="23000" dir="5400000">
+            <a:outerShdw blurRad="38100" dist="23000" dir="5400000" rotWithShape="0">
               <a:srgbClr val="000000">
                 <a:alpha val="35000"/>
               </a:srgbClr>
@@ -6514,7 +6742,8 @@
               </a:defRPr>
             </a:pPr>
             <a:r>
-              <a:t>&gt;&gt;&gt; list=[1,2,3]</a:t>
+              <a:rPr dirty="0"/>
+              <a:t>&gt;&gt;&gt; list=[3,6,4,9]</a:t>
             </a:r>
           </a:p>
           <a:p>
@@ -6535,7 +6764,16 @@
               </a:defRPr>
             </a:pPr>
             <a:r>
-              <a:t>&gt;&gt;&gt; list[1]=0</a:t>
+              <a:rPr dirty="0"/>
+              <a:t>&gt;&gt;&gt;</a:t>
+            </a:r>
+            <a:r>
+              <a:rPr dirty="0" err="1"/>
+              <a:t>list.index</a:t>
+            </a:r>
+            <a:r>
+              <a:rPr dirty="0"/>
+              <a:t>(9)</a:t>
             </a:r>
           </a:p>
           <a:p>
@@ -6556,28 +6794,63 @@
               </a:defRPr>
             </a:pPr>
             <a:r>
-              <a:t>&gt;&gt;&gt; list</a:t>
-            </a:r>
-          </a:p>
-          <a:p>
-            <a:pPr marL="0" indent="0">
-              <a:lnSpc>
-                <a:spcPct val="100000"/>
-              </a:lnSpc>
-              <a:buSzTx/>
-              <a:buNone/>
-              <a:defRPr sz="1400">
+              <a:rPr dirty="0"/>
+              <a:t>&gt;&gt;&gt; 3</a:t>
+            </a:r>
+          </a:p>
+        </p:txBody>
+      </p:sp>
+      <p:sp>
+        <p:nvSpPr>
+          <p:cNvPr id="156" name="You can find index of an item using index method"/>
+          <p:cNvSpPr/>
+          <p:nvPr/>
+        </p:nvSpPr>
+        <p:spPr>
+          <a:xfrm>
+            <a:off x="727650" y="1907584"/>
+            <a:ext cx="7688699" cy="1186948"/>
+          </a:xfrm>
+          <a:prstGeom prst="rect">
+            <a:avLst/>
+          </a:prstGeom>
+          <a:solidFill>
+            <a:srgbClr val="FFFFFF"/>
+          </a:solidFill>
+          <a:ln w="12700">
+            <a:miter lim="400000"/>
+          </a:ln>
+          <a:effectLst>
+            <a:outerShdw blurRad="38100" dist="23000" dir="5400000" rotWithShape="0">
+              <a:srgbClr val="000000">
+                <a:alpha val="35000"/>
+              </a:srgbClr>
+            </a:outerShdw>
+          </a:effectLst>
+          <a:extLst>
+            <a:ext uri="{C572A759-6A51-4108-AA02-DFA0A04FC94B}">
+              <ma14:wrappingTextBoxFlag xmlns:ma14="http://schemas.microsoft.com/office/mac/drawingml/2011/main" xmlns:a14="http://schemas.microsoft.com/office/drawing/2010/main" xmlns:m="http://schemas.openxmlformats.org/officeDocument/2006/math" xmlns="" val="1"/>
+            </a:ext>
+          </a:extLst>
+        </p:spPr>
+        <p:txBody>
+          <a:bodyPr lIns="91423" tIns="91423" rIns="91423" bIns="91423">
+            <a:normAutofit/>
+          </a:bodyPr>
+          <a:lstStyle>
+            <a:lvl1pPr>
+              <a:defRPr>
                 <a:solidFill>
-                  <a:srgbClr val="FFFFFF"/>
+                  <a:schemeClr val="accent1">
+                    <a:lumOff val="-6980"/>
+                  </a:schemeClr>
                 </a:solidFill>
-                <a:latin typeface="+mj-lt"/>
-                <a:ea typeface="+mj-ea"/>
-                <a:cs typeface="+mj-cs"/>
-                <a:sym typeface="Arial"/>
               </a:defRPr>
-            </a:pPr>
-            <a:r>
-              <a:t>[1,0,3]</a:t>
+            </a:lvl1pPr>
+          </a:lstStyle>
+          <a:p>
+            <a:r>
+              <a:t>You can find index of an item using index method</a:t>
             </a:r>
           </a:p>
         </p:txBody>
@@ -6587,12 +6860,12 @@
   <p:clrMapOvr>
     <a:masterClrMapping/>
   </p:clrMapOvr>
-  <p:transition xmlns:p14="http://schemas.microsoft.com/office/powerpoint/2010/main" spd="med" advClick="1"/>
+  <p:transition spd="med"/>
 </p:sld>
 </file>
 
 <file path=ppt/theme/theme1.xml><?xml version="1.0" encoding="utf-8"?>
-<a:theme xmlns:a="http://schemas.openxmlformats.org/drawingml/2006/main" xmlns:r="http://schemas.openxmlformats.org/officeDocument/2006/relationships" name="Streamline">
+<a:theme xmlns:a="http://schemas.openxmlformats.org/drawingml/2006/main" name="Streamline">
   <a:themeElements>
     <a:clrScheme name="Streamline">
       <a:dk1>
@@ -6718,7 +6991,7 @@
       <a:effectStyleLst>
         <a:effectStyle>
           <a:effectLst>
-            <a:outerShdw sx="100000" sy="100000" kx="0" ky="0" algn="b" rotWithShape="0" blurRad="38100" dist="23000" dir="5400000">
+            <a:outerShdw blurRad="38100" dist="23000" dir="5400000" rotWithShape="0">
               <a:srgbClr val="000000">
                 <a:alpha val="35000"/>
               </a:srgbClr>
@@ -6727,7 +7000,7 @@
         </a:effectStyle>
         <a:effectStyle>
           <a:effectLst>
-            <a:outerShdw sx="100000" sy="100000" kx="0" ky="0" algn="b" rotWithShape="0" blurRad="38100" dist="23000" dir="5400000">
+            <a:outerShdw blurRad="38100" dist="23000" dir="5400000" rotWithShape="0">
               <a:srgbClr val="000000">
                 <a:alpha val="35000"/>
               </a:srgbClr>
@@ -6736,7 +7009,7 @@
         </a:effectStyle>
         <a:effectStyle>
           <a:effectLst>
-            <a:outerShdw sx="100000" sy="100000" kx="0" ky="0" algn="b" rotWithShape="0" blurRad="38100" dist="23000" dir="5400000">
+            <a:outerShdw blurRad="38100" dist="23000" dir="5400000" rotWithShape="0">
               <a:srgbClr val="000000">
                 <a:alpha val="35000"/>
               </a:srgbClr>
@@ -6810,7 +7083,7 @@
           <a:round/>
         </a:ln>
         <a:effectLst>
-          <a:outerShdw sx="100000" sy="100000" kx="0" ky="0" algn="b" rotWithShape="0" blurRad="38100" dist="23000" dir="5400000">
+          <a:outerShdw blurRad="38100" dist="23000" dir="5400000" rotWithShape="0">
             <a:srgbClr val="000000">
               <a:alpha val="35000"/>
             </a:srgbClr>
@@ -6818,7 +7091,7 @@
         </a:effectLst>
         <a:sp3d/>
       </a:spPr>
-      <a:bodyPr rot="0" spcFirstLastPara="1" vertOverflow="overflow" horzOverflow="overflow" vert="horz" wrap="square" lIns="45718" tIns="45718" rIns="45718" bIns="45718" numCol="1" spcCol="38100" rtlCol="0" anchor="ctr" upright="0">
+      <a:bodyPr rot="0" spcFirstLastPara="1" vertOverflow="overflow" horzOverflow="overflow" vert="horz" wrap="square" lIns="45718" tIns="45718" rIns="45718" bIns="45718" numCol="1" spcCol="38100" rtlCol="0" anchor="ctr">
         <a:spAutoFit/>
       </a:bodyPr>
       <a:lstStyle>
@@ -6837,7 +7110,7 @@
           <a:buFontTx/>
           <a:buNone/>
           <a:tabLst/>
-          <a:defRPr b="0" baseline="0" cap="none" i="0" spc="0" strike="noStrike" sz="1400" u="none" kumimoji="0" normalizeH="0">
+          <a:defRPr kumimoji="0" sz="1400" b="0" i="0" u="none" strike="noStrike" cap="none" spc="0" normalizeH="0" baseline="0">
             <a:ln>
               <a:noFill/>
             </a:ln>
@@ -6867,7 +7140,7 @@
           <a:buFontTx/>
           <a:buNone/>
           <a:tabLst/>
-          <a:defRPr b="0" baseline="0" cap="none" i="0" spc="0" strike="noStrike" sz="1800" u="none" kumimoji="0" normalizeH="0">
+          <a:defRPr kumimoji="0" sz="1800" b="0" i="0" u="none" strike="noStrike" cap="none" spc="0" normalizeH="0" baseline="0">
             <a:ln>
               <a:noFill/>
             </a:ln>
@@ -6893,7 +7166,7 @@
           <a:buFontTx/>
           <a:buNone/>
           <a:tabLst/>
-          <a:defRPr b="0" baseline="0" cap="none" i="0" spc="0" strike="noStrike" sz="1800" u="none" kumimoji="0" normalizeH="0">
+          <a:defRPr kumimoji="0" sz="1800" b="0" i="0" u="none" strike="noStrike" cap="none" spc="0" normalizeH="0" baseline="0">
             <a:ln>
               <a:noFill/>
             </a:ln>
@@ -6919,7 +7192,7 @@
           <a:buFontTx/>
           <a:buNone/>
           <a:tabLst/>
-          <a:defRPr b="0" baseline="0" cap="none" i="0" spc="0" strike="noStrike" sz="1800" u="none" kumimoji="0" normalizeH="0">
+          <a:defRPr kumimoji="0" sz="1800" b="0" i="0" u="none" strike="noStrike" cap="none" spc="0" normalizeH="0" baseline="0">
             <a:ln>
               <a:noFill/>
             </a:ln>
@@ -6945,7 +7218,7 @@
           <a:buFontTx/>
           <a:buNone/>
           <a:tabLst/>
-          <a:defRPr b="0" baseline="0" cap="none" i="0" spc="0" strike="noStrike" sz="1800" u="none" kumimoji="0" normalizeH="0">
+          <a:defRPr kumimoji="0" sz="1800" b="0" i="0" u="none" strike="noStrike" cap="none" spc="0" normalizeH="0" baseline="0">
             <a:ln>
               <a:noFill/>
             </a:ln>
@@ -6971,7 +7244,7 @@
           <a:buFontTx/>
           <a:buNone/>
           <a:tabLst/>
-          <a:defRPr b="0" baseline="0" cap="none" i="0" spc="0" strike="noStrike" sz="1800" u="none" kumimoji="0" normalizeH="0">
+          <a:defRPr kumimoji="0" sz="1800" b="0" i="0" u="none" strike="noStrike" cap="none" spc="0" normalizeH="0" baseline="0">
             <a:ln>
               <a:noFill/>
             </a:ln>
@@ -6997,7 +7270,7 @@
           <a:buFontTx/>
           <a:buNone/>
           <a:tabLst/>
-          <a:defRPr b="0" baseline="0" cap="none" i="0" spc="0" strike="noStrike" sz="1800" u="none" kumimoji="0" normalizeH="0">
+          <a:defRPr kumimoji="0" sz="1800" b="0" i="0" u="none" strike="noStrike" cap="none" spc="0" normalizeH="0" baseline="0">
             <a:ln>
               <a:noFill/>
             </a:ln>
@@ -7023,7 +7296,7 @@
           <a:buFontTx/>
           <a:buNone/>
           <a:tabLst/>
-          <a:defRPr b="0" baseline="0" cap="none" i="0" spc="0" strike="noStrike" sz="1800" u="none" kumimoji="0" normalizeH="0">
+          <a:defRPr kumimoji="0" sz="1800" b="0" i="0" u="none" strike="noStrike" cap="none" spc="0" normalizeH="0" baseline="0">
             <a:ln>
               <a:noFill/>
             </a:ln>
@@ -7049,7 +7322,7 @@
           <a:buFontTx/>
           <a:buNone/>
           <a:tabLst/>
-          <a:defRPr b="0" baseline="0" cap="none" i="0" spc="0" strike="noStrike" sz="1800" u="none" kumimoji="0" normalizeH="0">
+          <a:defRPr kumimoji="0" sz="1800" b="0" i="0" u="none" strike="noStrike" cap="none" spc="0" normalizeH="0" baseline="0">
             <a:ln>
               <a:noFill/>
             </a:ln>
@@ -7075,7 +7348,7 @@
           <a:buFontTx/>
           <a:buNone/>
           <a:tabLst/>
-          <a:defRPr b="0" baseline="0" cap="none" i="0" spc="0" strike="noStrike" sz="1800" u="none" kumimoji="0" normalizeH="0">
+          <a:defRPr kumimoji="0" sz="1800" b="0" i="0" u="none" strike="noStrike" cap="none" spc="0" normalizeH="0" baseline="0">
             <a:ln>
               <a:noFill/>
             </a:ln>
@@ -7088,9 +7361,15 @@
         </a:lvl9pPr>
       </a:lstStyle>
       <a:style>
-        <a:lnRef idx="0"/>
-        <a:fillRef idx="0"/>
-        <a:effectRef idx="0"/>
+        <a:lnRef idx="0">
+          <a:scrgbClr r="0" g="0" b="0"/>
+        </a:lnRef>
+        <a:fillRef idx="0">
+          <a:scrgbClr r="0" g="0" b="0"/>
+        </a:fillRef>
+        <a:effectRef idx="0">
+          <a:scrgbClr r="0" g="0" b="0"/>
+        </a:effectRef>
         <a:fontRef idx="none"/>
       </a:style>
     </a:spDef>
@@ -7105,7 +7384,7 @@
           <a:round/>
         </a:ln>
         <a:effectLst>
-          <a:outerShdw sx="100000" sy="100000" kx="0" ky="0" algn="b" rotWithShape="0" blurRad="38100" dist="23000" dir="5400000">
+          <a:outerShdw blurRad="38100" dist="23000" dir="5400000" rotWithShape="0">
             <a:srgbClr val="000000">
               <a:alpha val="35000"/>
             </a:srgbClr>
@@ -7113,7 +7392,7 @@
         </a:effectLst>
         <a:sp3d/>
       </a:spPr>
-      <a:bodyPr rot="0" spcFirstLastPara="1" vertOverflow="overflow" horzOverflow="overflow" vert="horz" wrap="square" lIns="91439" tIns="45719" rIns="91439" bIns="45719" numCol="1" spcCol="38100" rtlCol="0" anchor="t" upright="0">
+      <a:bodyPr rot="0" spcFirstLastPara="1" vertOverflow="overflow" horzOverflow="overflow" vert="horz" wrap="square" lIns="91439" tIns="45719" rIns="91439" bIns="45719" numCol="1" spcCol="38100" rtlCol="0" anchor="t">
         <a:noAutofit/>
       </a:bodyPr>
       <a:lstStyle>
@@ -7132,7 +7411,7 @@
           <a:buFontTx/>
           <a:buNone/>
           <a:tabLst/>
-          <a:defRPr b="0" baseline="0" cap="none" i="0" spc="0" strike="noStrike" sz="1800" u="none" kumimoji="0" normalizeH="0">
+          <a:defRPr kumimoji="0" sz="1800" b="0" i="0" u="none" strike="noStrike" cap="none" spc="0" normalizeH="0" baseline="0">
             <a:ln>
               <a:noFill/>
             </a:ln>
@@ -7158,7 +7437,7 @@
           <a:buFontTx/>
           <a:buNone/>
           <a:tabLst/>
-          <a:defRPr b="0" baseline="0" cap="none" i="0" spc="0" strike="noStrike" sz="1800" u="none" kumimoji="0" normalizeH="0">
+          <a:defRPr kumimoji="0" sz="1800" b="0" i="0" u="none" strike="noStrike" cap="none" spc="0" normalizeH="0" baseline="0">
             <a:ln>
               <a:noFill/>
             </a:ln>
@@ -7184,7 +7463,7 @@
           <a:buFontTx/>
           <a:buNone/>
           <a:tabLst/>
-          <a:defRPr b="0" baseline="0" cap="none" i="0" spc="0" strike="noStrike" sz="1800" u="none" kumimoji="0" normalizeH="0">
+          <a:defRPr kumimoji="0" sz="1800" b="0" i="0" u="none" strike="noStrike" cap="none" spc="0" normalizeH="0" baseline="0">
             <a:ln>
               <a:noFill/>
             </a:ln>
@@ -7210,7 +7489,7 @@
           <a:buFontTx/>
           <a:buNone/>
           <a:tabLst/>
-          <a:defRPr b="0" baseline="0" cap="none" i="0" spc="0" strike="noStrike" sz="1800" u="none" kumimoji="0" normalizeH="0">
+          <a:defRPr kumimoji="0" sz="1800" b="0" i="0" u="none" strike="noStrike" cap="none" spc="0" normalizeH="0" baseline="0">
             <a:ln>
               <a:noFill/>
             </a:ln>
@@ -7236,7 +7515,7 @@
           <a:buFontTx/>
           <a:buNone/>
           <a:tabLst/>
-          <a:defRPr b="0" baseline="0" cap="none" i="0" spc="0" strike="noStrike" sz="1800" u="none" kumimoji="0" normalizeH="0">
+          <a:defRPr kumimoji="0" sz="1800" b="0" i="0" u="none" strike="noStrike" cap="none" spc="0" normalizeH="0" baseline="0">
             <a:ln>
               <a:noFill/>
             </a:ln>
@@ -7262,7 +7541,7 @@
           <a:buFontTx/>
           <a:buNone/>
           <a:tabLst/>
-          <a:defRPr b="0" baseline="0" cap="none" i="0" spc="0" strike="noStrike" sz="1800" u="none" kumimoji="0" normalizeH="0">
+          <a:defRPr kumimoji="0" sz="1800" b="0" i="0" u="none" strike="noStrike" cap="none" spc="0" normalizeH="0" baseline="0">
             <a:ln>
               <a:noFill/>
             </a:ln>
@@ -7288,7 +7567,7 @@
           <a:buFontTx/>
           <a:buNone/>
           <a:tabLst/>
-          <a:defRPr b="0" baseline="0" cap="none" i="0" spc="0" strike="noStrike" sz="1800" u="none" kumimoji="0" normalizeH="0">
+          <a:defRPr kumimoji="0" sz="1800" b="0" i="0" u="none" strike="noStrike" cap="none" spc="0" normalizeH="0" baseline="0">
             <a:ln>
               <a:noFill/>
             </a:ln>
@@ -7314,7 +7593,7 @@
           <a:buFontTx/>
           <a:buNone/>
           <a:tabLst/>
-          <a:defRPr b="0" baseline="0" cap="none" i="0" spc="0" strike="noStrike" sz="1800" u="none" kumimoji="0" normalizeH="0">
+          <a:defRPr kumimoji="0" sz="1800" b="0" i="0" u="none" strike="noStrike" cap="none" spc="0" normalizeH="0" baseline="0">
             <a:ln>
               <a:noFill/>
             </a:ln>
@@ -7340,7 +7619,7 @@
           <a:buFontTx/>
           <a:buNone/>
           <a:tabLst/>
-          <a:defRPr b="0" baseline="0" cap="none" i="0" spc="0" strike="noStrike" sz="1800" u="none" kumimoji="0" normalizeH="0">
+          <a:defRPr kumimoji="0" sz="1800" b="0" i="0" u="none" strike="noStrike" cap="none" spc="0" normalizeH="0" baseline="0">
             <a:ln>
               <a:noFill/>
             </a:ln>
@@ -7366,7 +7645,7 @@
           <a:buFontTx/>
           <a:buNone/>
           <a:tabLst/>
-          <a:defRPr b="0" baseline="0" cap="none" i="0" spc="0" strike="noStrike" sz="1800" u="none" kumimoji="0" normalizeH="0">
+          <a:defRPr kumimoji="0" sz="1800" b="0" i="0" u="none" strike="noStrike" cap="none" spc="0" normalizeH="0" baseline="0">
             <a:ln>
               <a:noFill/>
             </a:ln>
@@ -7379,9 +7658,15 @@
         </a:lvl9pPr>
       </a:lstStyle>
       <a:style>
-        <a:lnRef idx="0"/>
-        <a:fillRef idx="0"/>
-        <a:effectRef idx="0"/>
+        <a:lnRef idx="0">
+          <a:scrgbClr r="0" g="0" b="0"/>
+        </a:lnRef>
+        <a:fillRef idx="0">
+          <a:scrgbClr r="0" g="0" b="0"/>
+        </a:fillRef>
+        <a:effectRef idx="0">
+          <a:scrgbClr r="0" g="0" b="0"/>
+        </a:effectRef>
         <a:fontRef idx="none"/>
       </a:style>
     </a:lnDef>
@@ -7395,7 +7680,7 @@
         <a:effectLst/>
         <a:sp3d/>
       </a:spPr>
-      <a:bodyPr rot="0" spcFirstLastPara="1" vertOverflow="overflow" horzOverflow="overflow" vert="horz" wrap="square" lIns="45718" tIns="45718" rIns="45718" bIns="45718" numCol="1" spcCol="38100" rtlCol="0" anchor="t" upright="0">
+      <a:bodyPr rot="0" spcFirstLastPara="1" vertOverflow="overflow" horzOverflow="overflow" vert="horz" wrap="square" lIns="45718" tIns="45718" rIns="45718" bIns="45718" numCol="1" spcCol="38100" rtlCol="0" anchor="t">
         <a:spAutoFit/>
       </a:bodyPr>
       <a:lstStyle>
@@ -7414,7 +7699,7 @@
           <a:buFontTx/>
           <a:buNone/>
           <a:tabLst/>
-          <a:defRPr b="0" baseline="0" cap="none" i="0" spc="0" strike="noStrike" sz="1400" u="none" kumimoji="0" normalizeH="0">
+          <a:defRPr kumimoji="0" sz="1400" b="0" i="0" u="none" strike="noStrike" cap="none" spc="0" normalizeH="0" baseline="0">
             <a:ln>
               <a:noFill/>
             </a:ln>
@@ -7444,7 +7729,7 @@
           <a:buFontTx/>
           <a:buNone/>
           <a:tabLst/>
-          <a:defRPr b="0" baseline="0" cap="none" i="0" spc="0" strike="noStrike" sz="1800" u="none" kumimoji="0" normalizeH="0">
+          <a:defRPr kumimoji="0" sz="1800" b="0" i="0" u="none" strike="noStrike" cap="none" spc="0" normalizeH="0" baseline="0">
             <a:ln>
               <a:noFill/>
             </a:ln>
@@ -7470,7 +7755,7 @@
           <a:buFontTx/>
           <a:buNone/>
           <a:tabLst/>
-          <a:defRPr b="0" baseline="0" cap="none" i="0" spc="0" strike="noStrike" sz="1800" u="none" kumimoji="0" normalizeH="0">
+          <a:defRPr kumimoji="0" sz="1800" b="0" i="0" u="none" strike="noStrike" cap="none" spc="0" normalizeH="0" baseline="0">
             <a:ln>
               <a:noFill/>
             </a:ln>
@@ -7496,7 +7781,7 @@
           <a:buFontTx/>
           <a:buNone/>
           <a:tabLst/>
-          <a:defRPr b="0" baseline="0" cap="none" i="0" spc="0" strike="noStrike" sz="1800" u="none" kumimoji="0" normalizeH="0">
+          <a:defRPr kumimoji="0" sz="1800" b="0" i="0" u="none" strike="noStrike" cap="none" spc="0" normalizeH="0" baseline="0">
             <a:ln>
               <a:noFill/>
             </a:ln>
@@ -7522,7 +7807,7 @@
           <a:buFontTx/>
           <a:buNone/>
           <a:tabLst/>
-          <a:defRPr b="0" baseline="0" cap="none" i="0" spc="0" strike="noStrike" sz="1800" u="none" kumimoji="0" normalizeH="0">
+          <a:defRPr kumimoji="0" sz="1800" b="0" i="0" u="none" strike="noStrike" cap="none" spc="0" normalizeH="0" baseline="0">
             <a:ln>
               <a:noFill/>
             </a:ln>
@@ -7548,7 +7833,7 @@
           <a:buFontTx/>
           <a:buNone/>
           <a:tabLst/>
-          <a:defRPr b="0" baseline="0" cap="none" i="0" spc="0" strike="noStrike" sz="1800" u="none" kumimoji="0" normalizeH="0">
+          <a:defRPr kumimoji="0" sz="1800" b="0" i="0" u="none" strike="noStrike" cap="none" spc="0" normalizeH="0" baseline="0">
             <a:ln>
               <a:noFill/>
             </a:ln>
@@ -7574,7 +7859,7 @@
           <a:buFontTx/>
           <a:buNone/>
           <a:tabLst/>
-          <a:defRPr b="0" baseline="0" cap="none" i="0" spc="0" strike="noStrike" sz="1800" u="none" kumimoji="0" normalizeH="0">
+          <a:defRPr kumimoji="0" sz="1800" b="0" i="0" u="none" strike="noStrike" cap="none" spc="0" normalizeH="0" baseline="0">
             <a:ln>
               <a:noFill/>
             </a:ln>
@@ -7600,7 +7885,7 @@
           <a:buFontTx/>
           <a:buNone/>
           <a:tabLst/>
-          <a:defRPr b="0" baseline="0" cap="none" i="0" spc="0" strike="noStrike" sz="1800" u="none" kumimoji="0" normalizeH="0">
+          <a:defRPr kumimoji="0" sz="1800" b="0" i="0" u="none" strike="noStrike" cap="none" spc="0" normalizeH="0" baseline="0">
             <a:ln>
               <a:noFill/>
             </a:ln>
@@ -7626,7 +7911,7 @@
           <a:buFontTx/>
           <a:buNone/>
           <a:tabLst/>
-          <a:defRPr b="0" baseline="0" cap="none" i="0" spc="0" strike="noStrike" sz="1800" u="none" kumimoji="0" normalizeH="0">
+          <a:defRPr kumimoji="0" sz="1800" b="0" i="0" u="none" strike="noStrike" cap="none" spc="0" normalizeH="0" baseline="0">
             <a:ln>
               <a:noFill/>
             </a:ln>
@@ -7652,7 +7937,7 @@
           <a:buFontTx/>
           <a:buNone/>
           <a:tabLst/>
-          <a:defRPr b="0" baseline="0" cap="none" i="0" spc="0" strike="noStrike" sz="1800" u="none" kumimoji="0" normalizeH="0">
+          <a:defRPr kumimoji="0" sz="1800" b="0" i="0" u="none" strike="noStrike" cap="none" spc="0" normalizeH="0" baseline="0">
             <a:ln>
               <a:noFill/>
             </a:ln>
@@ -7665,18 +7950,25 @@
         </a:lvl9pPr>
       </a:lstStyle>
       <a:style>
-        <a:lnRef idx="0"/>
-        <a:fillRef idx="0"/>
-        <a:effectRef idx="0"/>
+        <a:lnRef idx="0">
+          <a:scrgbClr r="0" g="0" b="0"/>
+        </a:lnRef>
+        <a:fillRef idx="0">
+          <a:scrgbClr r="0" g="0" b="0"/>
+        </a:fillRef>
+        <a:effectRef idx="0">
+          <a:scrgbClr r="0" g="0" b="0"/>
+        </a:effectRef>
         <a:fontRef idx="none"/>
       </a:style>
     </a:txDef>
   </a:objectDefaults>
+  <a:extraClrSchemeLst/>
 </a:theme>
 </file>
 
 <file path=ppt/theme/theme2.xml><?xml version="1.0" encoding="utf-8"?>
-<a:theme xmlns:a="http://schemas.openxmlformats.org/drawingml/2006/main" xmlns:r="http://schemas.openxmlformats.org/officeDocument/2006/relationships" name="Streamline">
+<a:theme xmlns:a="http://schemas.openxmlformats.org/drawingml/2006/main" name="Streamline">
   <a:themeElements>
     <a:clrScheme name="Streamline">
       <a:dk1>
@@ -7802,7 +8094,7 @@
       <a:effectStyleLst>
         <a:effectStyle>
           <a:effectLst>
-            <a:outerShdw sx="100000" sy="100000" kx="0" ky="0" algn="b" rotWithShape="0" blurRad="38100" dist="23000" dir="5400000">
+            <a:outerShdw blurRad="38100" dist="23000" dir="5400000" rotWithShape="0">
               <a:srgbClr val="000000">
                 <a:alpha val="35000"/>
               </a:srgbClr>
@@ -7811,7 +8103,7 @@
         </a:effectStyle>
         <a:effectStyle>
           <a:effectLst>
-            <a:outerShdw sx="100000" sy="100000" kx="0" ky="0" algn="b" rotWithShape="0" blurRad="38100" dist="23000" dir="5400000">
+            <a:outerShdw blurRad="38100" dist="23000" dir="5400000" rotWithShape="0">
               <a:srgbClr val="000000">
                 <a:alpha val="35000"/>
               </a:srgbClr>
@@ -7820,7 +8112,7 @@
         </a:effectStyle>
         <a:effectStyle>
           <a:effectLst>
-            <a:outerShdw sx="100000" sy="100000" kx="0" ky="0" algn="b" rotWithShape="0" blurRad="38100" dist="23000" dir="5400000">
+            <a:outerShdw blurRad="38100" dist="23000" dir="5400000" rotWithShape="0">
               <a:srgbClr val="000000">
                 <a:alpha val="35000"/>
               </a:srgbClr>
@@ -7894,7 +8186,7 @@
           <a:round/>
         </a:ln>
         <a:effectLst>
-          <a:outerShdw sx="100000" sy="100000" kx="0" ky="0" algn="b" rotWithShape="0" blurRad="38100" dist="23000" dir="5400000">
+          <a:outerShdw blurRad="38100" dist="23000" dir="5400000" rotWithShape="0">
             <a:srgbClr val="000000">
               <a:alpha val="35000"/>
             </a:srgbClr>
@@ -7902,7 +8194,7 @@
         </a:effectLst>
         <a:sp3d/>
       </a:spPr>
-      <a:bodyPr rot="0" spcFirstLastPara="1" vertOverflow="overflow" horzOverflow="overflow" vert="horz" wrap="square" lIns="45718" tIns="45718" rIns="45718" bIns="45718" numCol="1" spcCol="38100" rtlCol="0" anchor="ctr" upright="0">
+      <a:bodyPr rot="0" spcFirstLastPara="1" vertOverflow="overflow" horzOverflow="overflow" vert="horz" wrap="square" lIns="45718" tIns="45718" rIns="45718" bIns="45718" numCol="1" spcCol="38100" rtlCol="0" anchor="ctr">
         <a:spAutoFit/>
       </a:bodyPr>
       <a:lstStyle>
@@ -7921,7 +8213,7 @@
           <a:buFontTx/>
           <a:buNone/>
           <a:tabLst/>
-          <a:defRPr b="0" baseline="0" cap="none" i="0" spc="0" strike="noStrike" sz="1400" u="none" kumimoji="0" normalizeH="0">
+          <a:defRPr kumimoji="0" sz="1400" b="0" i="0" u="none" strike="noStrike" cap="none" spc="0" normalizeH="0" baseline="0">
             <a:ln>
               <a:noFill/>
             </a:ln>
@@ -7951,7 +8243,7 @@
           <a:buFontTx/>
           <a:buNone/>
           <a:tabLst/>
-          <a:defRPr b="0" baseline="0" cap="none" i="0" spc="0" strike="noStrike" sz="1800" u="none" kumimoji="0" normalizeH="0">
+          <a:defRPr kumimoji="0" sz="1800" b="0" i="0" u="none" strike="noStrike" cap="none" spc="0" normalizeH="0" baseline="0">
             <a:ln>
               <a:noFill/>
             </a:ln>
@@ -7977,7 +8269,7 @@
           <a:buFontTx/>
           <a:buNone/>
           <a:tabLst/>
-          <a:defRPr b="0" baseline="0" cap="none" i="0" spc="0" strike="noStrike" sz="1800" u="none" kumimoji="0" normalizeH="0">
+          <a:defRPr kumimoji="0" sz="1800" b="0" i="0" u="none" strike="noStrike" cap="none" spc="0" normalizeH="0" baseline="0">
             <a:ln>
               <a:noFill/>
             </a:ln>
@@ -8003,7 +8295,7 @@
           <a:buFontTx/>
           <a:buNone/>
           <a:tabLst/>
-          <a:defRPr b="0" baseline="0" cap="none" i="0" spc="0" strike="noStrike" sz="1800" u="none" kumimoji="0" normalizeH="0">
+          <a:defRPr kumimoji="0" sz="1800" b="0" i="0" u="none" strike="noStrike" cap="none" spc="0" normalizeH="0" baseline="0">
             <a:ln>
               <a:noFill/>
             </a:ln>
@@ -8029,7 +8321,7 @@
           <a:buFontTx/>
           <a:buNone/>
           <a:tabLst/>
-          <a:defRPr b="0" baseline="0" cap="none" i="0" spc="0" strike="noStrike" sz="1800" u="none" kumimoji="0" normalizeH="0">
+          <a:defRPr kumimoji="0" sz="1800" b="0" i="0" u="none" strike="noStrike" cap="none" spc="0" normalizeH="0" baseline="0">
             <a:ln>
               <a:noFill/>
             </a:ln>
@@ -8055,7 +8347,7 @@
           <a:buFontTx/>
           <a:buNone/>
           <a:tabLst/>
-          <a:defRPr b="0" baseline="0" cap="none" i="0" spc="0" strike="noStrike" sz="1800" u="none" kumimoji="0" normalizeH="0">
+          <a:defRPr kumimoji="0" sz="1800" b="0" i="0" u="none" strike="noStrike" cap="none" spc="0" normalizeH="0" baseline="0">
             <a:ln>
               <a:noFill/>
             </a:ln>
@@ -8081,7 +8373,7 @@
           <a:buFontTx/>
           <a:buNone/>
           <a:tabLst/>
-          <a:defRPr b="0" baseline="0" cap="none" i="0" spc="0" strike="noStrike" sz="1800" u="none" kumimoji="0" normalizeH="0">
+          <a:defRPr kumimoji="0" sz="1800" b="0" i="0" u="none" strike="noStrike" cap="none" spc="0" normalizeH="0" baseline="0">
             <a:ln>
               <a:noFill/>
             </a:ln>
@@ -8107,7 +8399,7 @@
           <a:buFontTx/>
           <a:buNone/>
           <a:tabLst/>
-          <a:defRPr b="0" baseline="0" cap="none" i="0" spc="0" strike="noStrike" sz="1800" u="none" kumimoji="0" normalizeH="0">
+          <a:defRPr kumimoji="0" sz="1800" b="0" i="0" u="none" strike="noStrike" cap="none" spc="0" normalizeH="0" baseline="0">
             <a:ln>
               <a:noFill/>
             </a:ln>
@@ -8133,7 +8425,7 @@
           <a:buFontTx/>
           <a:buNone/>
           <a:tabLst/>
-          <a:defRPr b="0" baseline="0" cap="none" i="0" spc="0" strike="noStrike" sz="1800" u="none" kumimoji="0" normalizeH="0">
+          <a:defRPr kumimoji="0" sz="1800" b="0" i="0" u="none" strike="noStrike" cap="none" spc="0" normalizeH="0" baseline="0">
             <a:ln>
               <a:noFill/>
             </a:ln>
@@ -8159,7 +8451,7 @@
           <a:buFontTx/>
           <a:buNone/>
           <a:tabLst/>
-          <a:defRPr b="0" baseline="0" cap="none" i="0" spc="0" strike="noStrike" sz="1800" u="none" kumimoji="0" normalizeH="0">
+          <a:defRPr kumimoji="0" sz="1800" b="0" i="0" u="none" strike="noStrike" cap="none" spc="0" normalizeH="0" baseline="0">
             <a:ln>
               <a:noFill/>
             </a:ln>
@@ -8172,9 +8464,15 @@
         </a:lvl9pPr>
       </a:lstStyle>
       <a:style>
-        <a:lnRef idx="0"/>
-        <a:fillRef idx="0"/>
-        <a:effectRef idx="0"/>
+        <a:lnRef idx="0">
+          <a:scrgbClr r="0" g="0" b="0"/>
+        </a:lnRef>
+        <a:fillRef idx="0">
+          <a:scrgbClr r="0" g="0" b="0"/>
+        </a:fillRef>
+        <a:effectRef idx="0">
+          <a:scrgbClr r="0" g="0" b="0"/>
+        </a:effectRef>
         <a:fontRef idx="none"/>
       </a:style>
     </a:spDef>
@@ -8189,7 +8487,7 @@
           <a:round/>
         </a:ln>
         <a:effectLst>
-          <a:outerShdw sx="100000" sy="100000" kx="0" ky="0" algn="b" rotWithShape="0" blurRad="38100" dist="23000" dir="5400000">
+          <a:outerShdw blurRad="38100" dist="23000" dir="5400000" rotWithShape="0">
             <a:srgbClr val="000000">
               <a:alpha val="35000"/>
             </a:srgbClr>
@@ -8197,7 +8495,7 @@
         </a:effectLst>
         <a:sp3d/>
       </a:spPr>
-      <a:bodyPr rot="0" spcFirstLastPara="1" vertOverflow="overflow" horzOverflow="overflow" vert="horz" wrap="square" lIns="91439" tIns="45719" rIns="91439" bIns="45719" numCol="1" spcCol="38100" rtlCol="0" anchor="t" upright="0">
+      <a:bodyPr rot="0" spcFirstLastPara="1" vertOverflow="overflow" horzOverflow="overflow" vert="horz" wrap="square" lIns="91439" tIns="45719" rIns="91439" bIns="45719" numCol="1" spcCol="38100" rtlCol="0" anchor="t">
         <a:noAutofit/>
       </a:bodyPr>
       <a:lstStyle>
@@ -8216,7 +8514,7 @@
           <a:buFontTx/>
           <a:buNone/>
           <a:tabLst/>
-          <a:defRPr b="0" baseline="0" cap="none" i="0" spc="0" strike="noStrike" sz="1800" u="none" kumimoji="0" normalizeH="0">
+          <a:defRPr kumimoji="0" sz="1800" b="0" i="0" u="none" strike="noStrike" cap="none" spc="0" normalizeH="0" baseline="0">
             <a:ln>
               <a:noFill/>
             </a:ln>
@@ -8242,7 +8540,7 @@
           <a:buFontTx/>
           <a:buNone/>
           <a:tabLst/>
-          <a:defRPr b="0" baseline="0" cap="none" i="0" spc="0" strike="noStrike" sz="1800" u="none" kumimoji="0" normalizeH="0">
+          <a:defRPr kumimoji="0" sz="1800" b="0" i="0" u="none" strike="noStrike" cap="none" spc="0" normalizeH="0" baseline="0">
             <a:ln>
               <a:noFill/>
             </a:ln>
@@ -8268,7 +8566,7 @@
           <a:buFontTx/>
           <a:buNone/>
           <a:tabLst/>
-          <a:defRPr b="0" baseline="0" cap="none" i="0" spc="0" strike="noStrike" sz="1800" u="none" kumimoji="0" normalizeH="0">
+          <a:defRPr kumimoji="0" sz="1800" b="0" i="0" u="none" strike="noStrike" cap="none" spc="0" normalizeH="0" baseline="0">
             <a:ln>
               <a:noFill/>
             </a:ln>
@@ -8294,7 +8592,7 @@
           <a:buFontTx/>
           <a:buNone/>
           <a:tabLst/>
-          <a:defRPr b="0" baseline="0" cap="none" i="0" spc="0" strike="noStrike" sz="1800" u="none" kumimoji="0" normalizeH="0">
+          <a:defRPr kumimoji="0" sz="1800" b="0" i="0" u="none" strike="noStrike" cap="none" spc="0" normalizeH="0" baseline="0">
             <a:ln>
               <a:noFill/>
             </a:ln>
@@ -8320,7 +8618,7 @@
           <a:buFontTx/>
           <a:buNone/>
           <a:tabLst/>
-          <a:defRPr b="0" baseline="0" cap="none" i="0" spc="0" strike="noStrike" sz="1800" u="none" kumimoji="0" normalizeH="0">
+          <a:defRPr kumimoji="0" sz="1800" b="0" i="0" u="none" strike="noStrike" cap="none" spc="0" normalizeH="0" baseline="0">
             <a:ln>
               <a:noFill/>
             </a:ln>
@@ -8346,7 +8644,7 @@
           <a:buFontTx/>
           <a:buNone/>
           <a:tabLst/>
-          <a:defRPr b="0" baseline="0" cap="none" i="0" spc="0" strike="noStrike" sz="1800" u="none" kumimoji="0" normalizeH="0">
+          <a:defRPr kumimoji="0" sz="1800" b="0" i="0" u="none" strike="noStrike" cap="none" spc="0" normalizeH="0" baseline="0">
             <a:ln>
               <a:noFill/>
             </a:ln>
@@ -8372,7 +8670,7 @@
           <a:buFontTx/>
           <a:buNone/>
           <a:tabLst/>
-          <a:defRPr b="0" baseline="0" cap="none" i="0" spc="0" strike="noStrike" sz="1800" u="none" kumimoji="0" normalizeH="0">
+          <a:defRPr kumimoji="0" sz="1800" b="0" i="0" u="none" strike="noStrike" cap="none" spc="0" normalizeH="0" baseline="0">
             <a:ln>
               <a:noFill/>
             </a:ln>
@@ -8398,7 +8696,7 @@
           <a:buFontTx/>
           <a:buNone/>
           <a:tabLst/>
-          <a:defRPr b="0" baseline="0" cap="none" i="0" spc="0" strike="noStrike" sz="1800" u="none" kumimoji="0" normalizeH="0">
+          <a:defRPr kumimoji="0" sz="1800" b="0" i="0" u="none" strike="noStrike" cap="none" spc="0" normalizeH="0" baseline="0">
             <a:ln>
               <a:noFill/>
             </a:ln>
@@ -8424,7 +8722,7 @@
           <a:buFontTx/>
           <a:buNone/>
           <a:tabLst/>
-          <a:defRPr b="0" baseline="0" cap="none" i="0" spc="0" strike="noStrike" sz="1800" u="none" kumimoji="0" normalizeH="0">
+          <a:defRPr kumimoji="0" sz="1800" b="0" i="0" u="none" strike="noStrike" cap="none" spc="0" normalizeH="0" baseline="0">
             <a:ln>
               <a:noFill/>
             </a:ln>
@@ -8450,7 +8748,7 @@
           <a:buFontTx/>
           <a:buNone/>
           <a:tabLst/>
-          <a:defRPr b="0" baseline="0" cap="none" i="0" spc="0" strike="noStrike" sz="1800" u="none" kumimoji="0" normalizeH="0">
+          <a:defRPr kumimoji="0" sz="1800" b="0" i="0" u="none" strike="noStrike" cap="none" spc="0" normalizeH="0" baseline="0">
             <a:ln>
               <a:noFill/>
             </a:ln>
@@ -8463,9 +8761,15 @@
         </a:lvl9pPr>
       </a:lstStyle>
       <a:style>
-        <a:lnRef idx="0"/>
-        <a:fillRef idx="0"/>
-        <a:effectRef idx="0"/>
+        <a:lnRef idx="0">
+          <a:scrgbClr r="0" g="0" b="0"/>
+        </a:lnRef>
+        <a:fillRef idx="0">
+          <a:scrgbClr r="0" g="0" b="0"/>
+        </a:fillRef>
+        <a:effectRef idx="0">
+          <a:scrgbClr r="0" g="0" b="0"/>
+        </a:effectRef>
         <a:fontRef idx="none"/>
       </a:style>
     </a:lnDef>
@@ -8479,7 +8783,7 @@
         <a:effectLst/>
         <a:sp3d/>
       </a:spPr>
-      <a:bodyPr rot="0" spcFirstLastPara="1" vertOverflow="overflow" horzOverflow="overflow" vert="horz" wrap="square" lIns="45718" tIns="45718" rIns="45718" bIns="45718" numCol="1" spcCol="38100" rtlCol="0" anchor="t" upright="0">
+      <a:bodyPr rot="0" spcFirstLastPara="1" vertOverflow="overflow" horzOverflow="overflow" vert="horz" wrap="square" lIns="45718" tIns="45718" rIns="45718" bIns="45718" numCol="1" spcCol="38100" rtlCol="0" anchor="t">
         <a:spAutoFit/>
       </a:bodyPr>
       <a:lstStyle>
@@ -8498,7 +8802,7 @@
           <a:buFontTx/>
           <a:buNone/>
           <a:tabLst/>
-          <a:defRPr b="0" baseline="0" cap="none" i="0" spc="0" strike="noStrike" sz="1400" u="none" kumimoji="0" normalizeH="0">
+          <a:defRPr kumimoji="0" sz="1400" b="0" i="0" u="none" strike="noStrike" cap="none" spc="0" normalizeH="0" baseline="0">
             <a:ln>
               <a:noFill/>
             </a:ln>
@@ -8528,7 +8832,7 @@
           <a:buFontTx/>
           <a:buNone/>
           <a:tabLst/>
-          <a:defRPr b="0" baseline="0" cap="none" i="0" spc="0" strike="noStrike" sz="1800" u="none" kumimoji="0" normalizeH="0">
+          <a:defRPr kumimoji="0" sz="1800" b="0" i="0" u="none" strike="noStrike" cap="none" spc="0" normalizeH="0" baseline="0">
             <a:ln>
               <a:noFill/>
             </a:ln>
@@ -8554,7 +8858,7 @@
           <a:buFontTx/>
           <a:buNone/>
           <a:tabLst/>
-          <a:defRPr b="0" baseline="0" cap="none" i="0" spc="0" strike="noStrike" sz="1800" u="none" kumimoji="0" normalizeH="0">
+          <a:defRPr kumimoji="0" sz="1800" b="0" i="0" u="none" strike="noStrike" cap="none" spc="0" normalizeH="0" baseline="0">
             <a:ln>
               <a:noFill/>
             </a:ln>
@@ -8580,7 +8884,7 @@
           <a:buFontTx/>
           <a:buNone/>
           <a:tabLst/>
-          <a:defRPr b="0" baseline="0" cap="none" i="0" spc="0" strike="noStrike" sz="1800" u="none" kumimoji="0" normalizeH="0">
+          <a:defRPr kumimoji="0" sz="1800" b="0" i="0" u="none" strike="noStrike" cap="none" spc="0" normalizeH="0" baseline="0">
             <a:ln>
               <a:noFill/>
             </a:ln>
@@ -8606,7 +8910,7 @@
           <a:buFontTx/>
           <a:buNone/>
           <a:tabLst/>
-          <a:defRPr b="0" baseline="0" cap="none" i="0" spc="0" strike="noStrike" sz="1800" u="none" kumimoji="0" normalizeH="0">
+          <a:defRPr kumimoji="0" sz="1800" b="0" i="0" u="none" strike="noStrike" cap="none" spc="0" normalizeH="0" baseline="0">
             <a:ln>
               <a:noFill/>
             </a:ln>
@@ -8632,7 +8936,7 @@
           <a:buFontTx/>
           <a:buNone/>
           <a:tabLst/>
-          <a:defRPr b="0" baseline="0" cap="none" i="0" spc="0" strike="noStrike" sz="1800" u="none" kumimoji="0" normalizeH="0">
+          <a:defRPr kumimoji="0" sz="1800" b="0" i="0" u="none" strike="noStrike" cap="none" spc="0" normalizeH="0" baseline="0">
             <a:ln>
               <a:noFill/>
             </a:ln>
@@ -8658,7 +8962,7 @@
           <a:buFontTx/>
           <a:buNone/>
           <a:tabLst/>
-          <a:defRPr b="0" baseline="0" cap="none" i="0" spc="0" strike="noStrike" sz="1800" u="none" kumimoji="0" normalizeH="0">
+          <a:defRPr kumimoji="0" sz="1800" b="0" i="0" u="none" strike="noStrike" cap="none" spc="0" normalizeH="0" baseline="0">
             <a:ln>
               <a:noFill/>
             </a:ln>
@@ -8684,7 +8988,7 @@
           <a:buFontTx/>
           <a:buNone/>
           <a:tabLst/>
-          <a:defRPr b="0" baseline="0" cap="none" i="0" spc="0" strike="noStrike" sz="1800" u="none" kumimoji="0" normalizeH="0">
+          <a:defRPr kumimoji="0" sz="1800" b="0" i="0" u="none" strike="noStrike" cap="none" spc="0" normalizeH="0" baseline="0">
             <a:ln>
               <a:noFill/>
             </a:ln>
@@ -8710,7 +9014,7 @@
           <a:buFontTx/>
           <a:buNone/>
           <a:tabLst/>
-          <a:defRPr b="0" baseline="0" cap="none" i="0" spc="0" strike="noStrike" sz="1800" u="none" kumimoji="0" normalizeH="0">
+          <a:defRPr kumimoji="0" sz="1800" b="0" i="0" u="none" strike="noStrike" cap="none" spc="0" normalizeH="0" baseline="0">
             <a:ln>
               <a:noFill/>
             </a:ln>
@@ -8736,7 +9040,7 @@
           <a:buFontTx/>
           <a:buNone/>
           <a:tabLst/>
-          <a:defRPr b="0" baseline="0" cap="none" i="0" spc="0" strike="noStrike" sz="1800" u="none" kumimoji="0" normalizeH="0">
+          <a:defRPr kumimoji="0" sz="1800" b="0" i="0" u="none" strike="noStrike" cap="none" spc="0" normalizeH="0" baseline="0">
             <a:ln>
               <a:noFill/>
             </a:ln>
@@ -8749,12 +9053,19 @@
         </a:lvl9pPr>
       </a:lstStyle>
       <a:style>
-        <a:lnRef idx="0"/>
-        <a:fillRef idx="0"/>
-        <a:effectRef idx="0"/>
+        <a:lnRef idx="0">
+          <a:scrgbClr r="0" g="0" b="0"/>
+        </a:lnRef>
+        <a:fillRef idx="0">
+          <a:scrgbClr r="0" g="0" b="0"/>
+        </a:fillRef>
+        <a:effectRef idx="0">
+          <a:scrgbClr r="0" g="0" b="0"/>
+        </a:effectRef>
         <a:fontRef idx="none"/>
       </a:style>
     </a:txDef>
   </a:objectDefaults>
+  <a:extraClrSchemeLst/>
 </a:theme>
 </file>
</xml_diff>